<commit_message>
Added code examples in the slideshow
</commit_message>
<xml_diff>
--- a/javascriptSlideshow.pptx
+++ b/javascriptSlideshow.pptx
@@ -10,10 +10,9 @@
     <p:sldId id="258" r:id="rId4"/>
     <p:sldId id="261" r:id="rId5"/>
     <p:sldId id="262" r:id="rId6"/>
-    <p:sldId id="264" r:id="rId7"/>
-    <p:sldId id="263" r:id="rId8"/>
-    <p:sldId id="259" r:id="rId9"/>
-    <p:sldId id="260" r:id="rId10"/>
+    <p:sldId id="263" r:id="rId7"/>
+    <p:sldId id="259" r:id="rId8"/>
+    <p:sldId id="260" r:id="rId9"/>
   </p:sldIdLst>
   <p:sldSz cx="9144000" cy="6858000" type="screen4x3"/>
   <p:notesSz cx="6858000" cy="9144000"/>
@@ -3185,6 +3184,13 @@
   <p:clrMapOvr>
     <a:masterClrMapping/>
   </p:clrMapOvr>
+  <p:timing>
+    <p:tnLst>
+      <p:par>
+        <p:cTn id="1" dur="indefinite" restart="never" nodeType="tmRoot"/>
+      </p:par>
+    </p:tnLst>
+  </p:timing>
 </p:sld>
 </file>
 
@@ -3290,6 +3296,13 @@
   <p:clrMapOvr>
     <a:masterClrMapping/>
   </p:clrMapOvr>
+  <p:timing>
+    <p:tnLst>
+      <p:par>
+        <p:cTn id="1" dur="indefinite" restart="never" nodeType="tmRoot"/>
+      </p:par>
+    </p:tnLst>
+  </p:timing>
 </p:sld>
 </file>
 
@@ -3397,6 +3410,13 @@
   <p:clrMapOvr>
     <a:masterClrMapping/>
   </p:clrMapOvr>
+  <p:timing>
+    <p:tnLst>
+      <p:par>
+        <p:cTn id="1" dur="indefinite" restart="never" nodeType="tmRoot"/>
+      </p:par>
+    </p:tnLst>
+  </p:timing>
 </p:sld>
 </file>
 
@@ -3427,7 +3447,12 @@
             <p:ph type="title"/>
           </p:nvPr>
         </p:nvSpPr>
-        <p:spPr/>
+        <p:spPr>
+          <a:xfrm>
+            <a:off x="457200" y="76200"/>
+            <a:ext cx="8229600" cy="1143000"/>
+          </a:xfrm>
+        </p:spPr>
         <p:txBody>
           <a:bodyPr/>
           <a:lstStyle/>
@@ -3452,13 +3477,13 @@
         </p:nvSpPr>
         <p:spPr>
           <a:xfrm>
-            <a:off x="4191000" y="1600200"/>
-            <a:ext cx="4495800" cy="4525963"/>
+            <a:off x="4191000" y="1066800"/>
+            <a:ext cx="4495800" cy="5410200"/>
           </a:xfrm>
         </p:spPr>
         <p:txBody>
           <a:bodyPr>
-            <a:normAutofit fontScale="32500" lnSpcReduction="20000"/>
+            <a:noAutofit/>
           </a:bodyPr>
           <a:lstStyle/>
           <a:p>
@@ -3466,29 +3491,146 @@
               <a:buNone/>
             </a:pPr>
             <a:r>
-              <a:rPr lang="en-US" dirty="0" smtClean="0"/>
-              <a:t>&lt;script type="text/</a:t>
-            </a:r>
-            <a:r>
-              <a:rPr lang="en-US" dirty="0" err="1" smtClean="0"/>
+              <a:rPr lang="en-US" sz="1100" dirty="0">
+                <a:solidFill>
+                  <a:srgbClr val="0000FF"/>
+                </a:solidFill>
+                <a:latin typeface="Arial"/>
+              </a:rPr>
+              <a:t>&lt;</a:t>
+            </a:r>
+            <a:r>
+              <a:rPr lang="en-US" sz="1100" dirty="0" smtClean="0">
+                <a:solidFill>
+                  <a:srgbClr val="800000"/>
+                </a:solidFill>
+                <a:latin typeface="Arial"/>
+              </a:rPr>
+              <a:t>head</a:t>
+            </a:r>
+            <a:r>
+              <a:rPr lang="en-US" sz="1100" dirty="0" smtClean="0">
+                <a:solidFill>
+                  <a:srgbClr val="0000FF"/>
+                </a:solidFill>
+                <a:latin typeface="Arial"/>
+              </a:rPr>
+              <a:t>&gt;</a:t>
+            </a:r>
+          </a:p>
+          <a:p>
+            <a:pPr marL="0" indent="0">
+              <a:buNone/>
+            </a:pPr>
+            <a:r>
+              <a:rPr lang="en-US" sz="1100" dirty="0" smtClean="0">
+                <a:solidFill>
+                  <a:srgbClr val="0000FF"/>
+                </a:solidFill>
+                <a:latin typeface="Arial"/>
+              </a:rPr>
+              <a:t>&lt;</a:t>
+            </a:r>
+            <a:r>
+              <a:rPr lang="en-US" sz="1100" dirty="0">
+                <a:solidFill>
+                  <a:srgbClr val="800000"/>
+                </a:solidFill>
+                <a:latin typeface="Arial"/>
+              </a:rPr>
+              <a:t>script</a:t>
+            </a:r>
+            <a:r>
+              <a:rPr lang="en-US" sz="1100" dirty="0">
+                <a:solidFill>
+                  <a:prstClr val="black"/>
+                </a:solidFill>
+                <a:latin typeface="Arial"/>
+              </a:rPr>
+              <a:t> </a:t>
+            </a:r>
+            <a:r>
+              <a:rPr lang="en-US" sz="1100" dirty="0">
+                <a:solidFill>
+                  <a:srgbClr val="FF0000"/>
+                </a:solidFill>
+                <a:latin typeface="Arial"/>
+              </a:rPr>
+              <a:t>type</a:t>
+            </a:r>
+            <a:r>
+              <a:rPr lang="en-US" sz="1100" dirty="0">
+                <a:solidFill>
+                  <a:srgbClr val="0000FF"/>
+                </a:solidFill>
+                <a:latin typeface="Arial"/>
+              </a:rPr>
+              <a:t>="text/</a:t>
+            </a:r>
+            <a:r>
+              <a:rPr lang="en-US" sz="1100" dirty="0" err="1">
+                <a:solidFill>
+                  <a:srgbClr val="0000FF"/>
+                </a:solidFill>
+                <a:latin typeface="Arial"/>
+              </a:rPr>
               <a:t>javascript</a:t>
             </a:r>
             <a:r>
-              <a:rPr lang="en-US" dirty="0" smtClean="0"/>
+              <a:rPr lang="en-US" sz="1100" dirty="0">
+                <a:solidFill>
+                  <a:srgbClr val="0000FF"/>
+                </a:solidFill>
+                <a:latin typeface="Arial"/>
+              </a:rPr>
               <a:t>"&gt;</a:t>
             </a:r>
+            <a:endParaRPr lang="en-US" sz="1100" dirty="0">
+              <a:solidFill>
+                <a:prstClr val="black"/>
+              </a:solidFill>
+              <a:latin typeface="Arial"/>
+            </a:endParaRPr>
           </a:p>
           <a:p>
             <a:pPr marL="0" indent="0">
               <a:buNone/>
             </a:pPr>
             <a:r>
-              <a:rPr lang="en-US" dirty="0" err="1" smtClean="0"/>
-              <a:t>document.write</a:t>
-            </a:r>
-            <a:r>
-              <a:rPr lang="en-US" dirty="0" smtClean="0"/>
-              <a:t>("Program to illustrate memory leak via closure");</a:t>
+              <a:rPr lang="en-US" sz="1100" dirty="0">
+                <a:solidFill>
+                  <a:srgbClr val="0000FF"/>
+                </a:solidFill>
+                <a:latin typeface="Arial"/>
+              </a:rPr>
+              <a:t>function</a:t>
+            </a:r>
+            <a:r>
+              <a:rPr lang="en-US" sz="1100" dirty="0">
+                <a:solidFill>
+                  <a:prstClr val="black"/>
+                </a:solidFill>
+                <a:latin typeface="Arial"/>
+              </a:rPr>
+              <a:t> </a:t>
+            </a:r>
+            <a:r>
+              <a:rPr lang="en-US" sz="1100" dirty="0" err="1">
+                <a:solidFill>
+                  <a:prstClr val="black"/>
+                </a:solidFill>
+                <a:latin typeface="Arial"/>
+              </a:rPr>
+              <a:t>AttachEvents</a:t>
+            </a:r>
+            <a:r>
+              <a:rPr lang="en-US" sz="1100" dirty="0">
+                <a:solidFill>
+                  <a:prstClr val="black"/>
+                </a:solidFill>
+                <a:latin typeface="Arial"/>
+              </a:rPr>
+              <a:t>(element)</a:t>
             </a:r>
           </a:p>
           <a:p>
@@ -3496,20 +3638,13 @@
               <a:buNone/>
             </a:pPr>
             <a:r>
-              <a:rPr lang="en-US" dirty="0" err="1" smtClean="0"/>
-              <a:t>window.onload</a:t>
-            </a:r>
-            <a:r>
-              <a:rPr lang="en-US" dirty="0" smtClean="0"/>
-              <a:t> = function </a:t>
-            </a:r>
-            <a:r>
-              <a:rPr lang="en-US" dirty="0" err="1" smtClean="0"/>
-              <a:t>outerFunction</a:t>
-            </a:r>
-            <a:r>
-              <a:rPr lang="en-US" dirty="0" smtClean="0"/>
-              <a:t>() {</a:t>
+              <a:rPr lang="en-US" sz="1100" dirty="0">
+                <a:solidFill>
+                  <a:prstClr val="black"/>
+                </a:solidFill>
+                <a:latin typeface="Arial"/>
+              </a:rPr>
+              <a:t>{</a:t>
             </a:r>
           </a:p>
           <a:p>
@@ -3517,32 +3652,538 @@
               <a:buNone/>
             </a:pPr>
             <a:r>
-              <a:rPr lang="en-US" dirty="0"/>
-              <a:t>	</a:t>
-            </a:r>
-            <a:r>
-              <a:rPr lang="en-US" dirty="0" err="1" smtClean="0"/>
-              <a:t>var</a:t>
-            </a:r>
-            <a:r>
-              <a:rPr lang="en-US" dirty="0" smtClean="0"/>
+              <a:rPr lang="en-US" sz="1100" dirty="0" smtClean="0">
+                <a:solidFill>
+                  <a:srgbClr val="006400"/>
+                </a:solidFill>
+                <a:latin typeface="Arial"/>
+              </a:rPr>
+              <a:t>       // </a:t>
+            </a:r>
+            <a:r>
+              <a:rPr lang="en-US" sz="1100" dirty="0">
+                <a:solidFill>
+                  <a:srgbClr val="006400"/>
+                </a:solidFill>
+                <a:latin typeface="Arial"/>
+              </a:rPr>
+              <a:t>This structure causes element to ref </a:t>
+            </a:r>
+            <a:r>
+              <a:rPr lang="en-US" sz="1100" dirty="0" err="1">
+                <a:solidFill>
+                  <a:srgbClr val="006400"/>
+                </a:solidFill>
+                <a:latin typeface="Arial"/>
+              </a:rPr>
+              <a:t>ClickEventHandler</a:t>
+            </a:r>
+            <a:endParaRPr lang="en-US" sz="1100" dirty="0">
+              <a:solidFill>
+                <a:prstClr val="black"/>
+              </a:solidFill>
+              <a:latin typeface="Arial"/>
+            </a:endParaRPr>
+          </a:p>
+          <a:p>
+            <a:pPr marL="0" indent="0">
+              <a:buNone/>
+            </a:pPr>
+            <a:r>
+              <a:rPr lang="en-US" sz="1100" dirty="0" smtClean="0">
+                <a:solidFill>
+                  <a:prstClr val="black"/>
+                </a:solidFill>
+                <a:latin typeface="Arial"/>
+              </a:rPr>
+              <a:t>       </a:t>
+            </a:r>
+            <a:r>
+              <a:rPr lang="en-US" sz="1100" dirty="0" err="1" smtClean="0">
+                <a:solidFill>
+                  <a:prstClr val="black"/>
+                </a:solidFill>
+                <a:latin typeface="Arial"/>
+              </a:rPr>
+              <a:t>element.attachEvent</a:t>
+            </a:r>
+            <a:r>
+              <a:rPr lang="en-US" sz="1100" dirty="0">
+                <a:solidFill>
+                  <a:prstClr val="black"/>
+                </a:solidFill>
+                <a:latin typeface="Arial"/>
+              </a:rPr>
+              <a:t>(</a:t>
+            </a:r>
+            <a:r>
+              <a:rPr lang="en-US" sz="1100" dirty="0">
+                <a:solidFill>
+                  <a:srgbClr val="800000"/>
+                </a:solidFill>
+                <a:latin typeface="Arial"/>
+              </a:rPr>
+              <a:t>"</a:t>
+            </a:r>
+            <a:r>
+              <a:rPr lang="en-US" sz="1100" dirty="0" err="1">
+                <a:solidFill>
+                  <a:srgbClr val="800000"/>
+                </a:solidFill>
+                <a:latin typeface="Arial"/>
+              </a:rPr>
+              <a:t>onclick</a:t>
+            </a:r>
+            <a:r>
+              <a:rPr lang="en-US" sz="1100" dirty="0">
+                <a:solidFill>
+                  <a:srgbClr val="800000"/>
+                </a:solidFill>
+                <a:latin typeface="Arial"/>
+              </a:rPr>
+              <a:t>"</a:t>
+            </a:r>
+            <a:r>
+              <a:rPr lang="en-US" sz="1100" dirty="0">
+                <a:solidFill>
+                  <a:prstClr val="black"/>
+                </a:solidFill>
+                <a:latin typeface="Arial"/>
+              </a:rPr>
+              <a:t>, </a:t>
+            </a:r>
+            <a:r>
+              <a:rPr lang="en-US" sz="1100" dirty="0" err="1">
+                <a:solidFill>
+                  <a:prstClr val="black"/>
+                </a:solidFill>
+                <a:latin typeface="Arial"/>
+              </a:rPr>
+              <a:t>ClickEventHandler</a:t>
+            </a:r>
+            <a:r>
+              <a:rPr lang="en-US" sz="1100" dirty="0">
+                <a:solidFill>
+                  <a:prstClr val="black"/>
+                </a:solidFill>
+                <a:latin typeface="Arial"/>
+              </a:rPr>
+              <a:t>);</a:t>
+            </a:r>
+          </a:p>
+          <a:p>
+            <a:pPr marL="0" indent="0">
+              <a:buNone/>
+            </a:pPr>
+            <a:endParaRPr lang="en-US" sz="1100" dirty="0">
+              <a:solidFill>
+                <a:prstClr val="black"/>
+              </a:solidFill>
+              <a:latin typeface="Arial"/>
+            </a:endParaRPr>
+          </a:p>
+          <a:p>
+            <a:pPr marL="0" indent="0">
+              <a:buNone/>
+            </a:pPr>
+            <a:r>
+              <a:rPr lang="en-US" sz="1100" dirty="0" smtClean="0">
+                <a:solidFill>
+                  <a:srgbClr val="0000FF"/>
+                </a:solidFill>
+                <a:latin typeface="Arial"/>
+              </a:rPr>
+              <a:t>        function</a:t>
+            </a:r>
+            <a:r>
+              <a:rPr lang="en-US" sz="1100" dirty="0" smtClean="0">
+                <a:solidFill>
+                  <a:prstClr val="black"/>
+                </a:solidFill>
+                <a:latin typeface="Arial"/>
+              </a:rPr>
               <a:t> </a:t>
             </a:r>
             <a:r>
-              <a:rPr lang="en-US" dirty="0" err="1" smtClean="0"/>
-              <a:t>obj</a:t>
-            </a:r>
-            <a:r>
-              <a:rPr lang="en-US" dirty="0" smtClean="0"/>
+              <a:rPr lang="en-US" sz="1100" dirty="0" err="1">
+                <a:solidFill>
+                  <a:prstClr val="black"/>
+                </a:solidFill>
+                <a:latin typeface="Arial"/>
+              </a:rPr>
+              <a:t>ClickEventHandler</a:t>
+            </a:r>
+            <a:r>
+              <a:rPr lang="en-US" sz="1100" dirty="0">
+                <a:solidFill>
+                  <a:prstClr val="black"/>
+                </a:solidFill>
+                <a:latin typeface="Arial"/>
+              </a:rPr>
+              <a:t>()</a:t>
+            </a:r>
+          </a:p>
+          <a:p>
+            <a:pPr marL="0" indent="0">
+              <a:buNone/>
+            </a:pPr>
+            <a:r>
+              <a:rPr lang="en-US" sz="1100" dirty="0" smtClean="0">
+                <a:solidFill>
+                  <a:prstClr val="black"/>
+                </a:solidFill>
+                <a:latin typeface="Arial"/>
+              </a:rPr>
+              <a:t>        {</a:t>
+            </a:r>
+            <a:endParaRPr lang="en-US" sz="1100" dirty="0">
+              <a:solidFill>
+                <a:prstClr val="black"/>
+              </a:solidFill>
+              <a:latin typeface="Arial"/>
+            </a:endParaRPr>
+          </a:p>
+          <a:p>
+            <a:pPr marL="0" indent="0">
+              <a:buNone/>
+            </a:pPr>
+            <a:r>
+              <a:rPr lang="en-US" sz="1100" dirty="0" smtClean="0">
+                <a:solidFill>
+                  <a:srgbClr val="006400"/>
+                </a:solidFill>
+                <a:latin typeface="Arial"/>
+              </a:rPr>
+              <a:t>               // </a:t>
+            </a:r>
+            <a:r>
+              <a:rPr lang="en-US" sz="1100" dirty="0">
+                <a:solidFill>
+                  <a:srgbClr val="006400"/>
+                </a:solidFill>
+                <a:latin typeface="Arial"/>
+              </a:rPr>
+              <a:t>This closure refs element</a:t>
+            </a:r>
+            <a:endParaRPr lang="en-US" sz="1100" dirty="0">
+              <a:solidFill>
+                <a:prstClr val="black"/>
+              </a:solidFill>
+              <a:latin typeface="Arial"/>
+            </a:endParaRPr>
+          </a:p>
+          <a:p>
+            <a:pPr marL="0" indent="0">
+              <a:buNone/>
+            </a:pPr>
+            <a:r>
+              <a:rPr lang="en-US" sz="1100" dirty="0" smtClean="0">
+                <a:solidFill>
+                  <a:prstClr val="black"/>
+                </a:solidFill>
+                <a:latin typeface="Arial"/>
+              </a:rPr>
+              <a:t>                </a:t>
+            </a:r>
+            <a:r>
+              <a:rPr lang="en-US" sz="1100" dirty="0" err="1" smtClean="0">
+                <a:solidFill>
+                  <a:prstClr val="black"/>
+                </a:solidFill>
+                <a:latin typeface="Arial"/>
+              </a:rPr>
+              <a:t>document.getElementById</a:t>
+            </a:r>
+            <a:r>
+              <a:rPr lang="en-US" sz="1100" dirty="0">
+                <a:solidFill>
+                  <a:prstClr val="black"/>
+                </a:solidFill>
+                <a:latin typeface="Arial"/>
+              </a:rPr>
+              <a:t>(</a:t>
+            </a:r>
+            <a:r>
+              <a:rPr lang="en-US" sz="1100" dirty="0">
+                <a:solidFill>
+                  <a:srgbClr val="800000"/>
+                </a:solidFill>
+                <a:latin typeface="Arial"/>
+              </a:rPr>
+              <a:t>"</a:t>
+            </a:r>
+            <a:r>
+              <a:rPr lang="en-US" sz="1100" dirty="0" err="1">
+                <a:solidFill>
+                  <a:srgbClr val="800000"/>
+                </a:solidFill>
+                <a:latin typeface="Arial"/>
+              </a:rPr>
+              <a:t>LeakedDiv</a:t>
+            </a:r>
+            <a:r>
+              <a:rPr lang="en-US" sz="1100" dirty="0">
+                <a:solidFill>
+                  <a:srgbClr val="800000"/>
+                </a:solidFill>
+                <a:latin typeface="Arial"/>
+              </a:rPr>
+              <a:t>"</a:t>
+            </a:r>
+            <a:r>
+              <a:rPr lang="en-US" sz="1100" dirty="0">
+                <a:solidFill>
+                  <a:prstClr val="black"/>
+                </a:solidFill>
+                <a:latin typeface="Arial"/>
+              </a:rPr>
+              <a:t>).</a:t>
+            </a:r>
+            <a:r>
+              <a:rPr lang="en-US" sz="1100" dirty="0" err="1">
+                <a:solidFill>
+                  <a:prstClr val="black"/>
+                </a:solidFill>
+                <a:latin typeface="Arial"/>
+              </a:rPr>
+              <a:t>innerHTML</a:t>
+            </a:r>
+            <a:r>
+              <a:rPr lang="en-US" sz="1100" dirty="0">
+                <a:solidFill>
+                  <a:prstClr val="black"/>
+                </a:solidFill>
+                <a:latin typeface="Arial"/>
+              </a:rPr>
               <a:t> = </a:t>
             </a:r>
             <a:r>
-              <a:rPr lang="en-US" dirty="0" err="1" smtClean="0"/>
+              <a:rPr lang="en-US" sz="1100" dirty="0" smtClean="0">
+                <a:solidFill>
+                  <a:srgbClr val="800000"/>
+                </a:solidFill>
+                <a:latin typeface="Arial"/>
+              </a:rPr>
+              <a:t>“ "</a:t>
+            </a:r>
+            <a:r>
+              <a:rPr lang="en-US" sz="1100" dirty="0" smtClean="0">
+                <a:solidFill>
+                  <a:prstClr val="black"/>
+                </a:solidFill>
+                <a:latin typeface="Arial"/>
+              </a:rPr>
+              <a:t>;</a:t>
+            </a:r>
+            <a:endParaRPr lang="en-US" sz="1100" dirty="0">
+              <a:solidFill>
+                <a:prstClr val="black"/>
+              </a:solidFill>
+              <a:latin typeface="Arial"/>
+            </a:endParaRPr>
+          </a:p>
+          <a:p>
+            <a:pPr marL="0" indent="0">
+              <a:buNone/>
+            </a:pPr>
+            <a:r>
+              <a:rPr lang="en-US" sz="1100" dirty="0" smtClean="0">
+                <a:solidFill>
+                  <a:prstClr val="black"/>
+                </a:solidFill>
+                <a:latin typeface="Arial"/>
+              </a:rPr>
+              <a:t>         }</a:t>
+            </a:r>
+            <a:endParaRPr lang="en-US" sz="1100" dirty="0">
+              <a:solidFill>
+                <a:prstClr val="black"/>
+              </a:solidFill>
+              <a:latin typeface="Arial"/>
+            </a:endParaRPr>
+          </a:p>
+          <a:p>
+            <a:pPr marL="0" indent="0">
+              <a:buNone/>
+            </a:pPr>
+            <a:r>
+              <a:rPr lang="en-US" sz="1100" dirty="0">
+                <a:solidFill>
+                  <a:prstClr val="black"/>
+                </a:solidFill>
+                <a:latin typeface="Arial"/>
+              </a:rPr>
+              <a:t>}</a:t>
+            </a:r>
+          </a:p>
+          <a:p>
+            <a:pPr marL="0" indent="0">
+              <a:buNone/>
+            </a:pPr>
+            <a:r>
+              <a:rPr lang="en-US" sz="1100" dirty="0" smtClean="0">
+                <a:solidFill>
+                  <a:srgbClr val="0000FF"/>
+                </a:solidFill>
+                <a:latin typeface="Arial"/>
+              </a:rPr>
+              <a:t>function</a:t>
+            </a:r>
+            <a:r>
+              <a:rPr lang="en-US" sz="1100" dirty="0" smtClean="0">
+                <a:solidFill>
+                  <a:prstClr val="black"/>
+                </a:solidFill>
+                <a:latin typeface="Arial"/>
+              </a:rPr>
+              <a:t> </a:t>
+            </a:r>
+            <a:r>
+              <a:rPr lang="en-US" sz="1100" dirty="0" err="1">
+                <a:solidFill>
+                  <a:prstClr val="black"/>
+                </a:solidFill>
+                <a:latin typeface="Arial"/>
+              </a:rPr>
+              <a:t>SetupLeak</a:t>
+            </a:r>
+            <a:r>
+              <a:rPr lang="en-US" sz="1100" dirty="0">
+                <a:solidFill>
+                  <a:prstClr val="black"/>
+                </a:solidFill>
+                <a:latin typeface="Arial"/>
+              </a:rPr>
+              <a:t>()</a:t>
+            </a:r>
+          </a:p>
+          <a:p>
+            <a:pPr marL="0" indent="0">
+              <a:buNone/>
+            </a:pPr>
+            <a:r>
+              <a:rPr lang="en-US" sz="1100" dirty="0">
+                <a:solidFill>
+                  <a:prstClr val="black"/>
+                </a:solidFill>
+                <a:latin typeface="Arial"/>
+              </a:rPr>
+              <a:t>{</a:t>
+            </a:r>
+          </a:p>
+          <a:p>
+            <a:pPr marL="0" indent="0">
+              <a:buNone/>
+            </a:pPr>
+            <a:r>
+              <a:rPr lang="en-US" sz="1100" dirty="0" smtClean="0">
+                <a:solidFill>
+                  <a:srgbClr val="006400"/>
+                </a:solidFill>
+                <a:latin typeface="Arial"/>
+              </a:rPr>
+              <a:t>         // </a:t>
+            </a:r>
+            <a:r>
+              <a:rPr lang="en-US" sz="1100" dirty="0">
+                <a:solidFill>
+                  <a:srgbClr val="006400"/>
+                </a:solidFill>
+                <a:latin typeface="Arial"/>
+              </a:rPr>
+              <a:t>The leak happens all at once</a:t>
+            </a:r>
+            <a:endParaRPr lang="en-US" sz="1100" dirty="0">
+              <a:solidFill>
+                <a:prstClr val="black"/>
+              </a:solidFill>
+              <a:latin typeface="Arial"/>
+            </a:endParaRPr>
+          </a:p>
+          <a:p>
+            <a:pPr marL="0" indent="0">
+              <a:buNone/>
+            </a:pPr>
+            <a:r>
+              <a:rPr lang="en-US" sz="1100" dirty="0" smtClean="0">
+                <a:solidFill>
+                  <a:prstClr val="black"/>
+                </a:solidFill>
+                <a:latin typeface="Arial"/>
+              </a:rPr>
+              <a:t>         </a:t>
+            </a:r>
+            <a:r>
+              <a:rPr lang="en-US" sz="1100" dirty="0" err="1" smtClean="0">
+                <a:solidFill>
+                  <a:prstClr val="black"/>
+                </a:solidFill>
+                <a:latin typeface="Arial"/>
+              </a:rPr>
+              <a:t>AttachEvents</a:t>
+            </a:r>
+            <a:r>
+              <a:rPr lang="en-US" sz="1100" dirty="0" smtClean="0">
+                <a:solidFill>
+                  <a:prstClr val="black"/>
+                </a:solidFill>
+                <a:latin typeface="Arial"/>
+              </a:rPr>
+              <a:t>(</a:t>
+            </a:r>
+            <a:r>
+              <a:rPr lang="en-US" sz="1100" dirty="0" err="1" smtClean="0">
+                <a:solidFill>
+                  <a:prstClr val="black"/>
+                </a:solidFill>
+                <a:latin typeface="Arial"/>
+              </a:rPr>
               <a:t>document.getElementById</a:t>
             </a:r>
             <a:r>
-              <a:rPr lang="en-US" dirty="0" smtClean="0"/>
-              <a:t>("element");</a:t>
+              <a:rPr lang="en-US" sz="1100" dirty="0">
+                <a:solidFill>
+                  <a:prstClr val="black"/>
+                </a:solidFill>
+                <a:latin typeface="Arial"/>
+              </a:rPr>
+              <a:t>(</a:t>
+            </a:r>
+            <a:r>
+              <a:rPr lang="en-US" sz="1100" dirty="0">
+                <a:solidFill>
+                  <a:srgbClr val="800000"/>
+                </a:solidFill>
+                <a:latin typeface="Arial"/>
+              </a:rPr>
+              <a:t>"</a:t>
+            </a:r>
+            <a:r>
+              <a:rPr lang="en-US" sz="1100" dirty="0" err="1">
+                <a:solidFill>
+                  <a:srgbClr val="800000"/>
+                </a:solidFill>
+                <a:latin typeface="Arial"/>
+              </a:rPr>
+              <a:t>leakedButton</a:t>
+            </a:r>
+            <a:r>
+              <a:rPr lang="en-US" sz="1100" dirty="0">
+                <a:solidFill>
+                  <a:srgbClr val="800000"/>
+                </a:solidFill>
+                <a:latin typeface="Arial"/>
+              </a:rPr>
+              <a:t>"</a:t>
+            </a:r>
+            <a:r>
+              <a:rPr lang="en-US" sz="1100" dirty="0">
+                <a:solidFill>
+                  <a:prstClr val="black"/>
+                </a:solidFill>
+                <a:latin typeface="Arial"/>
+              </a:rPr>
+              <a:t>));</a:t>
             </a:r>
           </a:p>
           <a:p>
@@ -3550,24 +4191,13 @@
               <a:buNone/>
             </a:pPr>
             <a:r>
-              <a:rPr lang="en-US" dirty="0" smtClean="0"/>
-              <a:t>		</a:t>
-            </a:r>
-            <a:r>
-              <a:rPr lang="en-US" dirty="0" err="1" smtClean="0"/>
-              <a:t>obj.onclick</a:t>
-            </a:r>
-            <a:r>
-              <a:rPr lang="en-US" dirty="0" smtClean="0"/>
-              <a:t>=function </a:t>
-            </a:r>
-            <a:r>
-              <a:rPr lang="en-US" dirty="0" err="1" smtClean="0"/>
-              <a:t>innerFunction</a:t>
-            </a:r>
-            <a:r>
-              <a:rPr lang="en-US" dirty="0" smtClean="0"/>
-              <a:t>(){</a:t>
+              <a:rPr lang="en-US" sz="1100" dirty="0">
+                <a:solidFill>
+                  <a:prstClr val="black"/>
+                </a:solidFill>
+                <a:latin typeface="Arial"/>
+              </a:rPr>
+              <a:t>}</a:t>
             </a:r>
           </a:p>
           <a:p>
@@ -3575,8 +4205,31 @@
               <a:buNone/>
             </a:pPr>
             <a:r>
-              <a:rPr lang="en-US" dirty="0" smtClean="0"/>
-              <a:t>		alert("Hi! I will leak");</a:t>
+              <a:rPr lang="en-US" sz="1100" dirty="0" smtClean="0">
+                <a:solidFill>
+                  <a:srgbClr val="0000FF"/>
+                </a:solidFill>
+                <a:latin typeface="Arial"/>
+              </a:rPr>
+              <a:t>&lt;/</a:t>
+            </a:r>
+            <a:r>
+              <a:rPr lang="en-US" sz="1100" dirty="0">
+                <a:solidFill>
+                  <a:srgbClr val="800000"/>
+                </a:solidFill>
+                <a:latin typeface="Arial"/>
+              </a:rPr>
+              <a:t>script</a:t>
+            </a:r>
+            <a:r>
+              <a:rPr lang="en-US" sz="1100" dirty="0" smtClean="0">
+                <a:solidFill>
+                  <a:srgbClr val="0000FF"/>
+                </a:solidFill>
+                <a:latin typeface="Arial"/>
+              </a:rPr>
+              <a:t>&gt;</a:t>
             </a:r>
           </a:p>
           <a:p>
@@ -3584,34 +4237,110 @@
               <a:buNone/>
             </a:pPr>
             <a:r>
-              <a:rPr lang="en-US" dirty="0" smtClean="0"/>
-              <a:t>		};</a:t>
+              <a:rPr lang="en-US" sz="1100" dirty="0">
+                <a:solidFill>
+                  <a:srgbClr val="0000FF"/>
+                </a:solidFill>
+                <a:latin typeface="Arial"/>
+              </a:rPr>
+              <a:t>&lt;/</a:t>
+            </a:r>
+            <a:r>
+              <a:rPr lang="en-US" sz="1100" dirty="0">
+                <a:solidFill>
+                  <a:srgbClr val="800000"/>
+                </a:solidFill>
+                <a:latin typeface="Arial"/>
+              </a:rPr>
+              <a:t>head</a:t>
+            </a:r>
+            <a:r>
+              <a:rPr lang="en-US" sz="1100" dirty="0">
+                <a:solidFill>
+                  <a:srgbClr val="0000FF"/>
+                </a:solidFill>
+                <a:latin typeface="Arial"/>
+              </a:rPr>
+              <a:t>&gt;</a:t>
             </a:r>
           </a:p>
           <a:p>
             <a:pPr marL="0" indent="0">
               <a:buNone/>
             </a:pPr>
-            <a:r>
-              <a:rPr lang="en-US" dirty="0" smtClean="0"/>
-              <a:t>		</a:t>
-            </a:r>
-            <a:r>
-              <a:rPr lang="en-US" dirty="0" err="1" smtClean="0"/>
-              <a:t>obj.bigString</a:t>
-            </a:r>
-            <a:r>
-              <a:rPr lang="en-US" dirty="0" smtClean="0"/>
-              <a:t>=new Array(1000).join(new Array(2000).join("XXXXX"));</a:t>
-            </a:r>
+            <a:endParaRPr lang="en-US" sz="1100" dirty="0" smtClean="0">
+              <a:solidFill>
+                <a:srgbClr val="0000FF"/>
+              </a:solidFill>
+              <a:latin typeface="Arial"/>
+            </a:endParaRPr>
           </a:p>
           <a:p>
             <a:pPr marL="0" indent="0">
               <a:buNone/>
             </a:pPr>
             <a:r>
-              <a:rPr lang="en-US" dirty="0" smtClean="0"/>
-              <a:t>		// This is used to make the leak significant</a:t>
+              <a:rPr lang="en-US" sz="1100" dirty="0">
+                <a:solidFill>
+                  <a:srgbClr val="0000FF"/>
+                </a:solidFill>
+                <a:latin typeface="Arial"/>
+              </a:rPr>
+              <a:t>&lt;</a:t>
+            </a:r>
+            <a:r>
+              <a:rPr lang="en-US" sz="1100" dirty="0">
+                <a:solidFill>
+                  <a:srgbClr val="800000"/>
+                </a:solidFill>
+                <a:latin typeface="Arial"/>
+              </a:rPr>
+              <a:t>body</a:t>
+            </a:r>
+            <a:r>
+              <a:rPr lang="en-US" sz="1100" dirty="0">
+                <a:solidFill>
+                  <a:prstClr val="black"/>
+                </a:solidFill>
+                <a:latin typeface="Arial"/>
+              </a:rPr>
+              <a:t> </a:t>
+            </a:r>
+            <a:r>
+              <a:rPr lang="en-US" sz="1100" dirty="0" err="1">
+                <a:solidFill>
+                  <a:srgbClr val="FF0000"/>
+                </a:solidFill>
+                <a:latin typeface="Arial"/>
+              </a:rPr>
+              <a:t>onload</a:t>
+            </a:r>
+            <a:r>
+              <a:rPr lang="en-US" sz="1100" dirty="0">
+                <a:solidFill>
+                  <a:srgbClr val="0000FF"/>
+                </a:solidFill>
+                <a:latin typeface="Arial"/>
+              </a:rPr>
+              <a:t>="</a:t>
+            </a:r>
+            <a:r>
+              <a:rPr lang="en-US" sz="1100" dirty="0" err="1">
+                <a:solidFill>
+                  <a:srgbClr val="0000FF"/>
+                </a:solidFill>
+                <a:latin typeface="Arial"/>
+              </a:rPr>
+              <a:t>SetupLeak</a:t>
+            </a:r>
+            <a:r>
+              <a:rPr lang="en-US" sz="1100" dirty="0">
+                <a:solidFill>
+                  <a:srgbClr val="0000FF"/>
+                </a:solidFill>
+                <a:latin typeface="Arial"/>
+              </a:rPr>
+              <a:t>()"&gt;</a:t>
             </a:r>
           </a:p>
           <a:p>
@@ -3619,206 +4348,375 @@
               <a:buNone/>
             </a:pPr>
             <a:r>
-              <a:rPr lang="en-US" dirty="0" smtClean="0"/>
-              <a:t>	};</a:t>
-            </a:r>
+              <a:rPr lang="en-US" sz="1100" dirty="0">
+                <a:solidFill>
+                  <a:srgbClr val="0000FF"/>
+                </a:solidFill>
+                <a:latin typeface="Arial"/>
+              </a:rPr>
+              <a:t> </a:t>
+            </a:r>
+            <a:r>
+              <a:rPr lang="en-US" sz="1100" dirty="0" smtClean="0">
+                <a:solidFill>
+                  <a:srgbClr val="0000FF"/>
+                </a:solidFill>
+                <a:latin typeface="Arial"/>
+              </a:rPr>
+              <a:t>   &lt;</a:t>
+            </a:r>
+            <a:r>
+              <a:rPr lang="en-US" sz="1100" dirty="0">
+                <a:solidFill>
+                  <a:srgbClr val="800000"/>
+                </a:solidFill>
+                <a:latin typeface="Arial"/>
+              </a:rPr>
+              <a:t>div</a:t>
+            </a:r>
+            <a:r>
+              <a:rPr lang="en-US" sz="1100" dirty="0">
+                <a:solidFill>
+                  <a:srgbClr val="0000FF"/>
+                </a:solidFill>
+                <a:latin typeface="Arial"/>
+              </a:rPr>
+              <a:t>&gt;</a:t>
+            </a:r>
+            <a:endParaRPr lang="en-US" sz="1100" dirty="0">
+              <a:solidFill>
+                <a:prstClr val="black"/>
+              </a:solidFill>
+              <a:latin typeface="Arial"/>
+            </a:endParaRPr>
           </a:p>
           <a:p>
             <a:pPr marL="0" indent="0">
               <a:buNone/>
             </a:pPr>
             <a:r>
-              <a:rPr lang="en-US" dirty="0" smtClean="0"/>
-              <a:t>	&lt;/script&gt;</a:t>
-            </a:r>
+              <a:rPr lang="en-US" sz="1100" dirty="0" smtClean="0">
+                <a:solidFill>
+                  <a:srgbClr val="0000FF"/>
+                </a:solidFill>
+                <a:latin typeface="Arial"/>
+              </a:rPr>
+              <a:t>           &lt;</a:t>
+            </a:r>
+            <a:r>
+              <a:rPr lang="en-US" sz="1100" dirty="0">
+                <a:solidFill>
+                  <a:srgbClr val="800000"/>
+                </a:solidFill>
+                <a:latin typeface="Arial"/>
+              </a:rPr>
+              <a:t>div</a:t>
+            </a:r>
+            <a:r>
+              <a:rPr lang="en-US" sz="1100" dirty="0">
+                <a:solidFill>
+                  <a:prstClr val="black"/>
+                </a:solidFill>
+                <a:latin typeface="Arial"/>
+              </a:rPr>
+              <a:t> </a:t>
+            </a:r>
+            <a:r>
+              <a:rPr lang="en-US" sz="1100" dirty="0">
+                <a:solidFill>
+                  <a:srgbClr val="FF0000"/>
+                </a:solidFill>
+                <a:latin typeface="Arial"/>
+              </a:rPr>
+              <a:t>id</a:t>
+            </a:r>
+            <a:r>
+              <a:rPr lang="en-US" sz="1100" dirty="0">
+                <a:solidFill>
+                  <a:srgbClr val="0000FF"/>
+                </a:solidFill>
+                <a:latin typeface="Arial"/>
+              </a:rPr>
+              <a:t>="</a:t>
+            </a:r>
+            <a:r>
+              <a:rPr lang="en-US" sz="1100" dirty="0" err="1">
+                <a:solidFill>
+                  <a:srgbClr val="0000FF"/>
+                </a:solidFill>
+                <a:latin typeface="Arial"/>
+              </a:rPr>
+              <a:t>buttonContainer</a:t>
+            </a:r>
+            <a:r>
+              <a:rPr lang="en-US" sz="1100" dirty="0">
+                <a:solidFill>
+                  <a:srgbClr val="0000FF"/>
+                </a:solidFill>
+                <a:latin typeface="Arial"/>
+              </a:rPr>
+              <a:t>"&gt;</a:t>
+            </a:r>
+            <a:endParaRPr lang="en-US" sz="1100" dirty="0">
+              <a:solidFill>
+                <a:prstClr val="black"/>
+              </a:solidFill>
+              <a:latin typeface="Arial"/>
+            </a:endParaRPr>
           </a:p>
           <a:p>
             <a:pPr marL="0" indent="0">
               <a:buNone/>
             </a:pPr>
             <a:r>
-              <a:rPr lang="en-US" dirty="0" smtClean="0"/>
-              <a:t>	&lt;button id="element"&gt;Click Me&lt;/button&gt;</a:t>
-            </a:r>
+              <a:rPr lang="en-US" sz="1100" dirty="0" smtClean="0">
+                <a:solidFill>
+                  <a:srgbClr val="0000FF"/>
+                </a:solidFill>
+                <a:latin typeface="Arial"/>
+              </a:rPr>
+              <a:t>                    &lt;</a:t>
+            </a:r>
+            <a:r>
+              <a:rPr lang="en-US" sz="1100" dirty="0">
+                <a:solidFill>
+                  <a:srgbClr val="800000"/>
+                </a:solidFill>
+                <a:latin typeface="Arial"/>
+              </a:rPr>
+              <a:t>input</a:t>
+            </a:r>
+            <a:r>
+              <a:rPr lang="en-US" sz="1100" dirty="0">
+                <a:solidFill>
+                  <a:prstClr val="black"/>
+                </a:solidFill>
+                <a:latin typeface="Arial"/>
+              </a:rPr>
+              <a:t> </a:t>
+            </a:r>
+            <a:r>
+              <a:rPr lang="en-US" sz="1100" dirty="0">
+                <a:solidFill>
+                  <a:srgbClr val="FF0000"/>
+                </a:solidFill>
+                <a:latin typeface="Arial"/>
+              </a:rPr>
+              <a:t>id</a:t>
+            </a:r>
+            <a:r>
+              <a:rPr lang="en-US" sz="1100" dirty="0">
+                <a:solidFill>
+                  <a:srgbClr val="0000FF"/>
+                </a:solidFill>
+                <a:latin typeface="Arial"/>
+              </a:rPr>
+              <a:t>="</a:t>
+            </a:r>
+            <a:r>
+              <a:rPr lang="en-US" sz="1100" dirty="0" err="1">
+                <a:solidFill>
+                  <a:srgbClr val="0000FF"/>
+                </a:solidFill>
+                <a:latin typeface="Arial"/>
+              </a:rPr>
+              <a:t>leakedButton</a:t>
+            </a:r>
+            <a:r>
+              <a:rPr lang="en-US" sz="1100" dirty="0">
+                <a:solidFill>
+                  <a:srgbClr val="0000FF"/>
+                </a:solidFill>
+                <a:latin typeface="Arial"/>
+              </a:rPr>
+              <a:t>"</a:t>
+            </a:r>
+            <a:r>
+              <a:rPr lang="en-US" sz="1100" dirty="0">
+                <a:solidFill>
+                  <a:prstClr val="black"/>
+                </a:solidFill>
+                <a:latin typeface="Arial"/>
+              </a:rPr>
+              <a:t> </a:t>
+            </a:r>
+            <a:r>
+              <a:rPr lang="en-US" sz="1100" dirty="0">
+                <a:solidFill>
+                  <a:srgbClr val="FF0000"/>
+                </a:solidFill>
+                <a:latin typeface="Arial"/>
+              </a:rPr>
+              <a:t>type</a:t>
+            </a:r>
+            <a:r>
+              <a:rPr lang="en-US" sz="1100" dirty="0">
+                <a:solidFill>
+                  <a:srgbClr val="0000FF"/>
+                </a:solidFill>
+                <a:latin typeface="Arial"/>
+              </a:rPr>
+              <a:t>="button"</a:t>
+            </a:r>
+            <a:r>
+              <a:rPr lang="en-US" sz="1100" dirty="0">
+                <a:solidFill>
+                  <a:prstClr val="black"/>
+                </a:solidFill>
+                <a:latin typeface="Arial"/>
+              </a:rPr>
+              <a:t>  </a:t>
+            </a:r>
+            <a:r>
+              <a:rPr lang="en-US" sz="1100" dirty="0">
+                <a:solidFill>
+                  <a:srgbClr val="FF0000"/>
+                </a:solidFill>
+                <a:latin typeface="Arial"/>
+              </a:rPr>
+              <a:t>value</a:t>
+            </a:r>
+            <a:r>
+              <a:rPr lang="en-US" sz="1100" dirty="0">
+                <a:solidFill>
+                  <a:srgbClr val="0000FF"/>
+                </a:solidFill>
+                <a:latin typeface="Arial"/>
+              </a:rPr>
+              <a:t>="Leak"</a:t>
+            </a:r>
+            <a:r>
+              <a:rPr lang="en-US" sz="1100" dirty="0">
+                <a:solidFill>
+                  <a:prstClr val="black"/>
+                </a:solidFill>
+                <a:latin typeface="Arial"/>
+              </a:rPr>
+              <a:t> </a:t>
+            </a:r>
+            <a:r>
+              <a:rPr lang="en-US" sz="1100" dirty="0">
+                <a:solidFill>
+                  <a:srgbClr val="0000FF"/>
+                </a:solidFill>
+                <a:latin typeface="Arial"/>
+              </a:rPr>
+              <a:t>/&gt;</a:t>
+            </a:r>
+            <a:endParaRPr lang="en-US" sz="1100" dirty="0">
+              <a:solidFill>
+                <a:prstClr val="black"/>
+              </a:solidFill>
+              <a:latin typeface="Arial"/>
+            </a:endParaRPr>
           </a:p>
           <a:p>
             <a:pPr marL="0" indent="0">
               <a:buNone/>
             </a:pPr>
             <a:r>
-              <a:rPr lang="en-US" dirty="0" smtClean="0"/>
-              <a:t>	&lt;/body&gt;</a:t>
-            </a:r>
+              <a:rPr lang="en-US" sz="1100" dirty="0" smtClean="0">
+                <a:solidFill>
+                  <a:srgbClr val="0000FF"/>
+                </a:solidFill>
+                <a:latin typeface="Arial"/>
+              </a:rPr>
+              <a:t>            &lt;/</a:t>
+            </a:r>
+            <a:r>
+              <a:rPr lang="en-US" sz="1100" dirty="0">
+                <a:solidFill>
+                  <a:srgbClr val="800000"/>
+                </a:solidFill>
+                <a:latin typeface="Arial"/>
+              </a:rPr>
+              <a:t>div</a:t>
+            </a:r>
+            <a:r>
+              <a:rPr lang="en-US" sz="1100" dirty="0">
+                <a:solidFill>
+                  <a:srgbClr val="0000FF"/>
+                </a:solidFill>
+                <a:latin typeface="Arial"/>
+              </a:rPr>
+              <a:t>&gt;</a:t>
+            </a:r>
+            <a:endParaRPr lang="en-US" sz="1100" dirty="0">
+              <a:solidFill>
+                <a:prstClr val="black"/>
+              </a:solidFill>
+              <a:latin typeface="Arial"/>
+            </a:endParaRPr>
           </a:p>
           <a:p>
             <a:pPr marL="0" indent="0">
               <a:buNone/>
             </a:pPr>
             <a:r>
-              <a:rPr lang="en-US" dirty="0" smtClean="0"/>
-              <a:t>	&lt;/html&gt;&lt;html&gt; &lt;body&gt; &lt;script type="text/</a:t>
-            </a:r>
-            <a:r>
-              <a:rPr lang="en-US" dirty="0" err="1" smtClean="0"/>
-              <a:t>javascript</a:t>
-            </a:r>
-            <a:r>
-              <a:rPr lang="en-US" dirty="0" smtClean="0"/>
-              <a:t>"&gt; </a:t>
-            </a:r>
-            <a:r>
-              <a:rPr lang="en-US" dirty="0" err="1" smtClean="0"/>
-              <a:t>document.write</a:t>
-            </a:r>
-            <a:r>
-              <a:rPr lang="en-US" dirty="0" smtClean="0"/>
-              <a:t>("Program to illustrate memory leak via closure"); </a:t>
-            </a:r>
-            <a:r>
-              <a:rPr lang="en-US" dirty="0" err="1" smtClean="0"/>
-              <a:t>window.onload</a:t>
-            </a:r>
-            <a:r>
-              <a:rPr lang="en-US" dirty="0" smtClean="0"/>
-              <a:t>=function </a:t>
-            </a:r>
-            <a:r>
-              <a:rPr lang="en-US" dirty="0" err="1" smtClean="0"/>
-              <a:t>outerFunction</a:t>
-            </a:r>
-            <a:r>
-              <a:rPr lang="en-US" dirty="0" smtClean="0"/>
-              <a:t>(){ </a:t>
-            </a:r>
-            <a:r>
-              <a:rPr lang="en-US" dirty="0" err="1" smtClean="0"/>
-              <a:t>var</a:t>
-            </a:r>
-            <a:r>
-              <a:rPr lang="en-US" dirty="0" smtClean="0"/>
-              <a:t> </a:t>
-            </a:r>
-            <a:r>
-              <a:rPr lang="en-US" dirty="0" err="1" smtClean="0"/>
-              <a:t>obj</a:t>
-            </a:r>
-            <a:r>
-              <a:rPr lang="en-US" dirty="0" smtClean="0"/>
-              <a:t> = </a:t>
-            </a:r>
-            <a:r>
-              <a:rPr lang="en-US" dirty="0" err="1" smtClean="0"/>
-              <a:t>document.getElementById</a:t>
-            </a:r>
-            <a:r>
-              <a:rPr lang="en-US" dirty="0" smtClean="0"/>
-              <a:t>("element"); </a:t>
-            </a:r>
-            <a:r>
-              <a:rPr lang="en-US" dirty="0" err="1" smtClean="0"/>
-              <a:t>obj.onclick</a:t>
-            </a:r>
-            <a:r>
-              <a:rPr lang="en-US" dirty="0" smtClean="0"/>
-              <a:t>=function </a:t>
-            </a:r>
-            <a:r>
-              <a:rPr lang="en-US" dirty="0" err="1" smtClean="0"/>
-              <a:t>innerFunction</a:t>
-            </a:r>
-            <a:r>
-              <a:rPr lang="en-US" dirty="0" smtClean="0"/>
-              <a:t>(){ alert("Hi! I will leak"); }; </a:t>
-            </a:r>
-            <a:r>
-              <a:rPr lang="en-US" dirty="0" err="1" smtClean="0"/>
-              <a:t>obj.bigString</a:t>
-            </a:r>
-            <a:r>
-              <a:rPr lang="en-US" dirty="0" smtClean="0"/>
-              <a:t>=new Array(1000).join(new Array(2000).join("XXXXX")); // This is used to make the leak significant }; &lt;/script&gt; &lt;button id="element"&gt;Click Me&lt;/button&gt; &lt;/body&gt; &lt;/html&gt;&lt;html&gt; &lt;body&gt; &lt;script type="text/</a:t>
-            </a:r>
-            <a:r>
-              <a:rPr lang="en-US" dirty="0" err="1" smtClean="0"/>
-              <a:t>javascript</a:t>
-            </a:r>
-            <a:r>
-              <a:rPr lang="en-US" dirty="0" smtClean="0"/>
-              <a:t>"&gt; </a:t>
-            </a:r>
-            <a:r>
-              <a:rPr lang="en-US" dirty="0" err="1" smtClean="0"/>
-              <a:t>document.write</a:t>
-            </a:r>
-            <a:r>
-              <a:rPr lang="en-US" dirty="0" smtClean="0"/>
-              <a:t>("Program to illustrate memory leak via closure"); </a:t>
-            </a:r>
-            <a:r>
-              <a:rPr lang="en-US" dirty="0" err="1" smtClean="0"/>
-              <a:t>window.onload</a:t>
-            </a:r>
-            <a:r>
-              <a:rPr lang="en-US" dirty="0" smtClean="0"/>
-              <a:t>=function </a:t>
-            </a:r>
-            <a:r>
-              <a:rPr lang="en-US" dirty="0" err="1" smtClean="0"/>
-              <a:t>outerFunction</a:t>
-            </a:r>
-            <a:r>
-              <a:rPr lang="en-US" dirty="0" smtClean="0"/>
-              <a:t>(){ </a:t>
-            </a:r>
-            <a:r>
-              <a:rPr lang="en-US" dirty="0" err="1" smtClean="0"/>
-              <a:t>var</a:t>
-            </a:r>
-            <a:r>
-              <a:rPr lang="en-US" dirty="0" smtClean="0"/>
-              <a:t> </a:t>
-            </a:r>
-            <a:r>
-              <a:rPr lang="en-US" dirty="0" err="1" smtClean="0"/>
-              <a:t>obj</a:t>
-            </a:r>
-            <a:r>
-              <a:rPr lang="en-US" dirty="0" smtClean="0"/>
-              <a:t> = </a:t>
-            </a:r>
-            <a:r>
-              <a:rPr lang="en-US" dirty="0" err="1" smtClean="0"/>
-              <a:t>document.getElementById</a:t>
-            </a:r>
-            <a:r>
-              <a:rPr lang="en-US" dirty="0" smtClean="0"/>
-              <a:t>("element"); </a:t>
-            </a:r>
-            <a:r>
-              <a:rPr lang="en-US" dirty="0" err="1" smtClean="0"/>
-              <a:t>obj.onclick</a:t>
-            </a:r>
-            <a:r>
-              <a:rPr lang="en-US" dirty="0" smtClean="0"/>
-              <a:t>=function </a:t>
-            </a:r>
-            <a:r>
-              <a:rPr lang="en-US" dirty="0" err="1" smtClean="0"/>
-              <a:t>innerFunction</a:t>
-            </a:r>
-            <a:r>
-              <a:rPr lang="en-US" dirty="0" smtClean="0"/>
-              <a:t>(){ alert("Hi! I will leak"); }; </a:t>
-            </a:r>
-            <a:r>
-              <a:rPr lang="en-US" dirty="0" err="1" smtClean="0"/>
-              <a:t>obj.bigString</a:t>
-            </a:r>
-            <a:r>
-              <a:rPr lang="en-US" dirty="0" smtClean="0"/>
-              <a:t>=new Array(1000).join(new Array(2000).join("XXXXX")); // This is used to make the leak significant }; &lt;/script&gt; &lt;button id="element"&gt;Click Me&lt;/button&gt; &lt;/body&gt; &lt;/html&gt;</a:t>
-            </a:r>
-            <a:endParaRPr lang="en-US" dirty="0"/>
+              <a:rPr lang="en-US" sz="1100" dirty="0" smtClean="0">
+                <a:solidFill>
+                  <a:srgbClr val="0000FF"/>
+                </a:solidFill>
+                <a:latin typeface="Arial"/>
+              </a:rPr>
+              <a:t>     &lt;/</a:t>
+            </a:r>
+            <a:r>
+              <a:rPr lang="en-US" sz="1100" dirty="0">
+                <a:solidFill>
+                  <a:srgbClr val="800000"/>
+                </a:solidFill>
+                <a:latin typeface="Arial"/>
+              </a:rPr>
+              <a:t>div</a:t>
+            </a:r>
+            <a:r>
+              <a:rPr lang="en-US" sz="1100" dirty="0">
+                <a:solidFill>
+                  <a:srgbClr val="0000FF"/>
+                </a:solidFill>
+                <a:latin typeface="Arial"/>
+              </a:rPr>
+              <a:t>&gt;</a:t>
+            </a:r>
+          </a:p>
+          <a:p>
+            <a:pPr marL="0" indent="0">
+              <a:buNone/>
+            </a:pPr>
+            <a:r>
+              <a:rPr lang="en-US" sz="1100" dirty="0">
+                <a:solidFill>
+                  <a:srgbClr val="0000FF"/>
+                </a:solidFill>
+                <a:latin typeface="Arial"/>
+              </a:rPr>
+              <a:t>&lt;/</a:t>
+            </a:r>
+            <a:r>
+              <a:rPr lang="en-US" sz="1100" dirty="0">
+                <a:solidFill>
+                  <a:srgbClr val="800000"/>
+                </a:solidFill>
+                <a:latin typeface="Arial"/>
+              </a:rPr>
+              <a:t>body</a:t>
+            </a:r>
+            <a:r>
+              <a:rPr lang="en-US" sz="1100" dirty="0">
+                <a:solidFill>
+                  <a:srgbClr val="0000FF"/>
+                </a:solidFill>
+                <a:latin typeface="Arial"/>
+              </a:rPr>
+              <a:t>&gt;</a:t>
+            </a:r>
+          </a:p>
+          <a:p>
+            <a:pPr marL="0" indent="0">
+              <a:buNone/>
+            </a:pPr>
+            <a:endParaRPr lang="en-US" sz="500" dirty="0"/>
           </a:p>
         </p:txBody>
       </p:sp>
@@ -3896,6 +4794,13 @@
   <p:clrMapOvr>
     <a:masterClrMapping/>
   </p:clrMapOvr>
+  <p:timing>
+    <p:tnLst>
+      <p:par>
+        <p:cTn id="1" dur="indefinite" restart="never" nodeType="tmRoot"/>
+      </p:par>
+    </p:tnLst>
+  </p:timing>
 </p:sld>
 </file>
 
@@ -3964,7 +4869,7 @@
         </p:blipFill>
         <p:spPr bwMode="auto">
           <a:xfrm>
-            <a:off x="457200" y="2362200"/>
+            <a:off x="152400" y="2362200"/>
             <a:ext cx="3962400" cy="2924175"/>
           </a:xfrm>
           <a:prstGeom prst="rect">
@@ -3982,6 +4887,1040 @@
           </a:extLst>
         </p:spPr>
       </p:pic>
+      <p:sp>
+        <p:nvSpPr>
+          <p:cNvPr id="3" name="TextBox 2"/>
+          <p:cNvSpPr txBox="1"/>
+          <p:nvPr/>
+        </p:nvSpPr>
+        <p:spPr>
+          <a:xfrm>
+            <a:off x="4343400" y="1371600"/>
+            <a:ext cx="4419600" cy="5355312"/>
+          </a:xfrm>
+          <a:prstGeom prst="rect">
+            <a:avLst/>
+          </a:prstGeom>
+          <a:noFill/>
+        </p:spPr>
+        <p:txBody>
+          <a:bodyPr wrap="square" rtlCol="0">
+            <a:spAutoFit/>
+          </a:bodyPr>
+          <a:lstStyle/>
+          <a:p>
+            <a:r>
+              <a:rPr lang="en-US" sz="1200" dirty="0">
+                <a:solidFill>
+                  <a:srgbClr val="0000FF"/>
+                </a:solidFill>
+                <a:latin typeface="Arial"/>
+              </a:rPr>
+              <a:t>&lt;</a:t>
+            </a:r>
+            <a:r>
+              <a:rPr lang="en-US" sz="1200" dirty="0" smtClean="0">
+                <a:solidFill>
+                  <a:srgbClr val="800000"/>
+                </a:solidFill>
+                <a:latin typeface="Arial"/>
+              </a:rPr>
+              <a:t>head</a:t>
+            </a:r>
+            <a:r>
+              <a:rPr lang="en-US" sz="1200" dirty="0" smtClean="0">
+                <a:solidFill>
+                  <a:srgbClr val="0000FF"/>
+                </a:solidFill>
+                <a:latin typeface="Arial"/>
+              </a:rPr>
+              <a:t>&gt;</a:t>
+            </a:r>
+            <a:endParaRPr lang="en-US" sz="1200" dirty="0">
+              <a:solidFill>
+                <a:prstClr val="black"/>
+              </a:solidFill>
+              <a:latin typeface="Arial"/>
+            </a:endParaRPr>
+          </a:p>
+          <a:p>
+            <a:r>
+              <a:rPr lang="en-US" sz="1200" dirty="0" smtClean="0">
+                <a:solidFill>
+                  <a:srgbClr val="0000FF"/>
+                </a:solidFill>
+                <a:latin typeface="Arial"/>
+              </a:rPr>
+              <a:t>&lt;</a:t>
+            </a:r>
+            <a:r>
+              <a:rPr lang="en-US" sz="1200" dirty="0">
+                <a:solidFill>
+                  <a:srgbClr val="800000"/>
+                </a:solidFill>
+                <a:latin typeface="Arial"/>
+              </a:rPr>
+              <a:t>title</a:t>
+            </a:r>
+            <a:r>
+              <a:rPr lang="en-US" sz="1200" dirty="0">
+                <a:solidFill>
+                  <a:srgbClr val="0000FF"/>
+                </a:solidFill>
+                <a:latin typeface="Arial"/>
+              </a:rPr>
+              <a:t>&gt;&lt;/</a:t>
+            </a:r>
+            <a:r>
+              <a:rPr lang="en-US" sz="1200" dirty="0">
+                <a:solidFill>
+                  <a:srgbClr val="800000"/>
+                </a:solidFill>
+                <a:latin typeface="Arial"/>
+              </a:rPr>
+              <a:t>title</a:t>
+            </a:r>
+            <a:r>
+              <a:rPr lang="en-US" sz="1200" dirty="0">
+                <a:solidFill>
+                  <a:srgbClr val="0000FF"/>
+                </a:solidFill>
+                <a:latin typeface="Arial"/>
+              </a:rPr>
+              <a:t>&gt;</a:t>
+            </a:r>
+            <a:endParaRPr lang="en-US" sz="1200" dirty="0">
+              <a:solidFill>
+                <a:prstClr val="black"/>
+              </a:solidFill>
+              <a:latin typeface="Arial"/>
+            </a:endParaRPr>
+          </a:p>
+          <a:p>
+            <a:r>
+              <a:rPr lang="en-US" sz="1200" dirty="0" smtClean="0">
+                <a:solidFill>
+                  <a:srgbClr val="0000FF"/>
+                </a:solidFill>
+                <a:latin typeface="Arial"/>
+              </a:rPr>
+              <a:t/>
+            </a:r>
+            <a:br>
+              <a:rPr lang="en-US" sz="1200" dirty="0" smtClean="0">
+                <a:solidFill>
+                  <a:srgbClr val="0000FF"/>
+                </a:solidFill>
+                <a:latin typeface="Arial"/>
+              </a:rPr>
+            </a:br>
+            <a:r>
+              <a:rPr lang="en-US" sz="1200" dirty="0" smtClean="0">
+                <a:solidFill>
+                  <a:srgbClr val="0000FF"/>
+                </a:solidFill>
+                <a:latin typeface="Arial"/>
+              </a:rPr>
+              <a:t>&lt;</a:t>
+            </a:r>
+            <a:r>
+              <a:rPr lang="en-US" sz="1200" dirty="0">
+                <a:solidFill>
+                  <a:srgbClr val="800000"/>
+                </a:solidFill>
+                <a:latin typeface="Arial"/>
+              </a:rPr>
+              <a:t>script</a:t>
+            </a:r>
+            <a:r>
+              <a:rPr lang="en-US" sz="1200" dirty="0">
+                <a:solidFill>
+                  <a:prstClr val="black"/>
+                </a:solidFill>
+                <a:latin typeface="Arial"/>
+              </a:rPr>
+              <a:t> </a:t>
+            </a:r>
+            <a:r>
+              <a:rPr lang="en-US" sz="1200" dirty="0">
+                <a:solidFill>
+                  <a:srgbClr val="FF0000"/>
+                </a:solidFill>
+                <a:latin typeface="Arial"/>
+              </a:rPr>
+              <a:t>type</a:t>
+            </a:r>
+            <a:r>
+              <a:rPr lang="en-US" sz="1200" dirty="0">
+                <a:solidFill>
+                  <a:srgbClr val="0000FF"/>
+                </a:solidFill>
+                <a:latin typeface="Arial"/>
+              </a:rPr>
+              <a:t>="text/</a:t>
+            </a:r>
+            <a:r>
+              <a:rPr lang="en-US" sz="1200" dirty="0" err="1">
+                <a:solidFill>
+                  <a:srgbClr val="0000FF"/>
+                </a:solidFill>
+                <a:latin typeface="Arial"/>
+              </a:rPr>
+              <a:t>javascript</a:t>
+            </a:r>
+            <a:r>
+              <a:rPr lang="en-US" sz="1200" dirty="0">
+                <a:solidFill>
+                  <a:srgbClr val="0000FF"/>
+                </a:solidFill>
+                <a:latin typeface="Arial"/>
+              </a:rPr>
+              <a:t>"&gt;</a:t>
+            </a:r>
+            <a:endParaRPr lang="en-US" sz="1200" dirty="0">
+              <a:solidFill>
+                <a:prstClr val="black"/>
+              </a:solidFill>
+              <a:latin typeface="Arial"/>
+            </a:endParaRPr>
+          </a:p>
+          <a:p>
+            <a:r>
+              <a:rPr lang="en-US" sz="1200" dirty="0" err="1">
+                <a:solidFill>
+                  <a:srgbClr val="0000FF"/>
+                </a:solidFill>
+                <a:latin typeface="Arial"/>
+              </a:rPr>
+              <a:t>var</a:t>
+            </a:r>
+            <a:r>
+              <a:rPr lang="en-US" sz="1200" dirty="0">
+                <a:solidFill>
+                  <a:prstClr val="black"/>
+                </a:solidFill>
+                <a:latin typeface="Arial"/>
+              </a:rPr>
+              <a:t> </a:t>
+            </a:r>
+            <a:r>
+              <a:rPr lang="en-US" sz="1200" dirty="0" err="1">
+                <a:solidFill>
+                  <a:prstClr val="black"/>
+                </a:solidFill>
+                <a:latin typeface="Arial"/>
+              </a:rPr>
+              <a:t>myGlobalObject</a:t>
+            </a:r>
+            <a:r>
+              <a:rPr lang="en-US" sz="1200" dirty="0">
+                <a:solidFill>
+                  <a:prstClr val="black"/>
+                </a:solidFill>
+                <a:latin typeface="Arial"/>
+              </a:rPr>
+              <a:t>;</a:t>
+            </a:r>
+          </a:p>
+          <a:p>
+            <a:r>
+              <a:rPr lang="en-US" sz="1200" dirty="0">
+                <a:solidFill>
+                  <a:srgbClr val="0000FF"/>
+                </a:solidFill>
+                <a:latin typeface="Arial"/>
+              </a:rPr>
+              <a:t>function</a:t>
+            </a:r>
+            <a:r>
+              <a:rPr lang="en-US" sz="1200" dirty="0">
+                <a:solidFill>
+                  <a:prstClr val="black"/>
+                </a:solidFill>
+                <a:latin typeface="Arial"/>
+              </a:rPr>
+              <a:t> </a:t>
+            </a:r>
+            <a:r>
+              <a:rPr lang="en-US" sz="1200" dirty="0" err="1">
+                <a:solidFill>
+                  <a:prstClr val="black"/>
+                </a:solidFill>
+                <a:latin typeface="Arial"/>
+              </a:rPr>
+              <a:t>SetupLeak</a:t>
+            </a:r>
+            <a:r>
+              <a:rPr lang="en-US" sz="1200" dirty="0">
+                <a:solidFill>
+                  <a:prstClr val="black"/>
+                </a:solidFill>
+                <a:latin typeface="Arial"/>
+              </a:rPr>
+              <a:t>()</a:t>
+            </a:r>
+          </a:p>
+          <a:p>
+            <a:r>
+              <a:rPr lang="en-US" sz="1200" dirty="0">
+                <a:solidFill>
+                  <a:prstClr val="black"/>
+                </a:solidFill>
+                <a:latin typeface="Arial"/>
+              </a:rPr>
+              <a:t>{</a:t>
+            </a:r>
+          </a:p>
+          <a:p>
+            <a:r>
+              <a:rPr lang="en-US" sz="1200" dirty="0" smtClean="0">
+                <a:solidFill>
+                  <a:srgbClr val="006400"/>
+                </a:solidFill>
+                <a:latin typeface="Arial"/>
+              </a:rPr>
+              <a:t>   // </a:t>
+            </a:r>
+            <a:r>
+              <a:rPr lang="en-US" sz="1200" dirty="0">
+                <a:solidFill>
+                  <a:srgbClr val="006400"/>
+                </a:solidFill>
+                <a:latin typeface="Arial"/>
+              </a:rPr>
+              <a:t>First set up the script scope to element reference</a:t>
+            </a:r>
+            <a:endParaRPr lang="en-US" sz="1200" dirty="0">
+              <a:solidFill>
+                <a:prstClr val="black"/>
+              </a:solidFill>
+              <a:latin typeface="Arial"/>
+            </a:endParaRPr>
+          </a:p>
+          <a:p>
+            <a:r>
+              <a:rPr lang="en-US" sz="1200" dirty="0">
+                <a:solidFill>
+                  <a:prstClr val="black"/>
+                </a:solidFill>
+                <a:latin typeface="Arial"/>
+              </a:rPr>
+              <a:t> </a:t>
+            </a:r>
+            <a:r>
+              <a:rPr lang="en-US" sz="1200" dirty="0" smtClean="0">
+                <a:solidFill>
+                  <a:prstClr val="black"/>
+                </a:solidFill>
+                <a:latin typeface="Arial"/>
+              </a:rPr>
+              <a:t>  </a:t>
+            </a:r>
+            <a:r>
+              <a:rPr lang="en-US" sz="1200" dirty="0" err="1" smtClean="0">
+                <a:solidFill>
+                  <a:prstClr val="black"/>
+                </a:solidFill>
+                <a:latin typeface="Arial"/>
+              </a:rPr>
+              <a:t>myGlobalObject</a:t>
+            </a:r>
+            <a:r>
+              <a:rPr lang="en-US" sz="1200" dirty="0" smtClean="0">
+                <a:solidFill>
+                  <a:prstClr val="black"/>
+                </a:solidFill>
+                <a:latin typeface="Arial"/>
+              </a:rPr>
+              <a:t> </a:t>
+            </a:r>
+            <a:r>
+              <a:rPr lang="en-US" sz="1200" dirty="0">
+                <a:solidFill>
+                  <a:prstClr val="black"/>
+                </a:solidFill>
+                <a:latin typeface="Arial"/>
+              </a:rPr>
+              <a:t>= </a:t>
+            </a:r>
+            <a:r>
+              <a:rPr lang="en-US" sz="1200" dirty="0" err="1">
+                <a:solidFill>
+                  <a:prstClr val="black"/>
+                </a:solidFill>
+                <a:latin typeface="Arial"/>
+              </a:rPr>
+              <a:t>document.getElementById</a:t>
+            </a:r>
+            <a:r>
+              <a:rPr lang="en-US" sz="1200" dirty="0">
+                <a:solidFill>
+                  <a:prstClr val="black"/>
+                </a:solidFill>
+                <a:latin typeface="Arial"/>
+              </a:rPr>
+              <a:t>(</a:t>
+            </a:r>
+            <a:r>
+              <a:rPr lang="en-US" sz="1200" dirty="0">
+                <a:solidFill>
+                  <a:srgbClr val="800000"/>
+                </a:solidFill>
+                <a:latin typeface="Arial"/>
+              </a:rPr>
+              <a:t>"</a:t>
+            </a:r>
+            <a:r>
+              <a:rPr lang="en-US" sz="1200" dirty="0" err="1">
+                <a:solidFill>
+                  <a:srgbClr val="800000"/>
+                </a:solidFill>
+                <a:latin typeface="Arial"/>
+              </a:rPr>
+              <a:t>LeakedDiv</a:t>
+            </a:r>
+            <a:r>
+              <a:rPr lang="en-US" sz="1200" dirty="0">
+                <a:solidFill>
+                  <a:srgbClr val="800000"/>
+                </a:solidFill>
+                <a:latin typeface="Arial"/>
+              </a:rPr>
+              <a:t>"</a:t>
+            </a:r>
+            <a:r>
+              <a:rPr lang="en-US" sz="1200" dirty="0">
+                <a:solidFill>
+                  <a:prstClr val="black"/>
+                </a:solidFill>
+                <a:latin typeface="Arial"/>
+              </a:rPr>
+              <a:t>);</a:t>
+            </a:r>
+          </a:p>
+          <a:p>
+            <a:endParaRPr lang="en-US" sz="1200" dirty="0">
+              <a:solidFill>
+                <a:prstClr val="black"/>
+              </a:solidFill>
+              <a:latin typeface="Arial"/>
+            </a:endParaRPr>
+          </a:p>
+          <a:p>
+            <a:r>
+              <a:rPr lang="en-US" sz="1200" dirty="0" smtClean="0">
+                <a:solidFill>
+                  <a:srgbClr val="006400"/>
+                </a:solidFill>
+                <a:latin typeface="Arial"/>
+              </a:rPr>
+              <a:t>    // </a:t>
+            </a:r>
+            <a:r>
+              <a:rPr lang="en-US" sz="1200" dirty="0">
+                <a:solidFill>
+                  <a:srgbClr val="006400"/>
+                </a:solidFill>
+                <a:latin typeface="Arial"/>
+              </a:rPr>
+              <a:t>Next set up the element to script scope reference</a:t>
+            </a:r>
+            <a:endParaRPr lang="en-US" sz="1200" dirty="0">
+              <a:solidFill>
+                <a:prstClr val="black"/>
+              </a:solidFill>
+              <a:latin typeface="Arial"/>
+            </a:endParaRPr>
+          </a:p>
+          <a:p>
+            <a:r>
+              <a:rPr lang="en-US" sz="1200" dirty="0" smtClean="0">
+                <a:solidFill>
+                  <a:prstClr val="black"/>
+                </a:solidFill>
+                <a:latin typeface="Arial"/>
+              </a:rPr>
+              <a:t>    </a:t>
+            </a:r>
+            <a:r>
+              <a:rPr lang="en-US" sz="1200" dirty="0" err="1" smtClean="0">
+                <a:solidFill>
+                  <a:prstClr val="black"/>
+                </a:solidFill>
+                <a:latin typeface="Arial"/>
+              </a:rPr>
+              <a:t>document.getElementById</a:t>
+            </a:r>
+            <a:r>
+              <a:rPr lang="en-US" sz="1200" dirty="0">
+                <a:solidFill>
+                  <a:prstClr val="black"/>
+                </a:solidFill>
+                <a:latin typeface="Arial"/>
+              </a:rPr>
+              <a:t>(</a:t>
+            </a:r>
+            <a:r>
+              <a:rPr lang="en-US" sz="1200" dirty="0">
+                <a:solidFill>
+                  <a:srgbClr val="800000"/>
+                </a:solidFill>
+                <a:latin typeface="Arial"/>
+              </a:rPr>
+              <a:t>"</a:t>
+            </a:r>
+            <a:r>
+              <a:rPr lang="en-US" sz="1200" dirty="0" err="1">
+                <a:solidFill>
+                  <a:srgbClr val="800000"/>
+                </a:solidFill>
+                <a:latin typeface="Arial"/>
+              </a:rPr>
+              <a:t>LeakedDiv</a:t>
+            </a:r>
+            <a:r>
+              <a:rPr lang="en-US" sz="1200" dirty="0">
+                <a:solidFill>
+                  <a:srgbClr val="800000"/>
+                </a:solidFill>
+                <a:latin typeface="Arial"/>
+              </a:rPr>
+              <a:t>"</a:t>
+            </a:r>
+            <a:r>
+              <a:rPr lang="en-US" sz="1200" dirty="0">
+                <a:solidFill>
+                  <a:prstClr val="black"/>
+                </a:solidFill>
+                <a:latin typeface="Arial"/>
+              </a:rPr>
+              <a:t>).</a:t>
+            </a:r>
+            <a:r>
+              <a:rPr lang="en-US" sz="1200" dirty="0" err="1">
+                <a:solidFill>
+                  <a:prstClr val="black"/>
+                </a:solidFill>
+                <a:latin typeface="Arial"/>
+              </a:rPr>
+              <a:t>expandoProperty</a:t>
+            </a:r>
+            <a:r>
+              <a:rPr lang="en-US" sz="1200" dirty="0">
+                <a:solidFill>
+                  <a:prstClr val="black"/>
+                </a:solidFill>
+                <a:latin typeface="Arial"/>
+              </a:rPr>
+              <a:t> =</a:t>
+            </a:r>
+          </a:p>
+          <a:p>
+            <a:r>
+              <a:rPr lang="en-US" sz="1200" dirty="0" smtClean="0">
+                <a:solidFill>
+                  <a:prstClr val="black"/>
+                </a:solidFill>
+                <a:latin typeface="Arial"/>
+              </a:rPr>
+              <a:t>    </a:t>
+            </a:r>
+            <a:r>
+              <a:rPr lang="en-US" sz="1200" dirty="0" err="1" smtClean="0">
+                <a:solidFill>
+                  <a:prstClr val="black"/>
+                </a:solidFill>
+                <a:latin typeface="Arial"/>
+              </a:rPr>
+              <a:t>myGlobalObject</a:t>
+            </a:r>
+            <a:r>
+              <a:rPr lang="en-US" sz="1200" dirty="0">
+                <a:solidFill>
+                  <a:prstClr val="black"/>
+                </a:solidFill>
+                <a:latin typeface="Arial"/>
+              </a:rPr>
+              <a:t>;</a:t>
+            </a:r>
+          </a:p>
+          <a:p>
+            <a:r>
+              <a:rPr lang="en-US" sz="1200" dirty="0" smtClean="0">
+                <a:solidFill>
+                  <a:prstClr val="black"/>
+                </a:solidFill>
+                <a:latin typeface="Arial"/>
+              </a:rPr>
+              <a:t>  }</a:t>
+            </a:r>
+            <a:endParaRPr lang="en-US" sz="1200" dirty="0">
+              <a:solidFill>
+                <a:prstClr val="black"/>
+              </a:solidFill>
+              <a:latin typeface="Arial"/>
+            </a:endParaRPr>
+          </a:p>
+          <a:p>
+            <a:r>
+              <a:rPr lang="en-US" sz="1200" dirty="0">
+                <a:solidFill>
+                  <a:srgbClr val="0000FF"/>
+                </a:solidFill>
+                <a:latin typeface="Arial"/>
+              </a:rPr>
+              <a:t>&lt;/</a:t>
+            </a:r>
+            <a:r>
+              <a:rPr lang="en-US" sz="1200" dirty="0">
+                <a:solidFill>
+                  <a:srgbClr val="800000"/>
+                </a:solidFill>
+                <a:latin typeface="Arial"/>
+              </a:rPr>
+              <a:t>script</a:t>
+            </a:r>
+            <a:r>
+              <a:rPr lang="en-US" sz="1200" dirty="0">
+                <a:solidFill>
+                  <a:srgbClr val="0000FF"/>
+                </a:solidFill>
+                <a:latin typeface="Arial"/>
+              </a:rPr>
+              <a:t>&gt;</a:t>
+            </a:r>
+            <a:endParaRPr lang="en-US" sz="1200" dirty="0">
+              <a:solidFill>
+                <a:prstClr val="black"/>
+              </a:solidFill>
+              <a:latin typeface="Arial"/>
+            </a:endParaRPr>
+          </a:p>
+          <a:p>
+            <a:r>
+              <a:rPr lang="en-US" sz="1200" dirty="0" smtClean="0">
+                <a:solidFill>
+                  <a:srgbClr val="0000FF"/>
+                </a:solidFill>
+                <a:latin typeface="Arial"/>
+              </a:rPr>
+              <a:t/>
+            </a:r>
+            <a:br>
+              <a:rPr lang="en-US" sz="1200" dirty="0" smtClean="0">
+                <a:solidFill>
+                  <a:srgbClr val="0000FF"/>
+                </a:solidFill>
+                <a:latin typeface="Arial"/>
+              </a:rPr>
+            </a:br>
+            <a:r>
+              <a:rPr lang="en-US" sz="1200" dirty="0" smtClean="0">
+                <a:solidFill>
+                  <a:srgbClr val="0000FF"/>
+                </a:solidFill>
+                <a:latin typeface="Arial"/>
+              </a:rPr>
+              <a:t>&lt;/</a:t>
+            </a:r>
+            <a:r>
+              <a:rPr lang="en-US" sz="1200" dirty="0">
+                <a:solidFill>
+                  <a:srgbClr val="800000"/>
+                </a:solidFill>
+                <a:latin typeface="Arial"/>
+              </a:rPr>
+              <a:t>head</a:t>
+            </a:r>
+            <a:r>
+              <a:rPr lang="en-US" sz="1200" dirty="0" smtClean="0">
+                <a:solidFill>
+                  <a:srgbClr val="0000FF"/>
+                </a:solidFill>
+                <a:latin typeface="Arial"/>
+              </a:rPr>
+              <a:t>&gt;</a:t>
+            </a:r>
+            <a:br>
+              <a:rPr lang="en-US" sz="1200" dirty="0" smtClean="0">
+                <a:solidFill>
+                  <a:srgbClr val="0000FF"/>
+                </a:solidFill>
+                <a:latin typeface="Arial"/>
+              </a:rPr>
+            </a:br>
+            <a:r>
+              <a:rPr lang="en-US" sz="1200" dirty="0" smtClean="0">
+                <a:solidFill>
+                  <a:srgbClr val="0000FF"/>
+                </a:solidFill>
+                <a:latin typeface="Arial"/>
+              </a:rPr>
+              <a:t/>
+            </a:r>
+            <a:br>
+              <a:rPr lang="en-US" sz="1200" dirty="0" smtClean="0">
+                <a:solidFill>
+                  <a:srgbClr val="0000FF"/>
+                </a:solidFill>
+                <a:latin typeface="Arial"/>
+              </a:rPr>
+            </a:br>
+            <a:r>
+              <a:rPr lang="en-US" sz="1200" dirty="0" smtClean="0">
+                <a:solidFill>
+                  <a:srgbClr val="0000FF"/>
+                </a:solidFill>
+                <a:latin typeface="Arial"/>
+              </a:rPr>
+              <a:t>&lt;</a:t>
+            </a:r>
+            <a:r>
+              <a:rPr lang="en-US" sz="1200" dirty="0">
+                <a:solidFill>
+                  <a:srgbClr val="800000"/>
+                </a:solidFill>
+                <a:latin typeface="Arial"/>
+              </a:rPr>
+              <a:t>body</a:t>
+            </a:r>
+            <a:r>
+              <a:rPr lang="en-US" sz="1200" dirty="0">
+                <a:solidFill>
+                  <a:prstClr val="black"/>
+                </a:solidFill>
+                <a:latin typeface="Arial"/>
+              </a:rPr>
+              <a:t> </a:t>
+            </a:r>
+            <a:r>
+              <a:rPr lang="en-US" sz="1200" dirty="0" err="1">
+                <a:solidFill>
+                  <a:srgbClr val="FF0000"/>
+                </a:solidFill>
+                <a:latin typeface="Arial"/>
+              </a:rPr>
+              <a:t>onload</a:t>
+            </a:r>
+            <a:r>
+              <a:rPr lang="en-US" sz="1200" dirty="0">
+                <a:solidFill>
+                  <a:srgbClr val="0000FF"/>
+                </a:solidFill>
+                <a:latin typeface="Arial"/>
+              </a:rPr>
+              <a:t>="</a:t>
+            </a:r>
+            <a:r>
+              <a:rPr lang="en-US" sz="1200" dirty="0" err="1">
+                <a:solidFill>
+                  <a:srgbClr val="0000FF"/>
+                </a:solidFill>
+                <a:latin typeface="Arial"/>
+              </a:rPr>
+              <a:t>SetupLeak</a:t>
+            </a:r>
+            <a:r>
+              <a:rPr lang="en-US" sz="1200" dirty="0">
+                <a:solidFill>
+                  <a:srgbClr val="0000FF"/>
+                </a:solidFill>
+                <a:latin typeface="Arial"/>
+              </a:rPr>
+              <a:t>()"&gt;</a:t>
+            </a:r>
+            <a:endParaRPr lang="en-US" sz="1200" dirty="0">
+              <a:solidFill>
+                <a:prstClr val="black"/>
+              </a:solidFill>
+              <a:latin typeface="Arial"/>
+            </a:endParaRPr>
+          </a:p>
+          <a:p>
+            <a:r>
+              <a:rPr lang="en-US" sz="1200" dirty="0" smtClean="0">
+                <a:solidFill>
+                  <a:srgbClr val="0000FF"/>
+                </a:solidFill>
+                <a:latin typeface="Arial"/>
+              </a:rPr>
+              <a:t>  &lt;</a:t>
+            </a:r>
+            <a:r>
+              <a:rPr lang="en-US" sz="1200" dirty="0">
+                <a:solidFill>
+                  <a:srgbClr val="800000"/>
+                </a:solidFill>
+                <a:latin typeface="Arial"/>
+              </a:rPr>
+              <a:t>div</a:t>
+            </a:r>
+            <a:r>
+              <a:rPr lang="en-US" sz="1200" dirty="0">
+                <a:solidFill>
+                  <a:srgbClr val="0000FF"/>
+                </a:solidFill>
+                <a:latin typeface="Arial"/>
+              </a:rPr>
+              <a:t>&gt;</a:t>
+            </a:r>
+            <a:endParaRPr lang="en-US" sz="1200" dirty="0">
+              <a:solidFill>
+                <a:prstClr val="black"/>
+              </a:solidFill>
+              <a:latin typeface="Arial"/>
+            </a:endParaRPr>
+          </a:p>
+          <a:p>
+            <a:endParaRPr lang="en-US" sz="1200" dirty="0" smtClean="0">
+              <a:solidFill>
+                <a:srgbClr val="0000FF"/>
+              </a:solidFill>
+              <a:latin typeface="Arial"/>
+            </a:endParaRPr>
+          </a:p>
+          <a:p>
+            <a:r>
+              <a:rPr lang="en-US" sz="1200" dirty="0" smtClean="0">
+                <a:solidFill>
+                  <a:srgbClr val="0000FF"/>
+                </a:solidFill>
+                <a:latin typeface="Arial"/>
+              </a:rPr>
+              <a:t>       &lt;</a:t>
+            </a:r>
+            <a:r>
+              <a:rPr lang="en-US" sz="1200" dirty="0">
+                <a:solidFill>
+                  <a:srgbClr val="800000"/>
+                </a:solidFill>
+                <a:latin typeface="Arial"/>
+              </a:rPr>
+              <a:t>div</a:t>
+            </a:r>
+            <a:r>
+              <a:rPr lang="en-US" sz="1200" dirty="0">
+                <a:solidFill>
+                  <a:prstClr val="black"/>
+                </a:solidFill>
+                <a:latin typeface="Arial"/>
+              </a:rPr>
+              <a:t> </a:t>
+            </a:r>
+            <a:r>
+              <a:rPr lang="en-US" sz="1200" dirty="0">
+                <a:solidFill>
+                  <a:srgbClr val="FF0000"/>
+                </a:solidFill>
+                <a:latin typeface="Arial"/>
+              </a:rPr>
+              <a:t>id</a:t>
+            </a:r>
+            <a:r>
+              <a:rPr lang="en-US" sz="1200" dirty="0">
+                <a:solidFill>
+                  <a:srgbClr val="0000FF"/>
+                </a:solidFill>
+                <a:latin typeface="Arial"/>
+              </a:rPr>
+              <a:t>="</a:t>
+            </a:r>
+            <a:r>
+              <a:rPr lang="en-US" sz="1200" dirty="0" err="1">
+                <a:solidFill>
+                  <a:srgbClr val="0000FF"/>
+                </a:solidFill>
+                <a:latin typeface="Arial"/>
+              </a:rPr>
+              <a:t>LeakedDiv</a:t>
+            </a:r>
+            <a:r>
+              <a:rPr lang="en-US" sz="1200" dirty="0">
+                <a:solidFill>
+                  <a:srgbClr val="0000FF"/>
+                </a:solidFill>
+                <a:latin typeface="Arial"/>
+              </a:rPr>
+              <a:t>"&gt;</a:t>
+            </a:r>
+            <a:endParaRPr lang="en-US" sz="1200" dirty="0">
+              <a:solidFill>
+                <a:prstClr val="black"/>
+              </a:solidFill>
+              <a:latin typeface="Arial"/>
+            </a:endParaRPr>
+          </a:p>
+          <a:p>
+            <a:r>
+              <a:rPr lang="en-US" sz="1200" dirty="0" smtClean="0">
+                <a:solidFill>
+                  <a:prstClr val="black"/>
+                </a:solidFill>
+                <a:latin typeface="Arial"/>
+              </a:rPr>
+              <a:t>        Leaked </a:t>
+            </a:r>
+            <a:r>
+              <a:rPr lang="en-US" sz="1200" dirty="0" err="1">
+                <a:solidFill>
+                  <a:prstClr val="black"/>
+                </a:solidFill>
+                <a:latin typeface="Arial"/>
+              </a:rPr>
+              <a:t>Div</a:t>
+            </a:r>
+            <a:endParaRPr lang="en-US" sz="1200" dirty="0">
+              <a:solidFill>
+                <a:prstClr val="black"/>
+              </a:solidFill>
+              <a:latin typeface="Arial"/>
+            </a:endParaRPr>
+          </a:p>
+          <a:p>
+            <a:r>
+              <a:rPr lang="en-US" sz="1200" dirty="0" smtClean="0">
+                <a:solidFill>
+                  <a:srgbClr val="0000FF"/>
+                </a:solidFill>
+                <a:latin typeface="Arial"/>
+              </a:rPr>
+              <a:t>        &lt;/</a:t>
+            </a:r>
+            <a:r>
+              <a:rPr lang="en-US" sz="1200" dirty="0">
+                <a:solidFill>
+                  <a:srgbClr val="800000"/>
+                </a:solidFill>
+                <a:latin typeface="Arial"/>
+              </a:rPr>
+              <a:t>div</a:t>
+            </a:r>
+            <a:r>
+              <a:rPr lang="en-US" sz="1200" dirty="0">
+                <a:solidFill>
+                  <a:srgbClr val="0000FF"/>
+                </a:solidFill>
+                <a:latin typeface="Arial"/>
+              </a:rPr>
+              <a:t>&gt;</a:t>
+            </a:r>
+            <a:endParaRPr lang="en-US" sz="1200" dirty="0">
+              <a:solidFill>
+                <a:prstClr val="black"/>
+              </a:solidFill>
+              <a:latin typeface="Arial"/>
+            </a:endParaRPr>
+          </a:p>
+          <a:p>
+            <a:endParaRPr lang="en-US" sz="1200" dirty="0" smtClean="0">
+              <a:solidFill>
+                <a:srgbClr val="0000FF"/>
+              </a:solidFill>
+              <a:latin typeface="Arial"/>
+            </a:endParaRPr>
+          </a:p>
+          <a:p>
+            <a:r>
+              <a:rPr lang="en-US" sz="1200" dirty="0" smtClean="0">
+                <a:solidFill>
+                  <a:srgbClr val="0000FF"/>
+                </a:solidFill>
+                <a:latin typeface="Arial"/>
+              </a:rPr>
+              <a:t>     &lt;/</a:t>
+            </a:r>
+            <a:r>
+              <a:rPr lang="en-US" sz="1200" dirty="0">
+                <a:solidFill>
+                  <a:srgbClr val="800000"/>
+                </a:solidFill>
+                <a:latin typeface="Arial"/>
+              </a:rPr>
+              <a:t>div</a:t>
+            </a:r>
+            <a:r>
+              <a:rPr lang="en-US" sz="1200" dirty="0" smtClean="0">
+                <a:solidFill>
+                  <a:srgbClr val="0000FF"/>
+                </a:solidFill>
+                <a:latin typeface="Arial"/>
+              </a:rPr>
+              <a:t>&gt;</a:t>
+            </a:r>
+            <a:r>
+              <a:rPr lang="en-US" sz="1200" dirty="0">
+                <a:solidFill>
+                  <a:srgbClr val="0000FF"/>
+                </a:solidFill>
+                <a:latin typeface="Arial"/>
+              </a:rPr>
+              <a:t> </a:t>
+            </a:r>
+            <a:r>
+              <a:rPr lang="en-US" sz="1200" dirty="0" smtClean="0">
+                <a:solidFill>
+                  <a:srgbClr val="0000FF"/>
+                </a:solidFill>
+                <a:latin typeface="Arial"/>
+              </a:rPr>
+              <a:t/>
+            </a:r>
+            <a:br>
+              <a:rPr lang="en-US" sz="1200" dirty="0" smtClean="0">
+                <a:solidFill>
+                  <a:srgbClr val="0000FF"/>
+                </a:solidFill>
+                <a:latin typeface="Arial"/>
+              </a:rPr>
+            </a:br>
+            <a:r>
+              <a:rPr lang="en-US" sz="1200" dirty="0" smtClean="0">
+                <a:solidFill>
+                  <a:srgbClr val="0000FF"/>
+                </a:solidFill>
+                <a:latin typeface="Arial"/>
+              </a:rPr>
+              <a:t>&lt;/ </a:t>
+            </a:r>
+            <a:r>
+              <a:rPr lang="en-US" sz="1200" dirty="0" smtClean="0">
+                <a:solidFill>
+                  <a:srgbClr val="800000"/>
+                </a:solidFill>
+                <a:latin typeface="Arial"/>
+              </a:rPr>
+              <a:t>body</a:t>
+            </a:r>
+            <a:r>
+              <a:rPr lang="en-US" sz="1200" dirty="0" smtClean="0">
+                <a:solidFill>
+                  <a:srgbClr val="0000FF"/>
+                </a:solidFill>
+                <a:latin typeface="Arial"/>
+              </a:rPr>
+              <a:t>&gt;</a:t>
+            </a:r>
+            <a:r>
+              <a:rPr lang="en-US" sz="1200" dirty="0" smtClean="0">
+                <a:solidFill>
+                  <a:prstClr val="black"/>
+                </a:solidFill>
+                <a:latin typeface="Arial"/>
+              </a:rPr>
+              <a:t> </a:t>
+            </a:r>
+            <a:endParaRPr lang="en-US" sz="1200" dirty="0">
+              <a:solidFill>
+                <a:prstClr val="black"/>
+              </a:solidFill>
+              <a:latin typeface="Arial"/>
+            </a:endParaRPr>
+          </a:p>
+          <a:p>
+            <a:endParaRPr lang="en-US" dirty="0"/>
+          </a:p>
+        </p:txBody>
+      </p:sp>
     </p:spTree>
     <p:extLst>
       <p:ext uri="{BB962C8B-B14F-4D97-AF65-F5344CB8AC3E}">
@@ -3992,151 +5931,17 @@
   <p:clrMapOvr>
     <a:masterClrMapping/>
   </p:clrMapOvr>
+  <p:timing>
+    <p:tnLst>
+      <p:par>
+        <p:cTn id="1" dur="indefinite" restart="never" nodeType="tmRoot"/>
+      </p:par>
+    </p:tnLst>
+  </p:timing>
 </p:sld>
 </file>
 
 <file path=ppt/slides/slide6.xml><?xml version="1.0" encoding="utf-8"?>
-<p:sld xmlns:a="http://schemas.openxmlformats.org/drawingml/2006/main" xmlns:r="http://schemas.openxmlformats.org/officeDocument/2006/relationships" xmlns:p="http://schemas.openxmlformats.org/presentationml/2006/main">
-  <p:cSld>
-    <p:spTree>
-      <p:nvGrpSpPr>
-        <p:cNvPr id="1" name=""/>
-        <p:cNvGrpSpPr/>
-        <p:nvPr/>
-      </p:nvGrpSpPr>
-      <p:grpSpPr>
-        <a:xfrm>
-          <a:off x="0" y="0"/>
-          <a:ext cx="0" cy="0"/>
-          <a:chOff x="0" y="0"/>
-          <a:chExt cx="0" cy="0"/>
-        </a:xfrm>
-      </p:grpSpPr>
-      <p:sp>
-        <p:nvSpPr>
-          <p:cNvPr id="2" name="Title 1"/>
-          <p:cNvSpPr>
-            <a:spLocks noGrp="1"/>
-          </p:cNvSpPr>
-          <p:nvPr>
-            <p:ph type="title"/>
-          </p:nvPr>
-        </p:nvSpPr>
-        <p:spPr/>
-        <p:txBody>
-          <a:bodyPr/>
-          <a:lstStyle/>
-          <a:p>
-            <a:r>
-              <a:rPr lang="en-US" dirty="0" smtClean="0"/>
-              <a:t>Closure with Circular Reference</a:t>
-            </a:r>
-            <a:endParaRPr lang="en-US" dirty="0"/>
-          </a:p>
-        </p:txBody>
-      </p:sp>
-      <p:sp>
-        <p:nvSpPr>
-          <p:cNvPr id="3" name="Content Placeholder 2"/>
-          <p:cNvSpPr>
-            <a:spLocks noGrp="1"/>
-          </p:cNvSpPr>
-          <p:nvPr>
-            <p:ph idx="1"/>
-          </p:nvPr>
-        </p:nvSpPr>
-        <p:spPr>
-          <a:xfrm>
-            <a:off x="4572000" y="1600200"/>
-            <a:ext cx="4114800" cy="4572000"/>
-          </a:xfrm>
-        </p:spPr>
-        <p:txBody>
-          <a:bodyPr/>
-          <a:lstStyle/>
-          <a:p>
-            <a:endParaRPr lang="en-US" dirty="0"/>
-          </a:p>
-        </p:txBody>
-      </p:sp>
-      <p:pic>
-        <p:nvPicPr>
-          <p:cNvPr id="4098" name="Picture 2"/>
-          <p:cNvPicPr>
-            <a:picLocks noChangeAspect="1" noChangeArrowheads="1"/>
-          </p:cNvPicPr>
-          <p:nvPr/>
-        </p:nvPicPr>
-        <p:blipFill>
-          <a:blip r:embed="rId2">
-            <a:extLst>
-              <a:ext uri="{28A0092B-C50C-407E-A947-70E740481C1C}">
-                <a14:useLocalDpi xmlns:a14="http://schemas.microsoft.com/office/drawing/2010/main" val="0"/>
-              </a:ext>
-            </a:extLst>
-          </a:blip>
-          <a:srcRect/>
-          <a:stretch>
-            <a:fillRect/>
-          </a:stretch>
-        </p:blipFill>
-        <p:spPr bwMode="auto">
-          <a:xfrm>
-            <a:off x="304800" y="2286000"/>
-            <a:ext cx="3962400" cy="2552700"/>
-          </a:xfrm>
-          <a:prstGeom prst="rect">
-            <a:avLst/>
-          </a:prstGeom>
-          <a:noFill/>
-          <a:ln>
-            <a:noFill/>
-          </a:ln>
-          <a:effectLst/>
-          <a:extLst>
-            <a:ext uri="{909E8E84-426E-40DD-AFC4-6F175D3DCCD1}">
-              <a14:hiddenFill xmlns:a14="http://schemas.microsoft.com/office/drawing/2010/main">
-                <a:solidFill>
-                  <a:schemeClr val="accent1"/>
-                </a:solidFill>
-              </a14:hiddenFill>
-            </a:ext>
-            <a:ext uri="{91240B29-F687-4F45-9708-019B960494DF}">
-              <a14:hiddenLine xmlns:a14="http://schemas.microsoft.com/office/drawing/2010/main" w="9525">
-                <a:solidFill>
-                  <a:schemeClr val="tx1"/>
-                </a:solidFill>
-                <a:miter lim="800000"/>
-                <a:headEnd/>
-                <a:tailEnd/>
-              </a14:hiddenLine>
-            </a:ext>
-            <a:ext uri="{AF507438-7753-43E0-B8FC-AC1667EBCBE1}">
-              <a14:hiddenEffects xmlns:a14="http://schemas.microsoft.com/office/drawing/2010/main">
-                <a:effectLst>
-                  <a:outerShdw dist="35921" dir="2700000" algn="ctr" rotWithShape="0">
-                    <a:schemeClr val="bg2"/>
-                  </a:outerShdw>
-                </a:effectLst>
-              </a14:hiddenEffects>
-            </a:ext>
-          </a:extLst>
-        </p:spPr>
-      </p:pic>
-    </p:spTree>
-    <p:extLst>
-      <p:ext uri="{BB962C8B-B14F-4D97-AF65-F5344CB8AC3E}">
-        <p14:creationId xmlns:p14="http://schemas.microsoft.com/office/powerpoint/2010/main" val="4153641705"/>
-      </p:ext>
-    </p:extLst>
-  </p:cSld>
-  <p:clrMapOvr>
-    <a:masterClrMapping/>
-  </p:clrMapOvr>
-</p:sld>
-</file>
-
-<file path=ppt/slides/slide7.xml><?xml version="1.0" encoding="utf-8"?>
 <p:sld xmlns:a="http://schemas.openxmlformats.org/drawingml/2006/main" xmlns:r="http://schemas.openxmlformats.org/officeDocument/2006/relationships" xmlns:p="http://schemas.openxmlformats.org/presentationml/2006/main">
   <p:cSld>
     <p:spTree>
@@ -4276,6 +6081,127 @@
   <p:clrMapOvr>
     <a:masterClrMapping/>
   </p:clrMapOvr>
+  <p:timing>
+    <p:tnLst>
+      <p:par>
+        <p:cTn id="1" dur="indefinite" restart="never" nodeType="tmRoot"/>
+      </p:par>
+    </p:tnLst>
+  </p:timing>
+</p:sld>
+</file>
+
+<file path=ppt/slides/slide7.xml><?xml version="1.0" encoding="utf-8"?>
+<p:sld xmlns:a="http://schemas.openxmlformats.org/drawingml/2006/main" xmlns:r="http://schemas.openxmlformats.org/officeDocument/2006/relationships" xmlns:p="http://schemas.openxmlformats.org/presentationml/2006/main">
+  <p:cSld>
+    <p:spTree>
+      <p:nvGrpSpPr>
+        <p:cNvPr id="1" name=""/>
+        <p:cNvGrpSpPr/>
+        <p:nvPr/>
+      </p:nvGrpSpPr>
+      <p:grpSpPr>
+        <a:xfrm>
+          <a:off x="0" y="0"/>
+          <a:ext cx="0" cy="0"/>
+          <a:chOff x="0" y="0"/>
+          <a:chExt cx="0" cy="0"/>
+        </a:xfrm>
+      </p:grpSpPr>
+      <p:sp>
+        <p:nvSpPr>
+          <p:cNvPr id="2" name="Title 1"/>
+          <p:cNvSpPr>
+            <a:spLocks noGrp="1"/>
+          </p:cNvSpPr>
+          <p:nvPr>
+            <p:ph type="title"/>
+          </p:nvPr>
+        </p:nvSpPr>
+        <p:spPr/>
+        <p:txBody>
+          <a:bodyPr/>
+          <a:lstStyle/>
+          <a:p>
+            <a:r>
+              <a:rPr lang="en-US" dirty="0" smtClean="0"/>
+              <a:t>Common Causes of </a:t>
+            </a:r>
+            <a:r>
+              <a:rPr lang="en-US" dirty="0" err="1" smtClean="0"/>
+              <a:t>MemLeaks</a:t>
+            </a:r>
+            <a:endParaRPr lang="en-US" dirty="0"/>
+          </a:p>
+        </p:txBody>
+      </p:sp>
+      <p:sp>
+        <p:nvSpPr>
+          <p:cNvPr id="3" name="Content Placeholder 2"/>
+          <p:cNvSpPr>
+            <a:spLocks noGrp="1"/>
+          </p:cNvSpPr>
+          <p:nvPr>
+            <p:ph idx="1"/>
+          </p:nvPr>
+        </p:nvSpPr>
+        <p:spPr/>
+        <p:txBody>
+          <a:bodyPr/>
+          <a:lstStyle/>
+          <a:p>
+            <a:r>
+              <a:rPr lang="en-US" dirty="0" smtClean="0"/>
+              <a:t>Closures</a:t>
+            </a:r>
+          </a:p>
+          <a:p>
+            <a:r>
+              <a:rPr lang="en-US" dirty="0" smtClean="0"/>
+              <a:t>Circular References</a:t>
+            </a:r>
+          </a:p>
+          <a:p>
+            <a:r>
+              <a:rPr lang="en-US" dirty="0" smtClean="0"/>
+              <a:t>Cross-Page Leaks</a:t>
+            </a:r>
+          </a:p>
+          <a:p>
+            <a:r>
+              <a:rPr lang="en-US" dirty="0" err="1" smtClean="0"/>
+              <a:t>XmlHttpRequest</a:t>
+            </a:r>
+            <a:r>
+              <a:rPr lang="en-US" dirty="0" smtClean="0"/>
+              <a:t>()</a:t>
+            </a:r>
+          </a:p>
+          <a:p>
+            <a:pPr marL="0" indent="0">
+              <a:buNone/>
+            </a:pPr>
+            <a:endParaRPr lang="en-US" dirty="0"/>
+          </a:p>
+        </p:txBody>
+      </p:sp>
+    </p:spTree>
+    <p:extLst>
+      <p:ext uri="{BB962C8B-B14F-4D97-AF65-F5344CB8AC3E}">
+        <p14:creationId xmlns:p14="http://schemas.microsoft.com/office/powerpoint/2010/main" val="897359067"/>
+      </p:ext>
+    </p:extLst>
+  </p:cSld>
+  <p:clrMapOvr>
+    <a:masterClrMapping/>
+  </p:clrMapOvr>
+  <p:timing>
+    <p:tnLst>
+      <p:par>
+        <p:cTn id="1" dur="indefinite" restart="never" nodeType="tmRoot"/>
+      </p:par>
+    </p:tnLst>
+  </p:timing>
 </p:sld>
 </file>
 
@@ -4313,113 +6239,6 @@
           <a:p>
             <a:r>
               <a:rPr lang="en-US" dirty="0" smtClean="0"/>
-              <a:t>Common Causes of </a:t>
-            </a:r>
-            <a:r>
-              <a:rPr lang="en-US" dirty="0" err="1" smtClean="0"/>
-              <a:t>MemLeaks</a:t>
-            </a:r>
-            <a:endParaRPr lang="en-US" dirty="0"/>
-          </a:p>
-        </p:txBody>
-      </p:sp>
-      <p:sp>
-        <p:nvSpPr>
-          <p:cNvPr id="3" name="Content Placeholder 2"/>
-          <p:cNvSpPr>
-            <a:spLocks noGrp="1"/>
-          </p:cNvSpPr>
-          <p:nvPr>
-            <p:ph idx="1"/>
-          </p:nvPr>
-        </p:nvSpPr>
-        <p:spPr/>
-        <p:txBody>
-          <a:bodyPr/>
-          <a:lstStyle/>
-          <a:p>
-            <a:r>
-              <a:rPr lang="en-US" dirty="0" smtClean="0"/>
-              <a:t>Closures</a:t>
-            </a:r>
-          </a:p>
-          <a:p>
-            <a:r>
-              <a:rPr lang="en-US" dirty="0" smtClean="0"/>
-              <a:t>Circular References</a:t>
-            </a:r>
-          </a:p>
-          <a:p>
-            <a:r>
-              <a:rPr lang="en-US" dirty="0" smtClean="0"/>
-              <a:t>Cross-Page Leaks</a:t>
-            </a:r>
-          </a:p>
-          <a:p>
-            <a:r>
-              <a:rPr lang="en-US" dirty="0" err="1" smtClean="0"/>
-              <a:t>XmlHttpRequest</a:t>
-            </a:r>
-            <a:r>
-              <a:rPr lang="en-US" dirty="0" smtClean="0"/>
-              <a:t>()</a:t>
-            </a:r>
-          </a:p>
-          <a:p>
-            <a:pPr marL="0" indent="0">
-              <a:buNone/>
-            </a:pPr>
-            <a:endParaRPr lang="en-US" dirty="0"/>
-          </a:p>
-        </p:txBody>
-      </p:sp>
-    </p:spTree>
-    <p:extLst>
-      <p:ext uri="{BB962C8B-B14F-4D97-AF65-F5344CB8AC3E}">
-        <p14:creationId xmlns:p14="http://schemas.microsoft.com/office/powerpoint/2010/main" val="897359067"/>
-      </p:ext>
-    </p:extLst>
-  </p:cSld>
-  <p:clrMapOvr>
-    <a:masterClrMapping/>
-  </p:clrMapOvr>
-</p:sld>
-</file>
-
-<file path=ppt/slides/slide9.xml><?xml version="1.0" encoding="utf-8"?>
-<p:sld xmlns:a="http://schemas.openxmlformats.org/drawingml/2006/main" xmlns:r="http://schemas.openxmlformats.org/officeDocument/2006/relationships" xmlns:p="http://schemas.openxmlformats.org/presentationml/2006/main">
-  <p:cSld>
-    <p:spTree>
-      <p:nvGrpSpPr>
-        <p:cNvPr id="1" name=""/>
-        <p:cNvGrpSpPr/>
-        <p:nvPr/>
-      </p:nvGrpSpPr>
-      <p:grpSpPr>
-        <a:xfrm>
-          <a:off x="0" y="0"/>
-          <a:ext cx="0" cy="0"/>
-          <a:chOff x="0" y="0"/>
-          <a:chExt cx="0" cy="0"/>
-        </a:xfrm>
-      </p:grpSpPr>
-      <p:sp>
-        <p:nvSpPr>
-          <p:cNvPr id="2" name="Title 1"/>
-          <p:cNvSpPr>
-            <a:spLocks noGrp="1"/>
-          </p:cNvSpPr>
-          <p:nvPr>
-            <p:ph type="title"/>
-          </p:nvPr>
-        </p:nvSpPr>
-        <p:spPr/>
-        <p:txBody>
-          <a:bodyPr/>
-          <a:lstStyle/>
-          <a:p>
-            <a:r>
-              <a:rPr lang="en-US" dirty="0" smtClean="0"/>
               <a:t>Questions</a:t>
             </a:r>
             <a:endParaRPr lang="en-US" dirty="0"/>
@@ -4436,6 +6255,13 @@
   <p:clrMapOvr>
     <a:masterClrMapping/>
   </p:clrMapOvr>
+  <p:timing>
+    <p:tnLst>
+      <p:par>
+        <p:cTn id="1" dur="indefinite" restart="never" nodeType="tmRoot"/>
+      </p:par>
+    </p:tnLst>
+  </p:timing>
 </p:sld>
 </file>
 

</xml_diff>

<commit_message>
Added another example to the slideshow
</commit_message>
<xml_diff>
--- a/javascriptSlideshow.pptx
+++ b/javascriptSlideshow.pptx
@@ -3152,11 +3152,11 @@
             <a:pPr algn="justLow"/>
             <a:r>
               <a:rPr lang="en-US" dirty="0" smtClean="0"/>
-              <a:t>				Peter </a:t>
-            </a:r>
-            <a:r>
-              <a:rPr lang="en-US" dirty="0" err="1" smtClean="0"/>
-              <a:t>Lukarov</a:t>
+              <a:t>			</a:t>
+            </a:r>
+            <a:r>
+              <a:rPr lang="en-US" dirty="0" smtClean="0"/>
+              <a:t>	Peter Lukarov</a:t>
             </a:r>
             <a:endParaRPr lang="en-US" dirty="0" smtClean="0"/>
           </a:p>
@@ -4831,7 +4831,12 @@
             <p:ph type="title"/>
           </p:nvPr>
         </p:nvSpPr>
-        <p:spPr/>
+        <p:spPr>
+          <a:xfrm>
+            <a:off x="457200" y="27264"/>
+            <a:ext cx="8229600" cy="1143000"/>
+          </a:xfrm>
+        </p:spPr>
         <p:txBody>
           <a:bodyPr/>
           <a:lstStyle/>
@@ -4896,7 +4901,7 @@
         <p:spPr>
           <a:xfrm>
             <a:off x="4343400" y="1371600"/>
-            <a:ext cx="4419600" cy="5355312"/>
+            <a:ext cx="4419600" cy="5078313"/>
           </a:xfrm>
           <a:prstGeom prst="rect">
             <a:avLst/>
@@ -4910,7 +4915,7 @@
           <a:lstStyle/>
           <a:p>
             <a:r>
-              <a:rPr lang="en-US" sz="1200" dirty="0">
+              <a:rPr lang="en-US" sz="1100" dirty="0">
                 <a:solidFill>
                   <a:srgbClr val="0000FF"/>
                 </a:solidFill>
@@ -4919,7 +4924,7 @@
               <a:t>&lt;</a:t>
             </a:r>
             <a:r>
-              <a:rPr lang="en-US" sz="1200" dirty="0" smtClean="0">
+              <a:rPr lang="en-US" sz="1100" dirty="0" smtClean="0">
                 <a:solidFill>
                   <a:srgbClr val="800000"/>
                 </a:solidFill>
@@ -4928,7 +4933,7 @@
               <a:t>head</a:t>
             </a:r>
             <a:r>
-              <a:rPr lang="en-US" sz="1200" dirty="0" smtClean="0">
+              <a:rPr lang="en-US" sz="1100" dirty="0" smtClean="0">
                 <a:solidFill>
                   <a:srgbClr val="0000FF"/>
                 </a:solidFill>
@@ -4936,7 +4941,7 @@
               </a:rPr>
               <a:t>&gt;</a:t>
             </a:r>
-            <a:endParaRPr lang="en-US" sz="1200" dirty="0">
+            <a:endParaRPr lang="en-US" sz="1100" dirty="0">
               <a:solidFill>
                 <a:prstClr val="black"/>
               </a:solidFill>
@@ -4945,7 +4950,7 @@
           </a:p>
           <a:p>
             <a:r>
-              <a:rPr lang="en-US" sz="1200" dirty="0" smtClean="0">
+              <a:rPr lang="en-US" sz="1100" dirty="0" smtClean="0">
                 <a:solidFill>
                   <a:srgbClr val="0000FF"/>
                 </a:solidFill>
@@ -4954,7 +4959,7 @@
               <a:t>&lt;</a:t>
             </a:r>
             <a:r>
-              <a:rPr lang="en-US" sz="1200" dirty="0">
+              <a:rPr lang="en-US" sz="1100" dirty="0">
                 <a:solidFill>
                   <a:srgbClr val="800000"/>
                 </a:solidFill>
@@ -4963,7 +4968,7 @@
               <a:t>title</a:t>
             </a:r>
             <a:r>
-              <a:rPr lang="en-US" sz="1200" dirty="0">
+              <a:rPr lang="en-US" sz="1100" dirty="0">
                 <a:solidFill>
                   <a:srgbClr val="0000FF"/>
                 </a:solidFill>
@@ -4972,7 +4977,7 @@
               <a:t>&gt;&lt;/</a:t>
             </a:r>
             <a:r>
-              <a:rPr lang="en-US" sz="1200" dirty="0">
+              <a:rPr lang="en-US" sz="1100" dirty="0">
                 <a:solidFill>
                   <a:srgbClr val="800000"/>
                 </a:solidFill>
@@ -4981,7 +4986,7 @@
               <a:t>title</a:t>
             </a:r>
             <a:r>
-              <a:rPr lang="en-US" sz="1200" dirty="0">
+              <a:rPr lang="en-US" sz="1100" dirty="0">
                 <a:solidFill>
                   <a:srgbClr val="0000FF"/>
                 </a:solidFill>
@@ -4989,7 +4994,7 @@
               </a:rPr>
               <a:t>&gt;</a:t>
             </a:r>
-            <a:endParaRPr lang="en-US" sz="1200" dirty="0">
+            <a:endParaRPr lang="en-US" sz="1100" dirty="0">
               <a:solidFill>
                 <a:prstClr val="black"/>
               </a:solidFill>
@@ -4998,7 +5003,7 @@
           </a:p>
           <a:p>
             <a:r>
-              <a:rPr lang="en-US" sz="1200" dirty="0" smtClean="0">
+              <a:rPr lang="en-US" sz="1100" dirty="0" smtClean="0">
                 <a:solidFill>
                   <a:srgbClr val="0000FF"/>
                 </a:solidFill>
@@ -5007,7 +5012,7 @@
               <a:t/>
             </a:r>
             <a:br>
-              <a:rPr lang="en-US" sz="1200" dirty="0" smtClean="0">
+              <a:rPr lang="en-US" sz="1100" dirty="0" smtClean="0">
                 <a:solidFill>
                   <a:srgbClr val="0000FF"/>
                 </a:solidFill>
@@ -5015,7 +5020,7 @@
               </a:rPr>
             </a:br>
             <a:r>
-              <a:rPr lang="en-US" sz="1200" dirty="0" smtClean="0">
+              <a:rPr lang="en-US" sz="1100" dirty="0" smtClean="0">
                 <a:solidFill>
                   <a:srgbClr val="0000FF"/>
                 </a:solidFill>
@@ -5024,7 +5029,7 @@
               <a:t>&lt;</a:t>
             </a:r>
             <a:r>
-              <a:rPr lang="en-US" sz="1200" dirty="0">
+              <a:rPr lang="en-US" sz="1100" dirty="0">
                 <a:solidFill>
                   <a:srgbClr val="800000"/>
                 </a:solidFill>
@@ -5033,7 +5038,7 @@
               <a:t>script</a:t>
             </a:r>
             <a:r>
-              <a:rPr lang="en-US" sz="1200" dirty="0">
+              <a:rPr lang="en-US" sz="1100" dirty="0">
                 <a:solidFill>
                   <a:prstClr val="black"/>
                 </a:solidFill>
@@ -5042,7 +5047,7 @@
               <a:t> </a:t>
             </a:r>
             <a:r>
-              <a:rPr lang="en-US" sz="1200" dirty="0">
+              <a:rPr lang="en-US" sz="1100" dirty="0">
                 <a:solidFill>
                   <a:srgbClr val="FF0000"/>
                 </a:solidFill>
@@ -5051,7 +5056,7 @@
               <a:t>type</a:t>
             </a:r>
             <a:r>
-              <a:rPr lang="en-US" sz="1200" dirty="0">
+              <a:rPr lang="en-US" sz="1100" dirty="0">
                 <a:solidFill>
                   <a:srgbClr val="0000FF"/>
                 </a:solidFill>
@@ -5060,7 +5065,7 @@
               <a:t>="text/</a:t>
             </a:r>
             <a:r>
-              <a:rPr lang="en-US" sz="1200" dirty="0" err="1">
+              <a:rPr lang="en-US" sz="1100" dirty="0" err="1">
                 <a:solidFill>
                   <a:srgbClr val="0000FF"/>
                 </a:solidFill>
@@ -5069,7 +5074,7 @@
               <a:t>javascript</a:t>
             </a:r>
             <a:r>
-              <a:rPr lang="en-US" sz="1200" dirty="0">
+              <a:rPr lang="en-US" sz="1100" dirty="0">
                 <a:solidFill>
                   <a:srgbClr val="0000FF"/>
                 </a:solidFill>
@@ -5077,7 +5082,7 @@
               </a:rPr>
               <a:t>"&gt;</a:t>
             </a:r>
-            <a:endParaRPr lang="en-US" sz="1200" dirty="0">
+            <a:endParaRPr lang="en-US" sz="1100" dirty="0">
               <a:solidFill>
                 <a:prstClr val="black"/>
               </a:solidFill>
@@ -5086,7 +5091,7 @@
           </a:p>
           <a:p>
             <a:r>
-              <a:rPr lang="en-US" sz="1200" dirty="0" err="1">
+              <a:rPr lang="en-US" sz="1100" dirty="0" err="1" smtClean="0">
                 <a:solidFill>
                   <a:srgbClr val="0000FF"/>
                 </a:solidFill>
@@ -5095,7 +5100,7 @@
               <a:t>var</a:t>
             </a:r>
             <a:r>
-              <a:rPr lang="en-US" sz="1200" dirty="0">
+              <a:rPr lang="en-US" sz="1100" dirty="0" smtClean="0">
                 <a:solidFill>
                   <a:prstClr val="black"/>
                 </a:solidFill>
@@ -5104,7 +5109,7 @@
               <a:t> </a:t>
             </a:r>
             <a:r>
-              <a:rPr lang="en-US" sz="1200" dirty="0" err="1">
+              <a:rPr lang="en-US" sz="1100" dirty="0" err="1">
                 <a:solidFill>
                   <a:prstClr val="black"/>
                 </a:solidFill>
@@ -5113,7 +5118,7 @@
               <a:t>myGlobalObject</a:t>
             </a:r>
             <a:r>
-              <a:rPr lang="en-US" sz="1200" dirty="0">
+              <a:rPr lang="en-US" sz="1100" dirty="0">
                 <a:solidFill>
                   <a:prstClr val="black"/>
                 </a:solidFill>
@@ -5123,8 +5128,16 @@
             </a:r>
           </a:p>
           <a:p>
-            <a:r>
-              <a:rPr lang="en-US" sz="1200" dirty="0">
+            <a:endParaRPr lang="en-US" sz="1100" dirty="0" smtClean="0">
+              <a:solidFill>
+                <a:srgbClr val="0000FF"/>
+              </a:solidFill>
+              <a:latin typeface="Arial"/>
+            </a:endParaRPr>
+          </a:p>
+          <a:p>
+            <a:r>
+              <a:rPr lang="en-US" sz="1100" dirty="0" smtClean="0">
                 <a:solidFill>
                   <a:srgbClr val="0000FF"/>
                 </a:solidFill>
@@ -5133,7 +5146,7 @@
               <a:t>function</a:t>
             </a:r>
             <a:r>
-              <a:rPr lang="en-US" sz="1200" dirty="0">
+              <a:rPr lang="en-US" sz="1100" dirty="0" smtClean="0">
                 <a:solidFill>
                   <a:prstClr val="black"/>
                 </a:solidFill>
@@ -5142,7 +5155,7 @@
               <a:t> </a:t>
             </a:r>
             <a:r>
-              <a:rPr lang="en-US" sz="1200" dirty="0" err="1">
+              <a:rPr lang="en-US" sz="1100" dirty="0" err="1">
                 <a:solidFill>
                   <a:prstClr val="black"/>
                 </a:solidFill>
@@ -5151,7 +5164,7 @@
               <a:t>SetupLeak</a:t>
             </a:r>
             <a:r>
-              <a:rPr lang="en-US" sz="1200" dirty="0">
+              <a:rPr lang="en-US" sz="1100" dirty="0">
                 <a:solidFill>
                   <a:prstClr val="black"/>
                 </a:solidFill>
@@ -5162,7 +5175,7 @@
           </a:p>
           <a:p>
             <a:r>
-              <a:rPr lang="en-US" sz="1200" dirty="0">
+              <a:rPr lang="en-US" sz="1100" dirty="0">
                 <a:solidFill>
                   <a:prstClr val="black"/>
                 </a:solidFill>
@@ -5173,16 +5186,16 @@
           </a:p>
           <a:p>
             <a:r>
-              <a:rPr lang="en-US" sz="1200" dirty="0" smtClean="0">
+              <a:rPr lang="en-US" sz="1100" dirty="0" smtClean="0">
                 <a:solidFill>
                   <a:srgbClr val="006400"/>
                 </a:solidFill>
                 <a:latin typeface="Arial"/>
               </a:rPr>
-              <a:t>   // </a:t>
-            </a:r>
-            <a:r>
-              <a:rPr lang="en-US" sz="1200" dirty="0">
+              <a:t>      // </a:t>
+            </a:r>
+            <a:r>
+              <a:rPr lang="en-US" sz="1100" dirty="0">
                 <a:solidFill>
                   <a:srgbClr val="006400"/>
                 </a:solidFill>
@@ -5190,7 +5203,7 @@
               </a:rPr>
               <a:t>First set up the script scope to element reference</a:t>
             </a:r>
-            <a:endParaRPr lang="en-US" sz="1200" dirty="0">
+            <a:endParaRPr lang="en-US" sz="1100" dirty="0">
               <a:solidFill>
                 <a:prstClr val="black"/>
               </a:solidFill>
@@ -5199,7 +5212,7 @@
           </a:p>
           <a:p>
             <a:r>
-              <a:rPr lang="en-US" sz="1200" dirty="0">
+              <a:rPr lang="en-US" sz="1100" dirty="0">
                 <a:solidFill>
                   <a:prstClr val="black"/>
                 </a:solidFill>
@@ -5208,16 +5221,16 @@
               <a:t> </a:t>
             </a:r>
             <a:r>
-              <a:rPr lang="en-US" sz="1200" dirty="0" smtClean="0">
-                <a:solidFill>
-                  <a:prstClr val="black"/>
-                </a:solidFill>
-                <a:latin typeface="Arial"/>
-              </a:rPr>
-              <a:t>  </a:t>
-            </a:r>
-            <a:r>
-              <a:rPr lang="en-US" sz="1200" dirty="0" err="1" smtClean="0">
+              <a:rPr lang="en-US" sz="1100" dirty="0" smtClean="0">
+                <a:solidFill>
+                  <a:prstClr val="black"/>
+                </a:solidFill>
+                <a:latin typeface="Arial"/>
+              </a:rPr>
+              <a:t>     </a:t>
+            </a:r>
+            <a:r>
+              <a:rPr lang="en-US" sz="1100" dirty="0" err="1" smtClean="0">
                 <a:solidFill>
                   <a:prstClr val="black"/>
                 </a:solidFill>
@@ -5226,7 +5239,7 @@
               <a:t>myGlobalObject</a:t>
             </a:r>
             <a:r>
-              <a:rPr lang="en-US" sz="1200" dirty="0" smtClean="0">
+              <a:rPr lang="en-US" sz="1100" dirty="0" smtClean="0">
                 <a:solidFill>
                   <a:prstClr val="black"/>
                 </a:solidFill>
@@ -5235,7 +5248,7 @@
               <a:t> </a:t>
             </a:r>
             <a:r>
-              <a:rPr lang="en-US" sz="1200" dirty="0">
+              <a:rPr lang="en-US" sz="1100" dirty="0">
                 <a:solidFill>
                   <a:prstClr val="black"/>
                 </a:solidFill>
@@ -5244,7 +5257,7 @@
               <a:t>= </a:t>
             </a:r>
             <a:r>
-              <a:rPr lang="en-US" sz="1200" dirty="0" err="1">
+              <a:rPr lang="en-US" sz="1100" dirty="0" err="1">
                 <a:solidFill>
                   <a:prstClr val="black"/>
                 </a:solidFill>
@@ -5253,7 +5266,7 @@
               <a:t>document.getElementById</a:t>
             </a:r>
             <a:r>
-              <a:rPr lang="en-US" sz="1200" dirty="0">
+              <a:rPr lang="en-US" sz="1100" dirty="0">
                 <a:solidFill>
                   <a:prstClr val="black"/>
                 </a:solidFill>
@@ -5262,7 +5275,7 @@
               <a:t>(</a:t>
             </a:r>
             <a:r>
-              <a:rPr lang="en-US" sz="1200" dirty="0">
+              <a:rPr lang="en-US" sz="1100" dirty="0">
                 <a:solidFill>
                   <a:srgbClr val="800000"/>
                 </a:solidFill>
@@ -5271,7 +5284,7 @@
               <a:t>"</a:t>
             </a:r>
             <a:r>
-              <a:rPr lang="en-US" sz="1200" dirty="0" err="1">
+              <a:rPr lang="en-US" sz="1100" dirty="0" err="1">
                 <a:solidFill>
                   <a:srgbClr val="800000"/>
                 </a:solidFill>
@@ -5280,7 +5293,7 @@
               <a:t>LeakedDiv</a:t>
             </a:r>
             <a:r>
-              <a:rPr lang="en-US" sz="1200" dirty="0">
+              <a:rPr lang="en-US" sz="1100" dirty="0">
                 <a:solidFill>
                   <a:srgbClr val="800000"/>
                 </a:solidFill>
@@ -5289,7 +5302,7 @@
               <a:t>"</a:t>
             </a:r>
             <a:r>
-              <a:rPr lang="en-US" sz="1200" dirty="0">
+              <a:rPr lang="en-US" sz="1100" dirty="0">
                 <a:solidFill>
                   <a:prstClr val="black"/>
                 </a:solidFill>
@@ -5299,7 +5312,7 @@
             </a:r>
           </a:p>
           <a:p>
-            <a:endParaRPr lang="en-US" sz="1200" dirty="0">
+            <a:endParaRPr lang="en-US" sz="1100" dirty="0">
               <a:solidFill>
                 <a:prstClr val="black"/>
               </a:solidFill>
@@ -5308,16 +5321,16 @@
           </a:p>
           <a:p>
             <a:r>
-              <a:rPr lang="en-US" sz="1200" dirty="0" smtClean="0">
+              <a:rPr lang="en-US" sz="1100" dirty="0" smtClean="0">
                 <a:solidFill>
                   <a:srgbClr val="006400"/>
                 </a:solidFill>
                 <a:latin typeface="Arial"/>
               </a:rPr>
-              <a:t>    // </a:t>
-            </a:r>
-            <a:r>
-              <a:rPr lang="en-US" sz="1200" dirty="0">
+              <a:t>      // </a:t>
+            </a:r>
+            <a:r>
+              <a:rPr lang="en-US" sz="1100" dirty="0">
                 <a:solidFill>
                   <a:srgbClr val="006400"/>
                 </a:solidFill>
@@ -5325,7 +5338,7 @@
               </a:rPr>
               <a:t>Next set up the element to script scope reference</a:t>
             </a:r>
-            <a:endParaRPr lang="en-US" sz="1200" dirty="0">
+            <a:endParaRPr lang="en-US" sz="1100" dirty="0">
               <a:solidFill>
                 <a:prstClr val="black"/>
               </a:solidFill>
@@ -5334,16 +5347,16 @@
           </a:p>
           <a:p>
             <a:r>
-              <a:rPr lang="en-US" sz="1200" dirty="0" smtClean="0">
-                <a:solidFill>
-                  <a:prstClr val="black"/>
-                </a:solidFill>
-                <a:latin typeface="Arial"/>
-              </a:rPr>
-              <a:t>    </a:t>
-            </a:r>
-            <a:r>
-              <a:rPr lang="en-US" sz="1200" dirty="0" err="1" smtClean="0">
+              <a:rPr lang="en-US" sz="1100" dirty="0" smtClean="0">
+                <a:solidFill>
+                  <a:prstClr val="black"/>
+                </a:solidFill>
+                <a:latin typeface="Arial"/>
+              </a:rPr>
+              <a:t>      </a:t>
+            </a:r>
+            <a:r>
+              <a:rPr lang="en-US" sz="1100" dirty="0" err="1" smtClean="0">
                 <a:solidFill>
                   <a:prstClr val="black"/>
                 </a:solidFill>
@@ -5352,7 +5365,7 @@
               <a:t>document.getElementById</a:t>
             </a:r>
             <a:r>
-              <a:rPr lang="en-US" sz="1200" dirty="0">
+              <a:rPr lang="en-US" sz="1100" dirty="0">
                 <a:solidFill>
                   <a:prstClr val="black"/>
                 </a:solidFill>
@@ -5361,7 +5374,7 @@
               <a:t>(</a:t>
             </a:r>
             <a:r>
-              <a:rPr lang="en-US" sz="1200" dirty="0">
+              <a:rPr lang="en-US" sz="1100" dirty="0">
                 <a:solidFill>
                   <a:srgbClr val="800000"/>
                 </a:solidFill>
@@ -5370,7 +5383,7 @@
               <a:t>"</a:t>
             </a:r>
             <a:r>
-              <a:rPr lang="en-US" sz="1200" dirty="0" err="1">
+              <a:rPr lang="en-US" sz="1100" dirty="0" err="1">
                 <a:solidFill>
                   <a:srgbClr val="800000"/>
                 </a:solidFill>
@@ -5379,7 +5392,7 @@
               <a:t>LeakedDiv</a:t>
             </a:r>
             <a:r>
-              <a:rPr lang="en-US" sz="1200" dirty="0">
+              <a:rPr lang="en-US" sz="1100" dirty="0">
                 <a:solidFill>
                   <a:srgbClr val="800000"/>
                 </a:solidFill>
@@ -5388,7 +5401,7 @@
               <a:t>"</a:t>
             </a:r>
             <a:r>
-              <a:rPr lang="en-US" sz="1200" dirty="0">
+              <a:rPr lang="en-US" sz="1100" dirty="0">
                 <a:solidFill>
                   <a:prstClr val="black"/>
                 </a:solidFill>
@@ -5397,7 +5410,7 @@
               <a:t>).</a:t>
             </a:r>
             <a:r>
-              <a:rPr lang="en-US" sz="1200" dirty="0" err="1">
+              <a:rPr lang="en-US" sz="1100" dirty="0" err="1">
                 <a:solidFill>
                   <a:prstClr val="black"/>
                 </a:solidFill>
@@ -5406,7 +5419,7 @@
               <a:t>expandoProperty</a:t>
             </a:r>
             <a:r>
-              <a:rPr lang="en-US" sz="1200" dirty="0">
+              <a:rPr lang="en-US" sz="1100" dirty="0">
                 <a:solidFill>
                   <a:prstClr val="black"/>
                 </a:solidFill>
@@ -5417,16 +5430,16 @@
           </a:p>
           <a:p>
             <a:r>
-              <a:rPr lang="en-US" sz="1200" dirty="0" smtClean="0">
-                <a:solidFill>
-                  <a:prstClr val="black"/>
-                </a:solidFill>
-                <a:latin typeface="Arial"/>
-              </a:rPr>
-              <a:t>    </a:t>
-            </a:r>
-            <a:r>
-              <a:rPr lang="en-US" sz="1200" dirty="0" err="1" smtClean="0">
+              <a:rPr lang="en-US" sz="1100" dirty="0" smtClean="0">
+                <a:solidFill>
+                  <a:prstClr val="black"/>
+                </a:solidFill>
+                <a:latin typeface="Arial"/>
+              </a:rPr>
+              <a:t>      </a:t>
+            </a:r>
+            <a:r>
+              <a:rPr lang="en-US" sz="1100" dirty="0" err="1" smtClean="0">
                 <a:solidFill>
                   <a:prstClr val="black"/>
                 </a:solidFill>
@@ -5435,7 +5448,7 @@
               <a:t>myGlobalObject</a:t>
             </a:r>
             <a:r>
-              <a:rPr lang="en-US" sz="1200" dirty="0">
+              <a:rPr lang="en-US" sz="1100" dirty="0">
                 <a:solidFill>
                   <a:prstClr val="black"/>
                 </a:solidFill>
@@ -5446,15 +5459,15 @@
           </a:p>
           <a:p>
             <a:r>
-              <a:rPr lang="en-US" sz="1200" dirty="0" smtClean="0">
-                <a:solidFill>
-                  <a:prstClr val="black"/>
-                </a:solidFill>
-                <a:latin typeface="Arial"/>
-              </a:rPr>
-              <a:t>  }</a:t>
-            </a:r>
-            <a:endParaRPr lang="en-US" sz="1200" dirty="0">
+              <a:rPr lang="en-US" sz="1100" dirty="0" smtClean="0">
+                <a:solidFill>
+                  <a:prstClr val="black"/>
+                </a:solidFill>
+                <a:latin typeface="Arial"/>
+              </a:rPr>
+              <a:t> }</a:t>
+            </a:r>
+            <a:endParaRPr lang="en-US" sz="1100" dirty="0">
               <a:solidFill>
                 <a:prstClr val="black"/>
               </a:solidFill>
@@ -5463,7 +5476,7 @@
           </a:p>
           <a:p>
             <a:r>
-              <a:rPr lang="en-US" sz="1200" dirty="0">
+              <a:rPr lang="en-US" sz="1100" dirty="0">
                 <a:solidFill>
                   <a:srgbClr val="0000FF"/>
                 </a:solidFill>
@@ -5472,7 +5485,7 @@
               <a:t>&lt;/</a:t>
             </a:r>
             <a:r>
-              <a:rPr lang="en-US" sz="1200" dirty="0">
+              <a:rPr lang="en-US" sz="1100" dirty="0">
                 <a:solidFill>
                   <a:srgbClr val="800000"/>
                 </a:solidFill>
@@ -5481,7 +5494,7 @@
               <a:t>script</a:t>
             </a:r>
             <a:r>
-              <a:rPr lang="en-US" sz="1200" dirty="0">
+              <a:rPr lang="en-US" sz="1100" dirty="0">
                 <a:solidFill>
                   <a:srgbClr val="0000FF"/>
                 </a:solidFill>
@@ -5489,7 +5502,7 @@
               </a:rPr>
               <a:t>&gt;</a:t>
             </a:r>
-            <a:endParaRPr lang="en-US" sz="1200" dirty="0">
+            <a:endParaRPr lang="en-US" sz="1100" dirty="0">
               <a:solidFill>
                 <a:prstClr val="black"/>
               </a:solidFill>
@@ -5498,7 +5511,7 @@
           </a:p>
           <a:p>
             <a:r>
-              <a:rPr lang="en-US" sz="1200" dirty="0" smtClean="0">
+              <a:rPr lang="en-US" sz="1100" dirty="0" smtClean="0">
                 <a:solidFill>
                   <a:srgbClr val="0000FF"/>
                 </a:solidFill>
@@ -5507,7 +5520,7 @@
               <a:t/>
             </a:r>
             <a:br>
-              <a:rPr lang="en-US" sz="1200" dirty="0" smtClean="0">
+              <a:rPr lang="en-US" sz="1100" dirty="0" smtClean="0">
                 <a:solidFill>
                   <a:srgbClr val="0000FF"/>
                 </a:solidFill>
@@ -5515,7 +5528,7 @@
               </a:rPr>
             </a:br>
             <a:r>
-              <a:rPr lang="en-US" sz="1200" dirty="0" smtClean="0">
+              <a:rPr lang="en-US" sz="1100" dirty="0" smtClean="0">
                 <a:solidFill>
                   <a:srgbClr val="0000FF"/>
                 </a:solidFill>
@@ -5524,7 +5537,7 @@
               <a:t>&lt;/</a:t>
             </a:r>
             <a:r>
-              <a:rPr lang="en-US" sz="1200" dirty="0">
+              <a:rPr lang="en-US" sz="1100" dirty="0">
                 <a:solidFill>
                   <a:srgbClr val="800000"/>
                 </a:solidFill>
@@ -5533,7 +5546,7 @@
               <a:t>head</a:t>
             </a:r>
             <a:r>
-              <a:rPr lang="en-US" sz="1200" dirty="0" smtClean="0">
+              <a:rPr lang="en-US" sz="1100" dirty="0" smtClean="0">
                 <a:solidFill>
                   <a:srgbClr val="0000FF"/>
                 </a:solidFill>
@@ -5542,7 +5555,7 @@
               <a:t>&gt;</a:t>
             </a:r>
             <a:br>
-              <a:rPr lang="en-US" sz="1200" dirty="0" smtClean="0">
+              <a:rPr lang="en-US" sz="1100" dirty="0" smtClean="0">
                 <a:solidFill>
                   <a:srgbClr val="0000FF"/>
                 </a:solidFill>
@@ -5550,7 +5563,7 @@
               </a:rPr>
             </a:br>
             <a:r>
-              <a:rPr lang="en-US" sz="1200" dirty="0" smtClean="0">
+              <a:rPr lang="en-US" sz="1100" dirty="0" smtClean="0">
                 <a:solidFill>
                   <a:srgbClr val="0000FF"/>
                 </a:solidFill>
@@ -5559,7 +5572,7 @@
               <a:t/>
             </a:r>
             <a:br>
-              <a:rPr lang="en-US" sz="1200" dirty="0" smtClean="0">
+              <a:rPr lang="en-US" sz="1100" dirty="0" smtClean="0">
                 <a:solidFill>
                   <a:srgbClr val="0000FF"/>
                 </a:solidFill>
@@ -5567,7 +5580,7 @@
               </a:rPr>
             </a:br>
             <a:r>
-              <a:rPr lang="en-US" sz="1200" dirty="0" smtClean="0">
+              <a:rPr lang="en-US" sz="1100" dirty="0" smtClean="0">
                 <a:solidFill>
                   <a:srgbClr val="0000FF"/>
                 </a:solidFill>
@@ -5576,7 +5589,7 @@
               <a:t>&lt;</a:t>
             </a:r>
             <a:r>
-              <a:rPr lang="en-US" sz="1200" dirty="0">
+              <a:rPr lang="en-US" sz="1100" dirty="0">
                 <a:solidFill>
                   <a:srgbClr val="800000"/>
                 </a:solidFill>
@@ -5585,7 +5598,7 @@
               <a:t>body</a:t>
             </a:r>
             <a:r>
-              <a:rPr lang="en-US" sz="1200" dirty="0">
+              <a:rPr lang="en-US" sz="1100" dirty="0">
                 <a:solidFill>
                   <a:prstClr val="black"/>
                 </a:solidFill>
@@ -5594,7 +5607,7 @@
               <a:t> </a:t>
             </a:r>
             <a:r>
-              <a:rPr lang="en-US" sz="1200" dirty="0" err="1">
+              <a:rPr lang="en-US" sz="1100" dirty="0" err="1">
                 <a:solidFill>
                   <a:srgbClr val="FF0000"/>
                 </a:solidFill>
@@ -5603,7 +5616,7 @@
               <a:t>onload</a:t>
             </a:r>
             <a:r>
-              <a:rPr lang="en-US" sz="1200" dirty="0">
+              <a:rPr lang="en-US" sz="1100" dirty="0">
                 <a:solidFill>
                   <a:srgbClr val="0000FF"/>
                 </a:solidFill>
@@ -5612,7 +5625,7 @@
               <a:t>="</a:t>
             </a:r>
             <a:r>
-              <a:rPr lang="en-US" sz="1200" dirty="0" err="1">
+              <a:rPr lang="en-US" sz="1100" dirty="0" err="1">
                 <a:solidFill>
                   <a:srgbClr val="0000FF"/>
                 </a:solidFill>
@@ -5621,7 +5634,7 @@
               <a:t>SetupLeak</a:t>
             </a:r>
             <a:r>
-              <a:rPr lang="en-US" sz="1200" dirty="0">
+              <a:rPr lang="en-US" sz="1100" dirty="0">
                 <a:solidFill>
                   <a:srgbClr val="0000FF"/>
                 </a:solidFill>
@@ -5629,7 +5642,7 @@
               </a:rPr>
               <a:t>()"&gt;</a:t>
             </a:r>
-            <a:endParaRPr lang="en-US" sz="1200" dirty="0">
+            <a:endParaRPr lang="en-US" sz="1100" dirty="0">
               <a:solidFill>
                 <a:prstClr val="black"/>
               </a:solidFill>
@@ -5638,7 +5651,7 @@
           </a:p>
           <a:p>
             <a:r>
-              <a:rPr lang="en-US" sz="1200" dirty="0" smtClean="0">
+              <a:rPr lang="en-US" sz="1100" dirty="0" smtClean="0">
                 <a:solidFill>
                   <a:srgbClr val="0000FF"/>
                 </a:solidFill>
@@ -5647,7 +5660,7 @@
               <a:t>  &lt;</a:t>
             </a:r>
             <a:r>
-              <a:rPr lang="en-US" sz="1200" dirty="0">
+              <a:rPr lang="en-US" sz="1100" dirty="0">
                 <a:solidFill>
                   <a:srgbClr val="800000"/>
                 </a:solidFill>
@@ -5656,7 +5669,7 @@
               <a:t>div</a:t>
             </a:r>
             <a:r>
-              <a:rPr lang="en-US" sz="1200" dirty="0">
+              <a:rPr lang="en-US" sz="1100" dirty="0">
                 <a:solidFill>
                   <a:srgbClr val="0000FF"/>
                 </a:solidFill>
@@ -5664,7 +5677,7 @@
               </a:rPr>
               <a:t>&gt;</a:t>
             </a:r>
-            <a:endParaRPr lang="en-US" sz="1200" dirty="0">
+            <a:endParaRPr lang="en-US" sz="1100" dirty="0">
               <a:solidFill>
                 <a:prstClr val="black"/>
               </a:solidFill>
@@ -5672,7 +5685,7 @@
             </a:endParaRPr>
           </a:p>
           <a:p>
-            <a:endParaRPr lang="en-US" sz="1200" dirty="0" smtClean="0">
+            <a:endParaRPr lang="en-US" sz="1100" dirty="0" smtClean="0">
               <a:solidFill>
                 <a:srgbClr val="0000FF"/>
               </a:solidFill>
@@ -5681,7 +5694,7 @@
           </a:p>
           <a:p>
             <a:r>
-              <a:rPr lang="en-US" sz="1200" dirty="0" smtClean="0">
+              <a:rPr lang="en-US" sz="1100" dirty="0" smtClean="0">
                 <a:solidFill>
                   <a:srgbClr val="0000FF"/>
                 </a:solidFill>
@@ -5690,7 +5703,7 @@
               <a:t>       &lt;</a:t>
             </a:r>
             <a:r>
-              <a:rPr lang="en-US" sz="1200" dirty="0">
+              <a:rPr lang="en-US" sz="1100" dirty="0">
                 <a:solidFill>
                   <a:srgbClr val="800000"/>
                 </a:solidFill>
@@ -5699,7 +5712,7 @@
               <a:t>div</a:t>
             </a:r>
             <a:r>
-              <a:rPr lang="en-US" sz="1200" dirty="0">
+              <a:rPr lang="en-US" sz="1100" dirty="0">
                 <a:solidFill>
                   <a:prstClr val="black"/>
                 </a:solidFill>
@@ -5708,7 +5721,7 @@
               <a:t> </a:t>
             </a:r>
             <a:r>
-              <a:rPr lang="en-US" sz="1200" dirty="0">
+              <a:rPr lang="en-US" sz="1100" dirty="0">
                 <a:solidFill>
                   <a:srgbClr val="FF0000"/>
                 </a:solidFill>
@@ -5717,7 +5730,7 @@
               <a:t>id</a:t>
             </a:r>
             <a:r>
-              <a:rPr lang="en-US" sz="1200" dirty="0">
+              <a:rPr lang="en-US" sz="1100" dirty="0">
                 <a:solidFill>
                   <a:srgbClr val="0000FF"/>
                 </a:solidFill>
@@ -5726,7 +5739,7 @@
               <a:t>="</a:t>
             </a:r>
             <a:r>
-              <a:rPr lang="en-US" sz="1200" dirty="0" err="1">
+              <a:rPr lang="en-US" sz="1100" dirty="0" err="1">
                 <a:solidFill>
                   <a:srgbClr val="0000FF"/>
                 </a:solidFill>
@@ -5735,7 +5748,7 @@
               <a:t>LeakedDiv</a:t>
             </a:r>
             <a:r>
-              <a:rPr lang="en-US" sz="1200" dirty="0">
+              <a:rPr lang="en-US" sz="1100" dirty="0">
                 <a:solidFill>
                   <a:srgbClr val="0000FF"/>
                 </a:solidFill>
@@ -5743,7 +5756,7 @@
               </a:rPr>
               <a:t>"&gt;</a:t>
             </a:r>
-            <a:endParaRPr lang="en-US" sz="1200" dirty="0">
+            <a:endParaRPr lang="en-US" sz="1100" dirty="0">
               <a:solidFill>
                 <a:prstClr val="black"/>
               </a:solidFill>
@@ -5752,7 +5765,7 @@
           </a:p>
           <a:p>
             <a:r>
-              <a:rPr lang="en-US" sz="1200" dirty="0" smtClean="0">
+              <a:rPr lang="en-US" sz="1100" dirty="0" smtClean="0">
                 <a:solidFill>
                   <a:prstClr val="black"/>
                 </a:solidFill>
@@ -5761,7 +5774,7 @@
               <a:t>        Leaked </a:t>
             </a:r>
             <a:r>
-              <a:rPr lang="en-US" sz="1200" dirty="0" err="1">
+              <a:rPr lang="en-US" sz="1100" dirty="0" err="1">
                 <a:solidFill>
                   <a:prstClr val="black"/>
                 </a:solidFill>
@@ -5769,7 +5782,7 @@
               </a:rPr>
               <a:t>Div</a:t>
             </a:r>
-            <a:endParaRPr lang="en-US" sz="1200" dirty="0">
+            <a:endParaRPr lang="en-US" sz="1100" dirty="0">
               <a:solidFill>
                 <a:prstClr val="black"/>
               </a:solidFill>
@@ -5778,7 +5791,7 @@
           </a:p>
           <a:p>
             <a:r>
-              <a:rPr lang="en-US" sz="1200" dirty="0" smtClean="0">
+              <a:rPr lang="en-US" sz="1100" dirty="0" smtClean="0">
                 <a:solidFill>
                   <a:srgbClr val="0000FF"/>
                 </a:solidFill>
@@ -5787,7 +5800,7 @@
               <a:t>        &lt;/</a:t>
             </a:r>
             <a:r>
-              <a:rPr lang="en-US" sz="1200" dirty="0">
+              <a:rPr lang="en-US" sz="1100" dirty="0">
                 <a:solidFill>
                   <a:srgbClr val="800000"/>
                 </a:solidFill>
@@ -5796,7 +5809,7 @@
               <a:t>div</a:t>
             </a:r>
             <a:r>
-              <a:rPr lang="en-US" sz="1200" dirty="0">
+              <a:rPr lang="en-US" sz="1100" dirty="0">
                 <a:solidFill>
                   <a:srgbClr val="0000FF"/>
                 </a:solidFill>
@@ -5804,7 +5817,7 @@
               </a:rPr>
               <a:t>&gt;</a:t>
             </a:r>
-            <a:endParaRPr lang="en-US" sz="1200" dirty="0">
+            <a:endParaRPr lang="en-US" sz="1100" dirty="0">
               <a:solidFill>
                 <a:prstClr val="black"/>
               </a:solidFill>
@@ -5812,7 +5825,7 @@
             </a:endParaRPr>
           </a:p>
           <a:p>
-            <a:endParaRPr lang="en-US" sz="1200" dirty="0" smtClean="0">
+            <a:endParaRPr lang="en-US" sz="1100" dirty="0" smtClean="0">
               <a:solidFill>
                 <a:srgbClr val="0000FF"/>
               </a:solidFill>
@@ -5821,7 +5834,7 @@
           </a:p>
           <a:p>
             <a:r>
-              <a:rPr lang="en-US" sz="1200" dirty="0" smtClean="0">
+              <a:rPr lang="en-US" sz="1100" dirty="0" smtClean="0">
                 <a:solidFill>
                   <a:srgbClr val="0000FF"/>
                 </a:solidFill>
@@ -5830,7 +5843,7 @@
               <a:t>     &lt;/</a:t>
             </a:r>
             <a:r>
-              <a:rPr lang="en-US" sz="1200" dirty="0">
+              <a:rPr lang="en-US" sz="1100" dirty="0">
                 <a:solidFill>
                   <a:srgbClr val="800000"/>
                 </a:solidFill>
@@ -5839,7 +5852,7 @@
               <a:t>div</a:t>
             </a:r>
             <a:r>
-              <a:rPr lang="en-US" sz="1200" dirty="0" smtClean="0">
+              <a:rPr lang="en-US" sz="1100" dirty="0" smtClean="0">
                 <a:solidFill>
                   <a:srgbClr val="0000FF"/>
                 </a:solidFill>
@@ -5848,7 +5861,7 @@
               <a:t>&gt;</a:t>
             </a:r>
             <a:r>
-              <a:rPr lang="en-US" sz="1200" dirty="0">
+              <a:rPr lang="en-US" sz="1100" dirty="0">
                 <a:solidFill>
                   <a:srgbClr val="0000FF"/>
                 </a:solidFill>
@@ -5857,7 +5870,7 @@
               <a:t> </a:t>
             </a:r>
             <a:r>
-              <a:rPr lang="en-US" sz="1200" dirty="0" smtClean="0">
+              <a:rPr lang="en-US" sz="1100" dirty="0" smtClean="0">
                 <a:solidFill>
                   <a:srgbClr val="0000FF"/>
                 </a:solidFill>
@@ -5866,7 +5879,7 @@
               <a:t/>
             </a:r>
             <a:br>
-              <a:rPr lang="en-US" sz="1200" dirty="0" smtClean="0">
+              <a:rPr lang="en-US" sz="1100" dirty="0" smtClean="0">
                 <a:solidFill>
                   <a:srgbClr val="0000FF"/>
                 </a:solidFill>
@@ -5874,7 +5887,7 @@
               </a:rPr>
             </a:br>
             <a:r>
-              <a:rPr lang="en-US" sz="1200" dirty="0" smtClean="0">
+              <a:rPr lang="en-US" sz="1100" dirty="0" smtClean="0">
                 <a:solidFill>
                   <a:srgbClr val="0000FF"/>
                 </a:solidFill>
@@ -5883,7 +5896,7 @@
               <a:t>&lt;/ </a:t>
             </a:r>
             <a:r>
-              <a:rPr lang="en-US" sz="1200" dirty="0" smtClean="0">
+              <a:rPr lang="en-US" sz="1100" dirty="0" smtClean="0">
                 <a:solidFill>
                   <a:srgbClr val="800000"/>
                 </a:solidFill>
@@ -5892,7 +5905,7 @@
               <a:t>body</a:t>
             </a:r>
             <a:r>
-              <a:rPr lang="en-US" sz="1200" dirty="0" smtClean="0">
+              <a:rPr lang="en-US" sz="1100" dirty="0" smtClean="0">
                 <a:solidFill>
                   <a:srgbClr val="0000FF"/>
                 </a:solidFill>
@@ -5901,7 +5914,7 @@
               <a:t>&gt;</a:t>
             </a:r>
             <a:r>
-              <a:rPr lang="en-US" sz="1200" dirty="0" smtClean="0">
+              <a:rPr lang="en-US" sz="1100" dirty="0" smtClean="0">
                 <a:solidFill>
                   <a:prstClr val="black"/>
                 </a:solidFill>
@@ -5909,7 +5922,7 @@
               </a:rPr>
               <a:t> </a:t>
             </a:r>
-            <a:endParaRPr lang="en-US" sz="1200" dirty="0">
+            <a:endParaRPr lang="en-US" sz="1100" dirty="0">
               <a:solidFill>
                 <a:prstClr val="black"/>
               </a:solidFill>
@@ -5917,7 +5930,7 @@
             </a:endParaRPr>
           </a:p>
           <a:p>
-            <a:endParaRPr lang="en-US" dirty="0"/>
+            <a:endParaRPr lang="en-US" sz="1600" dirty="0"/>
           </a:p>
         </p:txBody>
       </p:sp>
@@ -5968,7 +5981,12 @@
             <p:ph type="title"/>
           </p:nvPr>
         </p:nvSpPr>
-        <p:spPr/>
+        <p:spPr>
+          <a:xfrm>
+            <a:off x="457200" y="36352"/>
+            <a:ext cx="8229600" cy="1143000"/>
+          </a:xfrm>
+        </p:spPr>
         <p:txBody>
           <a:bodyPr>
             <a:normAutofit/>
@@ -5995,15 +6013,1454 @@
         </p:nvSpPr>
         <p:spPr>
           <a:xfrm>
-            <a:off x="4876800" y="1600200"/>
-            <a:ext cx="3810000" cy="4800599"/>
+            <a:off x="4876800" y="990600"/>
+            <a:ext cx="3810000" cy="5486400"/>
           </a:xfrm>
         </p:spPr>
         <p:txBody>
-          <a:bodyPr/>
+          <a:bodyPr>
+            <a:noAutofit/>
+          </a:bodyPr>
           <a:lstStyle/>
           <a:p>
-            <a:endParaRPr lang="en-US" dirty="0"/>
+            <a:pPr marL="0" indent="0">
+              <a:buNone/>
+            </a:pPr>
+            <a:r>
+              <a:rPr lang="en-US" sz="1000" dirty="0">
+                <a:solidFill>
+                  <a:srgbClr val="0000FF"/>
+                </a:solidFill>
+                <a:latin typeface="Arial"/>
+              </a:rPr>
+              <a:t>&lt;</a:t>
+            </a:r>
+            <a:r>
+              <a:rPr lang="en-US" sz="1000" dirty="0">
+                <a:solidFill>
+                  <a:srgbClr val="800000"/>
+                </a:solidFill>
+                <a:latin typeface="Arial"/>
+              </a:rPr>
+              <a:t>script</a:t>
+            </a:r>
+            <a:r>
+              <a:rPr lang="en-US" sz="1000" dirty="0">
+                <a:solidFill>
+                  <a:prstClr val="black"/>
+                </a:solidFill>
+                <a:latin typeface="Arial"/>
+              </a:rPr>
+              <a:t> </a:t>
+            </a:r>
+            <a:r>
+              <a:rPr lang="en-US" sz="1000" dirty="0">
+                <a:solidFill>
+                  <a:srgbClr val="FF0000"/>
+                </a:solidFill>
+                <a:latin typeface="Arial"/>
+              </a:rPr>
+              <a:t>type</a:t>
+            </a:r>
+            <a:r>
+              <a:rPr lang="en-US" sz="1000" dirty="0">
+                <a:solidFill>
+                  <a:srgbClr val="0000FF"/>
+                </a:solidFill>
+                <a:latin typeface="Arial"/>
+              </a:rPr>
+              <a:t>="text/</a:t>
+            </a:r>
+            <a:r>
+              <a:rPr lang="en-US" sz="1000" dirty="0" err="1">
+                <a:solidFill>
+                  <a:srgbClr val="0000FF"/>
+                </a:solidFill>
+                <a:latin typeface="Arial"/>
+              </a:rPr>
+              <a:t>javascript</a:t>
+            </a:r>
+            <a:r>
+              <a:rPr lang="en-US" sz="1000" dirty="0">
+                <a:solidFill>
+                  <a:srgbClr val="0000FF"/>
+                </a:solidFill>
+                <a:latin typeface="Arial"/>
+              </a:rPr>
+              <a:t>"&gt;</a:t>
+            </a:r>
+            <a:endParaRPr lang="en-US" sz="1000" dirty="0">
+              <a:solidFill>
+                <a:prstClr val="black"/>
+              </a:solidFill>
+              <a:latin typeface="Arial"/>
+            </a:endParaRPr>
+          </a:p>
+          <a:p>
+            <a:pPr marL="0" indent="0">
+              <a:buNone/>
+            </a:pPr>
+            <a:r>
+              <a:rPr lang="en-US" sz="1000" dirty="0">
+                <a:solidFill>
+                  <a:srgbClr val="0000FF"/>
+                </a:solidFill>
+                <a:latin typeface="Arial"/>
+              </a:rPr>
+              <a:t>function</a:t>
+            </a:r>
+            <a:r>
+              <a:rPr lang="en-US" sz="1000" dirty="0">
+                <a:solidFill>
+                  <a:prstClr val="black"/>
+                </a:solidFill>
+                <a:latin typeface="Arial"/>
+              </a:rPr>
+              <a:t> </a:t>
+            </a:r>
+            <a:r>
+              <a:rPr lang="en-US" sz="1000" dirty="0" err="1">
+                <a:solidFill>
+                  <a:prstClr val="black"/>
+                </a:solidFill>
+                <a:latin typeface="Arial"/>
+              </a:rPr>
+              <a:t>LeakMemory</a:t>
+            </a:r>
+            <a:r>
+              <a:rPr lang="en-US" sz="1000" dirty="0">
+                <a:solidFill>
+                  <a:prstClr val="black"/>
+                </a:solidFill>
+                <a:latin typeface="Arial"/>
+              </a:rPr>
+              <a:t>()</a:t>
+            </a:r>
+          </a:p>
+          <a:p>
+            <a:pPr marL="0" indent="0">
+              <a:buNone/>
+            </a:pPr>
+            <a:r>
+              <a:rPr lang="en-US" sz="1000" dirty="0">
+                <a:solidFill>
+                  <a:prstClr val="black"/>
+                </a:solidFill>
+                <a:latin typeface="Arial"/>
+              </a:rPr>
+              <a:t>{</a:t>
+            </a:r>
+          </a:p>
+          <a:p>
+            <a:pPr marL="0" indent="0">
+              <a:buNone/>
+            </a:pPr>
+            <a:r>
+              <a:rPr lang="en-US" sz="1000" dirty="0" smtClean="0">
+                <a:solidFill>
+                  <a:srgbClr val="0000FF"/>
+                </a:solidFill>
+                <a:latin typeface="Arial"/>
+              </a:rPr>
+              <a:t>     </a:t>
+            </a:r>
+            <a:r>
+              <a:rPr lang="en-US" sz="1000" dirty="0" err="1" smtClean="0">
+                <a:solidFill>
+                  <a:srgbClr val="0000FF"/>
+                </a:solidFill>
+                <a:latin typeface="Arial"/>
+              </a:rPr>
+              <a:t>var</a:t>
+            </a:r>
+            <a:r>
+              <a:rPr lang="en-US" sz="1000" dirty="0" smtClean="0">
+                <a:solidFill>
+                  <a:prstClr val="black"/>
+                </a:solidFill>
+                <a:latin typeface="Arial"/>
+              </a:rPr>
+              <a:t> </a:t>
+            </a:r>
+            <a:r>
+              <a:rPr lang="en-US" sz="1000" dirty="0" err="1">
+                <a:solidFill>
+                  <a:prstClr val="black"/>
+                </a:solidFill>
+                <a:latin typeface="Arial"/>
+              </a:rPr>
+              <a:t>hostElement</a:t>
+            </a:r>
+            <a:r>
+              <a:rPr lang="en-US" sz="1000" dirty="0">
+                <a:solidFill>
+                  <a:prstClr val="black"/>
+                </a:solidFill>
+                <a:latin typeface="Arial"/>
+              </a:rPr>
+              <a:t> = </a:t>
+            </a:r>
+            <a:r>
+              <a:rPr lang="en-US" sz="1000" dirty="0" err="1">
+                <a:solidFill>
+                  <a:prstClr val="black"/>
+                </a:solidFill>
+                <a:latin typeface="Arial"/>
+              </a:rPr>
+              <a:t>document.getElementById</a:t>
+            </a:r>
+            <a:r>
+              <a:rPr lang="en-US" sz="1000" dirty="0">
+                <a:solidFill>
+                  <a:prstClr val="black"/>
+                </a:solidFill>
+                <a:latin typeface="Arial"/>
+              </a:rPr>
+              <a:t>(</a:t>
+            </a:r>
+            <a:r>
+              <a:rPr lang="en-US" sz="1000" dirty="0">
+                <a:solidFill>
+                  <a:srgbClr val="800000"/>
+                </a:solidFill>
+                <a:latin typeface="Arial"/>
+              </a:rPr>
+              <a:t>"</a:t>
+            </a:r>
+            <a:r>
+              <a:rPr lang="en-US" sz="1000" dirty="0" err="1">
+                <a:solidFill>
+                  <a:srgbClr val="800000"/>
+                </a:solidFill>
+                <a:latin typeface="Arial"/>
+              </a:rPr>
+              <a:t>hostElement</a:t>
+            </a:r>
+            <a:r>
+              <a:rPr lang="en-US" sz="1000" dirty="0">
+                <a:solidFill>
+                  <a:srgbClr val="800000"/>
+                </a:solidFill>
+                <a:latin typeface="Arial"/>
+              </a:rPr>
+              <a:t>"</a:t>
+            </a:r>
+            <a:r>
+              <a:rPr lang="en-US" sz="1000" dirty="0">
+                <a:solidFill>
+                  <a:prstClr val="black"/>
+                </a:solidFill>
+                <a:latin typeface="Arial"/>
+              </a:rPr>
+              <a:t>);</a:t>
+            </a:r>
+          </a:p>
+          <a:p>
+            <a:pPr marL="0" indent="0">
+              <a:buNone/>
+            </a:pPr>
+            <a:endParaRPr lang="en-US" sz="1000" dirty="0">
+              <a:solidFill>
+                <a:prstClr val="black"/>
+              </a:solidFill>
+              <a:latin typeface="Arial"/>
+            </a:endParaRPr>
+          </a:p>
+          <a:p>
+            <a:pPr marL="0" indent="0">
+              <a:buNone/>
+            </a:pPr>
+            <a:r>
+              <a:rPr lang="en-US" sz="1000" dirty="0" smtClean="0">
+                <a:solidFill>
+                  <a:srgbClr val="006400"/>
+                </a:solidFill>
+                <a:latin typeface="Arial"/>
+              </a:rPr>
+              <a:t>      // </a:t>
+            </a:r>
+            <a:r>
+              <a:rPr lang="en-US" sz="1000" dirty="0">
+                <a:solidFill>
+                  <a:srgbClr val="006400"/>
+                </a:solidFill>
+                <a:latin typeface="Arial"/>
+              </a:rPr>
+              <a:t>Do it a lot, look at Task Manager for memory </a:t>
+            </a:r>
+            <a:r>
+              <a:rPr lang="en-US" sz="1000" dirty="0" smtClean="0">
+                <a:solidFill>
+                  <a:srgbClr val="006400"/>
+                </a:solidFill>
+                <a:latin typeface="Arial"/>
+              </a:rPr>
+              <a:t>response</a:t>
+            </a:r>
+            <a:endParaRPr lang="en-US" sz="1000" dirty="0">
+              <a:solidFill>
+                <a:prstClr val="black"/>
+              </a:solidFill>
+              <a:latin typeface="Arial"/>
+            </a:endParaRPr>
+          </a:p>
+          <a:p>
+            <a:pPr marL="0" indent="0">
+              <a:buNone/>
+            </a:pPr>
+            <a:r>
+              <a:rPr lang="nn-NO" sz="1000" dirty="0" smtClean="0">
+                <a:solidFill>
+                  <a:srgbClr val="0000FF"/>
+                </a:solidFill>
+                <a:latin typeface="Arial"/>
+              </a:rPr>
+              <a:t>      for</a:t>
+            </a:r>
+            <a:r>
+              <a:rPr lang="nn-NO" sz="1000" dirty="0" smtClean="0">
+                <a:solidFill>
+                  <a:prstClr val="black"/>
+                </a:solidFill>
+                <a:latin typeface="Arial"/>
+              </a:rPr>
+              <a:t> </a:t>
+            </a:r>
+            <a:r>
+              <a:rPr lang="nn-NO" sz="1000" dirty="0">
+                <a:solidFill>
+                  <a:prstClr val="black"/>
+                </a:solidFill>
+                <a:latin typeface="Arial"/>
+              </a:rPr>
+              <a:t>(i = 0; i &lt; 5000; i++)</a:t>
+            </a:r>
+          </a:p>
+          <a:p>
+            <a:pPr marL="0" indent="0">
+              <a:buNone/>
+            </a:pPr>
+            <a:r>
+              <a:rPr lang="en-US" sz="1000" dirty="0" smtClean="0">
+                <a:solidFill>
+                  <a:prstClr val="black"/>
+                </a:solidFill>
+                <a:latin typeface="Arial"/>
+              </a:rPr>
+              <a:t>      {</a:t>
+            </a:r>
+            <a:endParaRPr lang="en-US" sz="1000" dirty="0">
+              <a:solidFill>
+                <a:prstClr val="black"/>
+              </a:solidFill>
+              <a:latin typeface="Arial"/>
+            </a:endParaRPr>
+          </a:p>
+          <a:p>
+            <a:pPr marL="0" indent="0">
+              <a:buNone/>
+            </a:pPr>
+            <a:r>
+              <a:rPr lang="en-US" sz="1000" dirty="0" smtClean="0">
+                <a:solidFill>
+                  <a:srgbClr val="0000FF"/>
+                </a:solidFill>
+                <a:latin typeface="Arial"/>
+              </a:rPr>
+              <a:t>           </a:t>
+            </a:r>
+            <a:r>
+              <a:rPr lang="en-US" sz="1000" dirty="0" err="1" smtClean="0">
+                <a:solidFill>
+                  <a:srgbClr val="0000FF"/>
+                </a:solidFill>
+                <a:latin typeface="Arial"/>
+              </a:rPr>
+              <a:t>var</a:t>
+            </a:r>
+            <a:r>
+              <a:rPr lang="en-US" sz="1000" dirty="0" smtClean="0">
+                <a:solidFill>
+                  <a:prstClr val="black"/>
+                </a:solidFill>
+                <a:latin typeface="Arial"/>
+              </a:rPr>
+              <a:t> </a:t>
+            </a:r>
+            <a:r>
+              <a:rPr lang="en-US" sz="1000" dirty="0" err="1">
+                <a:solidFill>
+                  <a:prstClr val="black"/>
+                </a:solidFill>
+                <a:latin typeface="Arial"/>
+              </a:rPr>
+              <a:t>parentDiv</a:t>
+            </a:r>
+            <a:r>
+              <a:rPr lang="en-US" sz="1000" dirty="0">
+                <a:solidFill>
+                  <a:prstClr val="black"/>
+                </a:solidFill>
+                <a:latin typeface="Arial"/>
+              </a:rPr>
+              <a:t> =</a:t>
+            </a:r>
+          </a:p>
+          <a:p>
+            <a:pPr marL="0" indent="0">
+              <a:buNone/>
+            </a:pPr>
+            <a:r>
+              <a:rPr lang="en-US" sz="1000" dirty="0">
+                <a:solidFill>
+                  <a:prstClr val="black"/>
+                </a:solidFill>
+                <a:latin typeface="Arial"/>
+              </a:rPr>
+              <a:t>                    </a:t>
+            </a:r>
+            <a:r>
+              <a:rPr lang="en-US" sz="1000" dirty="0" err="1">
+                <a:solidFill>
+                  <a:prstClr val="black"/>
+                </a:solidFill>
+                <a:latin typeface="Arial"/>
+              </a:rPr>
+              <a:t>document.createElement</a:t>
+            </a:r>
+            <a:r>
+              <a:rPr lang="en-US" sz="1000" dirty="0">
+                <a:solidFill>
+                  <a:prstClr val="black"/>
+                </a:solidFill>
+                <a:latin typeface="Arial"/>
+              </a:rPr>
+              <a:t>(</a:t>
+            </a:r>
+            <a:r>
+              <a:rPr lang="en-US" sz="1000" dirty="0">
+                <a:solidFill>
+                  <a:srgbClr val="800000"/>
+                </a:solidFill>
+                <a:latin typeface="Arial"/>
+              </a:rPr>
+              <a:t>"&lt;div </a:t>
+            </a:r>
+            <a:r>
+              <a:rPr lang="en-US" sz="1000" dirty="0" err="1">
+                <a:solidFill>
+                  <a:srgbClr val="800000"/>
+                </a:solidFill>
+                <a:latin typeface="Arial"/>
+              </a:rPr>
+              <a:t>onClick</a:t>
+            </a:r>
+            <a:r>
+              <a:rPr lang="en-US" sz="1000" dirty="0">
+                <a:solidFill>
+                  <a:srgbClr val="800000"/>
+                </a:solidFill>
+                <a:latin typeface="Arial"/>
+              </a:rPr>
+              <a:t>='foo()'&gt;"</a:t>
+            </a:r>
+            <a:r>
+              <a:rPr lang="en-US" sz="1000" dirty="0">
+                <a:solidFill>
+                  <a:prstClr val="black"/>
+                </a:solidFill>
+                <a:latin typeface="Arial"/>
+              </a:rPr>
+              <a:t>);</a:t>
+            </a:r>
+          </a:p>
+          <a:p>
+            <a:pPr marL="0" indent="0">
+              <a:buNone/>
+            </a:pPr>
+            <a:r>
+              <a:rPr lang="en-US" sz="1000" dirty="0" smtClean="0">
+                <a:solidFill>
+                  <a:srgbClr val="0000FF"/>
+                </a:solidFill>
+                <a:latin typeface="Arial"/>
+              </a:rPr>
+              <a:t>           </a:t>
+            </a:r>
+            <a:r>
+              <a:rPr lang="en-US" sz="1000" dirty="0" err="1" smtClean="0">
+                <a:solidFill>
+                  <a:srgbClr val="0000FF"/>
+                </a:solidFill>
+                <a:latin typeface="Arial"/>
+              </a:rPr>
+              <a:t>var</a:t>
+            </a:r>
+            <a:r>
+              <a:rPr lang="en-US" sz="1000" dirty="0" smtClean="0">
+                <a:solidFill>
+                  <a:prstClr val="black"/>
+                </a:solidFill>
+                <a:latin typeface="Arial"/>
+              </a:rPr>
+              <a:t> </a:t>
+            </a:r>
+            <a:r>
+              <a:rPr lang="en-US" sz="1000" dirty="0" err="1">
+                <a:solidFill>
+                  <a:prstClr val="black"/>
+                </a:solidFill>
+                <a:latin typeface="Arial"/>
+              </a:rPr>
+              <a:t>childDiv</a:t>
+            </a:r>
+            <a:r>
+              <a:rPr lang="en-US" sz="1000" dirty="0">
+                <a:solidFill>
+                  <a:prstClr val="black"/>
+                </a:solidFill>
+                <a:latin typeface="Arial"/>
+              </a:rPr>
+              <a:t> =</a:t>
+            </a:r>
+          </a:p>
+          <a:p>
+            <a:pPr marL="0" indent="0">
+              <a:buNone/>
+            </a:pPr>
+            <a:r>
+              <a:rPr lang="en-US" sz="1000" dirty="0">
+                <a:solidFill>
+                  <a:prstClr val="black"/>
+                </a:solidFill>
+                <a:latin typeface="Arial"/>
+              </a:rPr>
+              <a:t>                    </a:t>
+            </a:r>
+            <a:r>
+              <a:rPr lang="en-US" sz="1000" dirty="0" err="1">
+                <a:solidFill>
+                  <a:prstClr val="black"/>
+                </a:solidFill>
+                <a:latin typeface="Arial"/>
+              </a:rPr>
+              <a:t>document.createElement</a:t>
+            </a:r>
+            <a:r>
+              <a:rPr lang="en-US" sz="1000" dirty="0">
+                <a:solidFill>
+                  <a:prstClr val="black"/>
+                </a:solidFill>
+                <a:latin typeface="Arial"/>
+              </a:rPr>
+              <a:t>(</a:t>
+            </a:r>
+            <a:r>
+              <a:rPr lang="en-US" sz="1000" dirty="0">
+                <a:solidFill>
+                  <a:srgbClr val="800000"/>
+                </a:solidFill>
+                <a:latin typeface="Arial"/>
+              </a:rPr>
+              <a:t>"&lt;div </a:t>
+            </a:r>
+            <a:r>
+              <a:rPr lang="en-US" sz="1000" dirty="0" err="1">
+                <a:solidFill>
+                  <a:srgbClr val="800000"/>
+                </a:solidFill>
+                <a:latin typeface="Arial"/>
+              </a:rPr>
+              <a:t>onClick</a:t>
+            </a:r>
+            <a:r>
+              <a:rPr lang="en-US" sz="1000" dirty="0">
+                <a:solidFill>
+                  <a:srgbClr val="800000"/>
+                </a:solidFill>
+                <a:latin typeface="Arial"/>
+              </a:rPr>
+              <a:t>='foo()'&gt;"</a:t>
+            </a:r>
+            <a:r>
+              <a:rPr lang="en-US" sz="1000" dirty="0">
+                <a:solidFill>
+                  <a:prstClr val="black"/>
+                </a:solidFill>
+                <a:latin typeface="Arial"/>
+              </a:rPr>
+              <a:t>);</a:t>
+            </a:r>
+          </a:p>
+          <a:p>
+            <a:pPr marL="0" indent="0">
+              <a:buNone/>
+            </a:pPr>
+            <a:endParaRPr lang="en-US" sz="1000" dirty="0">
+              <a:solidFill>
+                <a:prstClr val="black"/>
+              </a:solidFill>
+              <a:latin typeface="Arial"/>
+            </a:endParaRPr>
+          </a:p>
+          <a:p>
+            <a:pPr marL="0" indent="0">
+              <a:buNone/>
+            </a:pPr>
+            <a:r>
+              <a:rPr lang="en-US" sz="1000" dirty="0" smtClean="0">
+                <a:solidFill>
+                  <a:srgbClr val="006400"/>
+                </a:solidFill>
+                <a:latin typeface="Arial"/>
+              </a:rPr>
+              <a:t>            // </a:t>
+            </a:r>
+            <a:r>
+              <a:rPr lang="en-US" sz="1000" dirty="0">
+                <a:solidFill>
+                  <a:srgbClr val="006400"/>
+                </a:solidFill>
+                <a:latin typeface="Arial"/>
+              </a:rPr>
+              <a:t>This will leak a temporary object</a:t>
+            </a:r>
+            <a:endParaRPr lang="en-US" sz="1000" dirty="0">
+              <a:solidFill>
+                <a:prstClr val="black"/>
+              </a:solidFill>
+              <a:latin typeface="Arial"/>
+            </a:endParaRPr>
+          </a:p>
+          <a:p>
+            <a:pPr marL="0" indent="0">
+              <a:buNone/>
+            </a:pPr>
+            <a:r>
+              <a:rPr lang="en-US" sz="1000" dirty="0" smtClean="0">
+                <a:solidFill>
+                  <a:prstClr val="black"/>
+                </a:solidFill>
+                <a:latin typeface="Arial"/>
+              </a:rPr>
+              <a:t>            </a:t>
+            </a:r>
+            <a:r>
+              <a:rPr lang="en-US" sz="1000" dirty="0" err="1" smtClean="0">
+                <a:solidFill>
+                  <a:prstClr val="black"/>
+                </a:solidFill>
+                <a:latin typeface="Arial"/>
+              </a:rPr>
+              <a:t>parentDiv.appendChild</a:t>
+            </a:r>
+            <a:r>
+              <a:rPr lang="en-US" sz="1000" dirty="0" smtClean="0">
+                <a:solidFill>
+                  <a:prstClr val="black"/>
+                </a:solidFill>
+                <a:latin typeface="Arial"/>
+              </a:rPr>
+              <a:t>(</a:t>
+            </a:r>
+            <a:r>
+              <a:rPr lang="en-US" sz="1000" dirty="0" err="1" smtClean="0">
+                <a:solidFill>
+                  <a:prstClr val="black"/>
+                </a:solidFill>
+                <a:latin typeface="Arial"/>
+              </a:rPr>
+              <a:t>childDiv</a:t>
+            </a:r>
+            <a:r>
+              <a:rPr lang="en-US" sz="1000" dirty="0">
+                <a:solidFill>
+                  <a:prstClr val="black"/>
+                </a:solidFill>
+                <a:latin typeface="Arial"/>
+              </a:rPr>
+              <a:t>);</a:t>
+            </a:r>
+          </a:p>
+          <a:p>
+            <a:pPr marL="0" indent="0">
+              <a:buNone/>
+            </a:pPr>
+            <a:r>
+              <a:rPr lang="en-US" sz="1000" dirty="0" smtClean="0">
+                <a:solidFill>
+                  <a:prstClr val="black"/>
+                </a:solidFill>
+                <a:latin typeface="Arial"/>
+              </a:rPr>
+              <a:t>            </a:t>
+            </a:r>
+            <a:r>
+              <a:rPr lang="en-US" sz="1000" dirty="0" err="1" smtClean="0">
+                <a:solidFill>
+                  <a:prstClr val="black"/>
+                </a:solidFill>
+                <a:latin typeface="Arial"/>
+              </a:rPr>
+              <a:t>hostElement.appendChild</a:t>
+            </a:r>
+            <a:r>
+              <a:rPr lang="en-US" sz="1000" dirty="0" smtClean="0">
+                <a:solidFill>
+                  <a:prstClr val="black"/>
+                </a:solidFill>
+                <a:latin typeface="Arial"/>
+              </a:rPr>
+              <a:t>(</a:t>
+            </a:r>
+            <a:r>
+              <a:rPr lang="en-US" sz="1000" dirty="0" err="1" smtClean="0">
+                <a:solidFill>
+                  <a:prstClr val="black"/>
+                </a:solidFill>
+                <a:latin typeface="Arial"/>
+              </a:rPr>
+              <a:t>parentDiv</a:t>
+            </a:r>
+            <a:r>
+              <a:rPr lang="en-US" sz="1000" dirty="0">
+                <a:solidFill>
+                  <a:prstClr val="black"/>
+                </a:solidFill>
+                <a:latin typeface="Arial"/>
+              </a:rPr>
+              <a:t>);</a:t>
+            </a:r>
+          </a:p>
+          <a:p>
+            <a:pPr marL="0" indent="0">
+              <a:buNone/>
+            </a:pPr>
+            <a:r>
+              <a:rPr lang="en-US" sz="1000" dirty="0" smtClean="0">
+                <a:solidFill>
+                  <a:prstClr val="black"/>
+                </a:solidFill>
+                <a:latin typeface="Arial"/>
+              </a:rPr>
+              <a:t>            </a:t>
+            </a:r>
+            <a:r>
+              <a:rPr lang="en-US" sz="1000" dirty="0" err="1" smtClean="0">
+                <a:solidFill>
+                  <a:prstClr val="black"/>
+                </a:solidFill>
+                <a:latin typeface="Arial"/>
+              </a:rPr>
+              <a:t>hostElement.removeChild</a:t>
+            </a:r>
+            <a:r>
+              <a:rPr lang="en-US" sz="1000" dirty="0" smtClean="0">
+                <a:solidFill>
+                  <a:prstClr val="black"/>
+                </a:solidFill>
+                <a:latin typeface="Arial"/>
+              </a:rPr>
+              <a:t>(</a:t>
+            </a:r>
+            <a:r>
+              <a:rPr lang="en-US" sz="1000" dirty="0" err="1" smtClean="0">
+                <a:solidFill>
+                  <a:prstClr val="black"/>
+                </a:solidFill>
+                <a:latin typeface="Arial"/>
+              </a:rPr>
+              <a:t>parentDiv</a:t>
+            </a:r>
+            <a:r>
+              <a:rPr lang="en-US" sz="1000" dirty="0">
+                <a:solidFill>
+                  <a:prstClr val="black"/>
+                </a:solidFill>
+                <a:latin typeface="Arial"/>
+              </a:rPr>
+              <a:t>);</a:t>
+            </a:r>
+          </a:p>
+          <a:p>
+            <a:pPr marL="0" indent="0">
+              <a:buNone/>
+            </a:pPr>
+            <a:r>
+              <a:rPr lang="en-US" sz="1000" dirty="0" smtClean="0">
+                <a:solidFill>
+                  <a:prstClr val="black"/>
+                </a:solidFill>
+                <a:latin typeface="Arial"/>
+              </a:rPr>
+              <a:t>            </a:t>
+            </a:r>
+            <a:r>
+              <a:rPr lang="en-US" sz="1000" dirty="0" err="1" smtClean="0">
+                <a:solidFill>
+                  <a:prstClr val="black"/>
+                </a:solidFill>
+                <a:latin typeface="Arial"/>
+              </a:rPr>
+              <a:t>parentDiv.removeChild</a:t>
+            </a:r>
+            <a:r>
+              <a:rPr lang="en-US" sz="1000" dirty="0" smtClean="0">
+                <a:solidFill>
+                  <a:prstClr val="black"/>
+                </a:solidFill>
+                <a:latin typeface="Arial"/>
+              </a:rPr>
+              <a:t>(</a:t>
+            </a:r>
+            <a:r>
+              <a:rPr lang="en-US" sz="1000" dirty="0" err="1" smtClean="0">
+                <a:solidFill>
+                  <a:prstClr val="black"/>
+                </a:solidFill>
+                <a:latin typeface="Arial"/>
+              </a:rPr>
+              <a:t>childDiv</a:t>
+            </a:r>
+            <a:r>
+              <a:rPr lang="en-US" sz="1000" dirty="0">
+                <a:solidFill>
+                  <a:prstClr val="black"/>
+                </a:solidFill>
+                <a:latin typeface="Arial"/>
+              </a:rPr>
+              <a:t>);</a:t>
+            </a:r>
+          </a:p>
+          <a:p>
+            <a:pPr marL="0" indent="0">
+              <a:buNone/>
+            </a:pPr>
+            <a:r>
+              <a:rPr lang="en-US" sz="1000" dirty="0" smtClean="0">
+                <a:solidFill>
+                  <a:prstClr val="black"/>
+                </a:solidFill>
+                <a:latin typeface="Arial"/>
+              </a:rPr>
+              <a:t>            </a:t>
+            </a:r>
+            <a:r>
+              <a:rPr lang="en-US" sz="1000" dirty="0" err="1" smtClean="0">
+                <a:solidFill>
+                  <a:prstClr val="black"/>
+                </a:solidFill>
+                <a:latin typeface="Arial"/>
+              </a:rPr>
+              <a:t>parentDiv</a:t>
+            </a:r>
+            <a:r>
+              <a:rPr lang="en-US" sz="1000" dirty="0" smtClean="0">
+                <a:solidFill>
+                  <a:prstClr val="black"/>
+                </a:solidFill>
+                <a:latin typeface="Arial"/>
+              </a:rPr>
+              <a:t> </a:t>
+            </a:r>
+            <a:r>
+              <a:rPr lang="en-US" sz="1000" dirty="0">
+                <a:solidFill>
+                  <a:prstClr val="black"/>
+                </a:solidFill>
+                <a:latin typeface="Arial"/>
+              </a:rPr>
+              <a:t>= </a:t>
+            </a:r>
+            <a:r>
+              <a:rPr lang="en-US" sz="1000" dirty="0">
+                <a:solidFill>
+                  <a:srgbClr val="0000FF"/>
+                </a:solidFill>
+                <a:latin typeface="Arial"/>
+              </a:rPr>
+              <a:t>null</a:t>
+            </a:r>
+            <a:r>
+              <a:rPr lang="en-US" sz="1000" dirty="0">
+                <a:solidFill>
+                  <a:prstClr val="black"/>
+                </a:solidFill>
+                <a:latin typeface="Arial"/>
+              </a:rPr>
+              <a:t>;</a:t>
+            </a:r>
+          </a:p>
+          <a:p>
+            <a:pPr marL="0" indent="0">
+              <a:buNone/>
+            </a:pPr>
+            <a:r>
+              <a:rPr lang="en-US" sz="1000" dirty="0" smtClean="0">
+                <a:solidFill>
+                  <a:prstClr val="black"/>
+                </a:solidFill>
+                <a:latin typeface="Arial"/>
+              </a:rPr>
+              <a:t>            </a:t>
+            </a:r>
+            <a:r>
+              <a:rPr lang="en-US" sz="1000" dirty="0" err="1" smtClean="0">
+                <a:solidFill>
+                  <a:prstClr val="black"/>
+                </a:solidFill>
+                <a:latin typeface="Arial"/>
+              </a:rPr>
+              <a:t>childDiv</a:t>
+            </a:r>
+            <a:r>
+              <a:rPr lang="en-US" sz="1000" dirty="0" smtClean="0">
+                <a:solidFill>
+                  <a:prstClr val="black"/>
+                </a:solidFill>
+                <a:latin typeface="Arial"/>
+              </a:rPr>
+              <a:t> </a:t>
+            </a:r>
+            <a:r>
+              <a:rPr lang="en-US" sz="1000" dirty="0">
+                <a:solidFill>
+                  <a:prstClr val="black"/>
+                </a:solidFill>
+                <a:latin typeface="Arial"/>
+              </a:rPr>
+              <a:t>= </a:t>
+            </a:r>
+            <a:r>
+              <a:rPr lang="en-US" sz="1000" dirty="0">
+                <a:solidFill>
+                  <a:srgbClr val="0000FF"/>
+                </a:solidFill>
+                <a:latin typeface="Arial"/>
+              </a:rPr>
+              <a:t>null</a:t>
+            </a:r>
+            <a:r>
+              <a:rPr lang="en-US" sz="1000" dirty="0">
+                <a:solidFill>
+                  <a:prstClr val="black"/>
+                </a:solidFill>
+                <a:latin typeface="Arial"/>
+              </a:rPr>
+              <a:t>;</a:t>
+            </a:r>
+          </a:p>
+          <a:p>
+            <a:pPr marL="0" indent="0">
+              <a:buNone/>
+            </a:pPr>
+            <a:r>
+              <a:rPr lang="en-US" sz="1000" dirty="0" smtClean="0">
+                <a:solidFill>
+                  <a:prstClr val="black"/>
+                </a:solidFill>
+                <a:latin typeface="Arial"/>
+              </a:rPr>
+              <a:t>        }</a:t>
+            </a:r>
+            <a:endParaRPr lang="en-US" sz="1000" dirty="0">
+              <a:solidFill>
+                <a:prstClr val="black"/>
+              </a:solidFill>
+              <a:latin typeface="Arial"/>
+            </a:endParaRPr>
+          </a:p>
+          <a:p>
+            <a:pPr marL="0" indent="0">
+              <a:buNone/>
+            </a:pPr>
+            <a:r>
+              <a:rPr lang="en-US" sz="1000" dirty="0" smtClean="0">
+                <a:solidFill>
+                  <a:prstClr val="black"/>
+                </a:solidFill>
+                <a:latin typeface="Arial"/>
+              </a:rPr>
+              <a:t>        </a:t>
+            </a:r>
+            <a:r>
+              <a:rPr lang="en-US" sz="1000" dirty="0" err="1" smtClean="0">
+                <a:solidFill>
+                  <a:prstClr val="black"/>
+                </a:solidFill>
+                <a:latin typeface="Arial"/>
+              </a:rPr>
+              <a:t>hostElement</a:t>
+            </a:r>
+            <a:r>
+              <a:rPr lang="en-US" sz="1000" dirty="0" smtClean="0">
+                <a:solidFill>
+                  <a:prstClr val="black"/>
+                </a:solidFill>
+                <a:latin typeface="Arial"/>
+              </a:rPr>
+              <a:t> </a:t>
+            </a:r>
+            <a:r>
+              <a:rPr lang="en-US" sz="1000" dirty="0">
+                <a:solidFill>
+                  <a:prstClr val="black"/>
+                </a:solidFill>
+                <a:latin typeface="Arial"/>
+              </a:rPr>
+              <a:t>= </a:t>
+            </a:r>
+            <a:r>
+              <a:rPr lang="en-US" sz="1000" dirty="0">
+                <a:solidFill>
+                  <a:srgbClr val="0000FF"/>
+                </a:solidFill>
+                <a:latin typeface="Arial"/>
+              </a:rPr>
+              <a:t>null</a:t>
+            </a:r>
+            <a:r>
+              <a:rPr lang="en-US" sz="1000" dirty="0">
+                <a:solidFill>
+                  <a:prstClr val="black"/>
+                </a:solidFill>
+                <a:latin typeface="Arial"/>
+              </a:rPr>
+              <a:t>;</a:t>
+            </a:r>
+          </a:p>
+          <a:p>
+            <a:pPr marL="0" indent="0">
+              <a:buNone/>
+            </a:pPr>
+            <a:r>
+              <a:rPr lang="en-US" sz="1000" dirty="0">
+                <a:solidFill>
+                  <a:prstClr val="black"/>
+                </a:solidFill>
+                <a:latin typeface="Arial"/>
+              </a:rPr>
+              <a:t> </a:t>
+            </a:r>
+            <a:r>
+              <a:rPr lang="en-US" sz="1000" dirty="0" smtClean="0">
+                <a:solidFill>
+                  <a:prstClr val="black"/>
+                </a:solidFill>
+                <a:latin typeface="Arial"/>
+              </a:rPr>
+              <a:t>}</a:t>
+            </a:r>
+            <a:endParaRPr lang="en-US" sz="1000" dirty="0">
+              <a:solidFill>
+                <a:prstClr val="black"/>
+              </a:solidFill>
+              <a:latin typeface="Arial"/>
+            </a:endParaRPr>
+          </a:p>
+          <a:p>
+            <a:pPr marL="0" indent="0">
+              <a:buNone/>
+            </a:pPr>
+            <a:r>
+              <a:rPr lang="en-US" sz="1000" dirty="0">
+                <a:solidFill>
+                  <a:srgbClr val="0000FF"/>
+                </a:solidFill>
+                <a:latin typeface="Arial"/>
+              </a:rPr>
+              <a:t>&lt;/</a:t>
+            </a:r>
+            <a:r>
+              <a:rPr lang="en-US" sz="1000" dirty="0">
+                <a:solidFill>
+                  <a:srgbClr val="800000"/>
+                </a:solidFill>
+                <a:latin typeface="Arial"/>
+              </a:rPr>
+              <a:t>script</a:t>
+            </a:r>
+            <a:r>
+              <a:rPr lang="en-US" sz="1000" dirty="0">
+                <a:solidFill>
+                  <a:srgbClr val="0000FF"/>
+                </a:solidFill>
+                <a:latin typeface="Arial"/>
+              </a:rPr>
+              <a:t>&gt;</a:t>
+            </a:r>
+            <a:br>
+              <a:rPr lang="en-US" sz="1000" dirty="0">
+                <a:solidFill>
+                  <a:srgbClr val="0000FF"/>
+                </a:solidFill>
+                <a:latin typeface="Arial"/>
+              </a:rPr>
+            </a:br>
+            <a:r>
+              <a:rPr lang="en-US" sz="1000" dirty="0" smtClean="0">
+                <a:solidFill>
+                  <a:srgbClr val="0000FF"/>
+                </a:solidFill>
+                <a:latin typeface="Arial"/>
+              </a:rPr>
+              <a:t>&lt;</a:t>
+            </a:r>
+            <a:r>
+              <a:rPr lang="en-US" sz="1000" dirty="0" smtClean="0">
+                <a:solidFill>
+                  <a:srgbClr val="800000"/>
+                </a:solidFill>
+                <a:latin typeface="Arial"/>
+              </a:rPr>
+              <a:t>body</a:t>
+            </a:r>
+            <a:r>
+              <a:rPr lang="en-US" sz="1000" dirty="0" smtClean="0">
+                <a:solidFill>
+                  <a:srgbClr val="0000FF"/>
+                </a:solidFill>
+                <a:latin typeface="Arial"/>
+              </a:rPr>
+              <a:t>&gt;</a:t>
+            </a:r>
+            <a:endParaRPr lang="en-US" sz="1000" dirty="0">
+              <a:solidFill>
+                <a:prstClr val="black"/>
+              </a:solidFill>
+              <a:latin typeface="Arial"/>
+            </a:endParaRPr>
+          </a:p>
+          <a:p>
+            <a:pPr marL="0" indent="0">
+              <a:buNone/>
+            </a:pPr>
+            <a:r>
+              <a:rPr lang="en-US" sz="1000" dirty="0" smtClean="0">
+                <a:solidFill>
+                  <a:srgbClr val="0000FF"/>
+                </a:solidFill>
+                <a:latin typeface="Arial"/>
+              </a:rPr>
+              <a:t>    &lt;</a:t>
+            </a:r>
+            <a:r>
+              <a:rPr lang="en-US" sz="1000" dirty="0">
+                <a:solidFill>
+                  <a:srgbClr val="800000"/>
+                </a:solidFill>
+                <a:latin typeface="Arial"/>
+              </a:rPr>
+              <a:t>div</a:t>
+            </a:r>
+            <a:r>
+              <a:rPr lang="en-US" sz="1000" dirty="0">
+                <a:solidFill>
+                  <a:prstClr val="black"/>
+                </a:solidFill>
+                <a:latin typeface="Arial"/>
+              </a:rPr>
+              <a:t> </a:t>
+            </a:r>
+            <a:r>
+              <a:rPr lang="en-US" sz="1000" dirty="0">
+                <a:solidFill>
+                  <a:srgbClr val="FF0000"/>
+                </a:solidFill>
+                <a:latin typeface="Arial"/>
+              </a:rPr>
+              <a:t>id</a:t>
+            </a:r>
+            <a:r>
+              <a:rPr lang="en-US" sz="1000" dirty="0">
+                <a:solidFill>
+                  <a:srgbClr val="0000FF"/>
+                </a:solidFill>
+                <a:latin typeface="Arial"/>
+              </a:rPr>
+              <a:t>="</a:t>
+            </a:r>
+            <a:r>
+              <a:rPr lang="en-US" sz="1000" dirty="0" err="1">
+                <a:solidFill>
+                  <a:srgbClr val="0000FF"/>
+                </a:solidFill>
+                <a:latin typeface="Arial"/>
+              </a:rPr>
+              <a:t>buttonContainer</a:t>
+            </a:r>
+            <a:r>
+              <a:rPr lang="en-US" sz="1000" dirty="0">
+                <a:solidFill>
+                  <a:srgbClr val="0000FF"/>
+                </a:solidFill>
+                <a:latin typeface="Arial"/>
+              </a:rPr>
+              <a:t>"&gt;</a:t>
+            </a:r>
+            <a:endParaRPr lang="en-US" sz="1000" dirty="0">
+              <a:solidFill>
+                <a:prstClr val="black"/>
+              </a:solidFill>
+              <a:latin typeface="Arial"/>
+            </a:endParaRPr>
+          </a:p>
+          <a:p>
+            <a:pPr marL="0" indent="0">
+              <a:buNone/>
+            </a:pPr>
+            <a:r>
+              <a:rPr lang="en-US" sz="1000" dirty="0" smtClean="0">
+                <a:solidFill>
+                  <a:srgbClr val="0000FF"/>
+                </a:solidFill>
+                <a:latin typeface="Arial"/>
+              </a:rPr>
+              <a:t>        &lt;</a:t>
+            </a:r>
+            <a:r>
+              <a:rPr lang="en-US" sz="1000" dirty="0">
+                <a:solidFill>
+                  <a:srgbClr val="800000"/>
+                </a:solidFill>
+                <a:latin typeface="Arial"/>
+              </a:rPr>
+              <a:t>button</a:t>
+            </a:r>
+            <a:r>
+              <a:rPr lang="en-US" sz="1000" dirty="0">
+                <a:solidFill>
+                  <a:prstClr val="black"/>
+                </a:solidFill>
+                <a:latin typeface="Arial"/>
+              </a:rPr>
+              <a:t> </a:t>
+            </a:r>
+            <a:r>
+              <a:rPr lang="en-US" sz="1000" dirty="0" err="1">
+                <a:solidFill>
+                  <a:srgbClr val="FF0000"/>
+                </a:solidFill>
+                <a:latin typeface="Arial"/>
+              </a:rPr>
+              <a:t>onclick</a:t>
+            </a:r>
+            <a:r>
+              <a:rPr lang="en-US" sz="1000" dirty="0">
+                <a:solidFill>
+                  <a:srgbClr val="0000FF"/>
+                </a:solidFill>
+                <a:latin typeface="Arial"/>
+              </a:rPr>
+              <a:t>="</a:t>
+            </a:r>
+            <a:r>
+              <a:rPr lang="en-US" sz="1000" dirty="0" err="1">
+                <a:solidFill>
+                  <a:srgbClr val="0000FF"/>
+                </a:solidFill>
+                <a:latin typeface="Arial"/>
+              </a:rPr>
+              <a:t>LeakMemory</a:t>
+            </a:r>
+            <a:r>
+              <a:rPr lang="en-US" sz="1000" dirty="0" smtClean="0">
+                <a:solidFill>
+                  <a:srgbClr val="0000FF"/>
+                </a:solidFill>
+                <a:latin typeface="Arial"/>
+              </a:rPr>
+              <a:t>()"&gt;</a:t>
+            </a:r>
+          </a:p>
+          <a:p>
+            <a:pPr marL="0" indent="0">
+              <a:buNone/>
+            </a:pPr>
+            <a:r>
+              <a:rPr lang="en-US" sz="1000" dirty="0" smtClean="0">
+                <a:solidFill>
+                  <a:srgbClr val="0000FF"/>
+                </a:solidFill>
+                <a:latin typeface="Arial"/>
+              </a:rPr>
+              <a:t>            </a:t>
+            </a:r>
+            <a:r>
+              <a:rPr lang="en-US" sz="1000" dirty="0" smtClean="0">
+                <a:solidFill>
+                  <a:prstClr val="black"/>
+                </a:solidFill>
+                <a:latin typeface="Arial"/>
+              </a:rPr>
+              <a:t>Memory </a:t>
+            </a:r>
+            <a:r>
+              <a:rPr lang="en-US" sz="1000" dirty="0">
+                <a:solidFill>
+                  <a:prstClr val="black"/>
+                </a:solidFill>
+                <a:latin typeface="Arial"/>
+              </a:rPr>
+              <a:t>Leaking </a:t>
+            </a:r>
+            <a:r>
+              <a:rPr lang="en-US" sz="1000" dirty="0" smtClean="0">
+                <a:solidFill>
+                  <a:prstClr val="black"/>
+                </a:solidFill>
+                <a:latin typeface="Arial"/>
+              </a:rPr>
+              <a:t>Insert</a:t>
+            </a:r>
+          </a:p>
+          <a:p>
+            <a:pPr marL="0" indent="0">
+              <a:buNone/>
+            </a:pPr>
+            <a:r>
+              <a:rPr lang="en-US" sz="1000" dirty="0">
+                <a:solidFill>
+                  <a:prstClr val="black"/>
+                </a:solidFill>
+                <a:latin typeface="Arial"/>
+              </a:rPr>
+              <a:t> </a:t>
+            </a:r>
+            <a:r>
+              <a:rPr lang="en-US" sz="1000" dirty="0" smtClean="0">
+                <a:solidFill>
+                  <a:prstClr val="black"/>
+                </a:solidFill>
+                <a:latin typeface="Arial"/>
+              </a:rPr>
+              <a:t>       </a:t>
+            </a:r>
+            <a:r>
+              <a:rPr lang="en-US" sz="1000" dirty="0" smtClean="0">
+                <a:solidFill>
+                  <a:srgbClr val="0000FF"/>
+                </a:solidFill>
+                <a:latin typeface="Arial"/>
+              </a:rPr>
+              <a:t>&lt;/</a:t>
+            </a:r>
+            <a:r>
+              <a:rPr lang="en-US" sz="1000" dirty="0">
+                <a:solidFill>
+                  <a:srgbClr val="800000"/>
+                </a:solidFill>
+                <a:latin typeface="Arial"/>
+              </a:rPr>
+              <a:t>button</a:t>
+            </a:r>
+            <a:r>
+              <a:rPr lang="en-US" sz="1000" dirty="0">
+                <a:solidFill>
+                  <a:srgbClr val="0000FF"/>
+                </a:solidFill>
+                <a:latin typeface="Arial"/>
+              </a:rPr>
+              <a:t>&gt;</a:t>
+            </a:r>
+            <a:endParaRPr lang="en-US" sz="1000" dirty="0">
+              <a:solidFill>
+                <a:prstClr val="black"/>
+              </a:solidFill>
+              <a:latin typeface="Arial"/>
+            </a:endParaRPr>
+          </a:p>
+          <a:p>
+            <a:pPr marL="0" indent="0">
+              <a:buNone/>
+            </a:pPr>
+            <a:r>
+              <a:rPr lang="en-US" sz="1000" dirty="0" smtClean="0">
+                <a:solidFill>
+                  <a:srgbClr val="0000FF"/>
+                </a:solidFill>
+                <a:latin typeface="Arial"/>
+              </a:rPr>
+              <a:t>    &lt;/</a:t>
+            </a:r>
+            <a:r>
+              <a:rPr lang="en-US" sz="1000" dirty="0">
+                <a:solidFill>
+                  <a:srgbClr val="800000"/>
+                </a:solidFill>
+                <a:latin typeface="Arial"/>
+              </a:rPr>
+              <a:t>div</a:t>
+            </a:r>
+            <a:r>
+              <a:rPr lang="en-US" sz="1000" dirty="0">
+                <a:solidFill>
+                  <a:srgbClr val="0000FF"/>
+                </a:solidFill>
+                <a:latin typeface="Arial"/>
+              </a:rPr>
+              <a:t>&gt;</a:t>
+            </a:r>
+            <a:endParaRPr lang="en-US" sz="1000" dirty="0">
+              <a:solidFill>
+                <a:prstClr val="black"/>
+              </a:solidFill>
+              <a:latin typeface="Arial"/>
+            </a:endParaRPr>
+          </a:p>
+          <a:p>
+            <a:pPr marL="0" indent="0">
+              <a:buNone/>
+            </a:pPr>
+            <a:r>
+              <a:rPr lang="en-US" sz="1000" dirty="0" smtClean="0">
+                <a:solidFill>
+                  <a:srgbClr val="0000FF"/>
+                </a:solidFill>
+                <a:latin typeface="Arial"/>
+              </a:rPr>
+              <a:t>&lt;/</a:t>
+            </a:r>
+            <a:r>
+              <a:rPr lang="en-US" sz="1000" dirty="0">
+                <a:solidFill>
+                  <a:srgbClr val="800000"/>
+                </a:solidFill>
+                <a:latin typeface="Arial"/>
+              </a:rPr>
+              <a:t>body</a:t>
+            </a:r>
+            <a:r>
+              <a:rPr lang="en-US" sz="1000" dirty="0">
+                <a:solidFill>
+                  <a:srgbClr val="0000FF"/>
+                </a:solidFill>
+                <a:latin typeface="Arial"/>
+              </a:rPr>
+              <a:t>&gt;</a:t>
+            </a:r>
+          </a:p>
+          <a:p>
+            <a:endParaRPr lang="en-US" sz="1000" dirty="0" smtClean="0">
+              <a:solidFill>
+                <a:srgbClr val="800000"/>
+              </a:solidFill>
+              <a:latin typeface="Arial"/>
+            </a:endParaRPr>
+          </a:p>
+          <a:p>
+            <a:pPr marL="0" indent="0">
+              <a:buNone/>
+            </a:pPr>
+            <a:endParaRPr lang="en-US" sz="1000" dirty="0">
+              <a:solidFill>
+                <a:srgbClr val="0000FF"/>
+              </a:solidFill>
+              <a:latin typeface="Arial"/>
+            </a:endParaRPr>
+          </a:p>
+          <a:p>
+            <a:endParaRPr lang="en-US" sz="1000" dirty="0"/>
           </a:p>
         </p:txBody>
       </p:sp>

</xml_diff>

<commit_message>
Added a couple of more slides
</commit_message>
<xml_diff>
--- a/javascriptSlideshow.pptx
+++ b/javascriptSlideshow.pptx
@@ -12,7 +12,9 @@
     <p:sldId id="262" r:id="rId6"/>
     <p:sldId id="263" r:id="rId7"/>
     <p:sldId id="259" r:id="rId8"/>
-    <p:sldId id="260" r:id="rId9"/>
+    <p:sldId id="264" r:id="rId9"/>
+    <p:sldId id="265" r:id="rId10"/>
+    <p:sldId id="260" r:id="rId11"/>
   </p:sldIdLst>
   <p:sldSz cx="9144000" cy="6858000" type="screen4x3"/>
   <p:notesSz cx="6858000" cy="9144000"/>
@@ -3194,6 +3196,66 @@
 </p:sld>
 </file>
 
+<file path=ppt/slides/slide10.xml><?xml version="1.0" encoding="utf-8"?>
+<p:sld xmlns:a="http://schemas.openxmlformats.org/drawingml/2006/main" xmlns:r="http://schemas.openxmlformats.org/officeDocument/2006/relationships" xmlns:p="http://schemas.openxmlformats.org/presentationml/2006/main">
+  <p:cSld>
+    <p:spTree>
+      <p:nvGrpSpPr>
+        <p:cNvPr id="1" name=""/>
+        <p:cNvGrpSpPr/>
+        <p:nvPr/>
+      </p:nvGrpSpPr>
+      <p:grpSpPr>
+        <a:xfrm>
+          <a:off x="0" y="0"/>
+          <a:ext cx="0" cy="0"/>
+          <a:chOff x="0" y="0"/>
+          <a:chExt cx="0" cy="0"/>
+        </a:xfrm>
+      </p:grpSpPr>
+      <p:sp>
+        <p:nvSpPr>
+          <p:cNvPr id="2" name="Title 1"/>
+          <p:cNvSpPr>
+            <a:spLocks noGrp="1"/>
+          </p:cNvSpPr>
+          <p:nvPr>
+            <p:ph type="title"/>
+          </p:nvPr>
+        </p:nvSpPr>
+        <p:spPr/>
+        <p:txBody>
+          <a:bodyPr/>
+          <a:lstStyle/>
+          <a:p>
+            <a:r>
+              <a:rPr lang="en-US" dirty="0" smtClean="0"/>
+              <a:t>Questions</a:t>
+            </a:r>
+            <a:endParaRPr lang="en-US" dirty="0"/>
+          </a:p>
+        </p:txBody>
+      </p:sp>
+    </p:spTree>
+    <p:extLst>
+      <p:ext uri="{BB962C8B-B14F-4D97-AF65-F5344CB8AC3E}">
+        <p14:creationId xmlns:p14="http://schemas.microsoft.com/office/powerpoint/2010/main" val="2463112457"/>
+      </p:ext>
+    </p:extLst>
+  </p:cSld>
+  <p:clrMapOvr>
+    <a:masterClrMapping/>
+  </p:clrMapOvr>
+  <p:timing>
+    <p:tnLst>
+      <p:par>
+        <p:cTn id="1" dur="indefinite" restart="never" nodeType="tmRoot"/>
+      </p:par>
+    </p:tnLst>
+  </p:timing>
+</p:sld>
+</file>
+
 <file path=ppt/slides/slide2.xml><?xml version="1.0" encoding="utf-8"?>
 <p:sld xmlns:a="http://schemas.openxmlformats.org/drawingml/2006/main" xmlns:r="http://schemas.openxmlformats.org/officeDocument/2006/relationships" xmlns:p="http://schemas.openxmlformats.org/presentationml/2006/main">
   <p:cSld>
@@ -7696,29 +7758,191 @@
           <a:p>
             <a:r>
               <a:rPr lang="en-US" dirty="0" smtClean="0"/>
-              <a:t>Questions</a:t>
+              <a:t>Identifying Leaks with Graphs</a:t>
             </a:r>
             <a:endParaRPr lang="en-US" dirty="0"/>
+          </a:p>
+        </p:txBody>
+      </p:sp>
+      <p:sp>
+        <p:nvSpPr>
+          <p:cNvPr id="3" name="Content Placeholder 2"/>
+          <p:cNvSpPr>
+            <a:spLocks noGrp="1"/>
+          </p:cNvSpPr>
+          <p:nvPr>
+            <p:ph idx="1"/>
+          </p:nvPr>
+        </p:nvSpPr>
+        <p:spPr/>
+        <p:txBody>
+          <a:bodyPr>
+            <a:normAutofit fontScale="92500" lnSpcReduction="10000"/>
+          </a:bodyPr>
+          <a:lstStyle/>
+          <a:p>
+            <a:r>
+              <a:rPr lang="en-US" dirty="0" smtClean="0"/>
+              <a:t>Construct a directed graph</a:t>
+            </a:r>
+          </a:p>
+          <a:p>
+            <a:r>
+              <a:rPr lang="en-US" dirty="0" smtClean="0"/>
+              <a:t>Nodes: DOM elements and JavaScript objects</a:t>
+            </a:r>
+          </a:p>
+          <a:p>
+            <a:r>
+              <a:rPr lang="en-US" dirty="0" smtClean="0"/>
+              <a:t>Edges: References </a:t>
+            </a:r>
+            <a:r>
+              <a:rPr lang="en-US" dirty="0" err="1" smtClean="0"/>
+              <a:t>DOMElement</a:t>
+            </a:r>
+            <a:r>
+              <a:rPr lang="en-US" dirty="0" smtClean="0"/>
+              <a:t>----&gt;</a:t>
+            </a:r>
+            <a:r>
+              <a:rPr lang="en-US" dirty="0" err="1" smtClean="0"/>
+              <a:t>JSObj</a:t>
+            </a:r>
+            <a:r>
+              <a:rPr lang="en-US" dirty="0" smtClean="0"/>
+              <a:t> and </a:t>
+            </a:r>
+            <a:r>
+              <a:rPr lang="en-US" dirty="0" err="1" smtClean="0"/>
+              <a:t>JSObj</a:t>
+            </a:r>
+            <a:r>
+              <a:rPr lang="en-US" dirty="0" smtClean="0"/>
+              <a:t>----&gt;</a:t>
+            </a:r>
+            <a:r>
+              <a:rPr lang="en-US" dirty="0" err="1" smtClean="0"/>
+              <a:t>DOMElement</a:t>
+            </a:r>
+            <a:endParaRPr lang="en-US" dirty="0" smtClean="0"/>
+          </a:p>
+          <a:p>
+            <a:r>
+              <a:rPr lang="en-US" dirty="0" smtClean="0"/>
+              <a:t>Add nodes and edges when DOM element refers a JS object and vice versa</a:t>
+            </a:r>
+          </a:p>
+          <a:p>
+            <a:r>
+              <a:rPr lang="en-US" dirty="0" smtClean="0"/>
+              <a:t>Use Graph algorithms to identify all the cycles in the graph. If cycle exists then there is a circular reference that may result in memory leak</a:t>
+            </a:r>
+          </a:p>
+          <a:p>
+            <a:endParaRPr lang="en-US" dirty="0" smtClean="0"/>
           </a:p>
         </p:txBody>
       </p:sp>
     </p:spTree>
     <p:extLst>
       <p:ext uri="{BB962C8B-B14F-4D97-AF65-F5344CB8AC3E}">
-        <p14:creationId xmlns:p14="http://schemas.microsoft.com/office/powerpoint/2010/main" val="2463112457"/>
+        <p14:creationId xmlns:p14="http://schemas.microsoft.com/office/powerpoint/2010/main" val="1088953943"/>
       </p:ext>
     </p:extLst>
   </p:cSld>
   <p:clrMapOvr>
     <a:masterClrMapping/>
   </p:clrMapOvr>
-  <p:timing>
-    <p:tnLst>
-      <p:par>
-        <p:cTn id="1" dur="indefinite" restart="never" nodeType="tmRoot"/>
-      </p:par>
-    </p:tnLst>
-  </p:timing>
+</p:sld>
+</file>
+
+<file path=ppt/slides/slide9.xml><?xml version="1.0" encoding="utf-8"?>
+<p:sld xmlns:a="http://schemas.openxmlformats.org/drawingml/2006/main" xmlns:r="http://schemas.openxmlformats.org/officeDocument/2006/relationships" xmlns:p="http://schemas.openxmlformats.org/presentationml/2006/main">
+  <p:cSld>
+    <p:spTree>
+      <p:nvGrpSpPr>
+        <p:cNvPr id="1" name=""/>
+        <p:cNvGrpSpPr/>
+        <p:nvPr/>
+      </p:nvGrpSpPr>
+      <p:grpSpPr>
+        <a:xfrm>
+          <a:off x="0" y="0"/>
+          <a:ext cx="0" cy="0"/>
+          <a:chOff x="0" y="0"/>
+          <a:chExt cx="0" cy="0"/>
+        </a:xfrm>
+      </p:grpSpPr>
+      <p:sp>
+        <p:nvSpPr>
+          <p:cNvPr id="2" name="Title 1"/>
+          <p:cNvSpPr>
+            <a:spLocks noGrp="1"/>
+          </p:cNvSpPr>
+          <p:nvPr>
+            <p:ph type="title"/>
+          </p:nvPr>
+        </p:nvSpPr>
+        <p:spPr/>
+        <p:txBody>
+          <a:bodyPr/>
+          <a:lstStyle/>
+          <a:p>
+            <a:r>
+              <a:rPr lang="en-US" dirty="0" smtClean="0"/>
+              <a:t>Identifying Leaks with Graphs cont.</a:t>
+            </a:r>
+            <a:endParaRPr lang="en-US" dirty="0"/>
+          </a:p>
+        </p:txBody>
+      </p:sp>
+      <p:sp>
+        <p:nvSpPr>
+          <p:cNvPr id="3" name="Content Placeholder 2"/>
+          <p:cNvSpPr>
+            <a:spLocks noGrp="1"/>
+          </p:cNvSpPr>
+          <p:nvPr>
+            <p:ph idx="1"/>
+          </p:nvPr>
+        </p:nvSpPr>
+        <p:spPr/>
+        <p:txBody>
+          <a:bodyPr>
+            <a:normAutofit/>
+          </a:bodyPr>
+          <a:lstStyle/>
+          <a:p>
+            <a:r>
+              <a:rPr lang="en-US" dirty="0" smtClean="0"/>
+              <a:t>Will identify most of the leaks resulting from Circular References, and Closures with Circular References</a:t>
+            </a:r>
+          </a:p>
+          <a:p>
+            <a:r>
+              <a:rPr lang="en-US" dirty="0" smtClean="0"/>
+              <a:t>Most of the leaks in the existing applications are of this kind</a:t>
+            </a:r>
+          </a:p>
+          <a:p>
+            <a:endParaRPr lang="en-US" dirty="0" smtClean="0"/>
+          </a:p>
+          <a:p>
+            <a:endParaRPr lang="en-US" dirty="0" smtClean="0"/>
+          </a:p>
+        </p:txBody>
+      </p:sp>
+    </p:spTree>
+    <p:extLst>
+      <p:ext uri="{BB962C8B-B14F-4D97-AF65-F5344CB8AC3E}">
+        <p14:creationId xmlns:p14="http://schemas.microsoft.com/office/powerpoint/2010/main" val="178070368"/>
+      </p:ext>
+    </p:extLst>
+  </p:cSld>
+  <p:clrMapOvr>
+    <a:masterClrMapping/>
+  </p:clrMapOvr>
 </p:sld>
 </file>
 

</xml_diff>